<commit_message>
Minor edits. Changes to figures for relationships chapter.
</commit_message>
<xml_diff>
--- a/part1/Figures/collections/inside-hashset.pptx
+++ b/part1/Figures/collections/inside-hashset.pptx
@@ -1,6 +1,6 @@
 
 <file path=ppt/presentation.xml><?xml version="1.0" encoding="utf-8"?>
-<p:presentation xmlns:a="http://schemas.openxmlformats.org/drawingml/2006/main" xmlns:r="http://schemas.openxmlformats.org/officeDocument/2006/relationships" xmlns:mc="http://schemas.openxmlformats.org/markup-compatibility/2006" xmlns:mv="urn:schemas-microsoft-com:mac:vml" xmlns:p="http://schemas.openxmlformats.org/presentationml/2006/main" mc:Ignorable="mv" mc:PreserveAttributes="mv:*" saveSubsetFonts="1" autoCompressPictures="0">
+<p:presentation xmlns:a="http://schemas.openxmlformats.org/drawingml/2006/main" xmlns:r="http://schemas.openxmlformats.org/officeDocument/2006/relationships" xmlns:p="http://schemas.openxmlformats.org/presentationml/2006/main" saveSubsetFonts="1" autoCompressPictures="0">
   <p:sldMasterIdLst>
     <p:sldMasterId id="2147483648" r:id="rId1"/>
   </p:sldMasterIdLst>
@@ -13,94 +13,124 @@
     <a:defPPr>
       <a:defRPr lang="en-US"/>
     </a:defPPr>
-    <a:lvl1pPr marL="0" algn="l" defTabSz="457200" rtl="0" eaLnBrk="1" latinLnBrk="0" hangingPunct="1">
-      <a:defRPr sz="1800" kern="1200">
+    <a:lvl1pPr algn="l" defTabSz="457200" rtl="0" fontAlgn="base">
+      <a:spcBef>
+        <a:spcPct val="0"/>
+      </a:spcBef>
+      <a:spcAft>
+        <a:spcPct val="0"/>
+      </a:spcAft>
+      <a:defRPr kern="1200">
         <a:solidFill>
           <a:schemeClr val="tx1"/>
         </a:solidFill>
-        <a:latin typeface="+mn-lt"/>
+        <a:latin typeface="Arial" charset="0"/>
         <a:ea typeface="+mn-ea"/>
-        <a:cs typeface="+mn-cs"/>
+        <a:cs typeface="Arial" charset="0"/>
       </a:defRPr>
     </a:lvl1pPr>
-    <a:lvl2pPr marL="457200" algn="l" defTabSz="457200" rtl="0" eaLnBrk="1" latinLnBrk="0" hangingPunct="1">
-      <a:defRPr sz="1800" kern="1200">
+    <a:lvl2pPr marL="457200" algn="l" defTabSz="457200" rtl="0" fontAlgn="base">
+      <a:spcBef>
+        <a:spcPct val="0"/>
+      </a:spcBef>
+      <a:spcAft>
+        <a:spcPct val="0"/>
+      </a:spcAft>
+      <a:defRPr kern="1200">
         <a:solidFill>
           <a:schemeClr val="tx1"/>
         </a:solidFill>
-        <a:latin typeface="+mn-lt"/>
+        <a:latin typeface="Arial" charset="0"/>
         <a:ea typeface="+mn-ea"/>
-        <a:cs typeface="+mn-cs"/>
+        <a:cs typeface="Arial" charset="0"/>
       </a:defRPr>
     </a:lvl2pPr>
-    <a:lvl3pPr marL="914400" algn="l" defTabSz="457200" rtl="0" eaLnBrk="1" latinLnBrk="0" hangingPunct="1">
-      <a:defRPr sz="1800" kern="1200">
+    <a:lvl3pPr marL="914400" algn="l" defTabSz="457200" rtl="0" fontAlgn="base">
+      <a:spcBef>
+        <a:spcPct val="0"/>
+      </a:spcBef>
+      <a:spcAft>
+        <a:spcPct val="0"/>
+      </a:spcAft>
+      <a:defRPr kern="1200">
         <a:solidFill>
           <a:schemeClr val="tx1"/>
         </a:solidFill>
-        <a:latin typeface="+mn-lt"/>
+        <a:latin typeface="Arial" charset="0"/>
         <a:ea typeface="+mn-ea"/>
-        <a:cs typeface="+mn-cs"/>
+        <a:cs typeface="Arial" charset="0"/>
       </a:defRPr>
     </a:lvl3pPr>
-    <a:lvl4pPr marL="1371600" algn="l" defTabSz="457200" rtl="0" eaLnBrk="1" latinLnBrk="0" hangingPunct="1">
-      <a:defRPr sz="1800" kern="1200">
+    <a:lvl4pPr marL="1371600" algn="l" defTabSz="457200" rtl="0" fontAlgn="base">
+      <a:spcBef>
+        <a:spcPct val="0"/>
+      </a:spcBef>
+      <a:spcAft>
+        <a:spcPct val="0"/>
+      </a:spcAft>
+      <a:defRPr kern="1200">
         <a:solidFill>
           <a:schemeClr val="tx1"/>
         </a:solidFill>
-        <a:latin typeface="+mn-lt"/>
+        <a:latin typeface="Arial" charset="0"/>
         <a:ea typeface="+mn-ea"/>
-        <a:cs typeface="+mn-cs"/>
+        <a:cs typeface="Arial" charset="0"/>
       </a:defRPr>
     </a:lvl4pPr>
-    <a:lvl5pPr marL="1828800" algn="l" defTabSz="457200" rtl="0" eaLnBrk="1" latinLnBrk="0" hangingPunct="1">
-      <a:defRPr sz="1800" kern="1200">
+    <a:lvl5pPr marL="1828800" algn="l" defTabSz="457200" rtl="0" fontAlgn="base">
+      <a:spcBef>
+        <a:spcPct val="0"/>
+      </a:spcBef>
+      <a:spcAft>
+        <a:spcPct val="0"/>
+      </a:spcAft>
+      <a:defRPr kern="1200">
         <a:solidFill>
           <a:schemeClr val="tx1"/>
         </a:solidFill>
-        <a:latin typeface="+mn-lt"/>
+        <a:latin typeface="Arial" charset="0"/>
         <a:ea typeface="+mn-ea"/>
-        <a:cs typeface="+mn-cs"/>
+        <a:cs typeface="Arial" charset="0"/>
       </a:defRPr>
     </a:lvl5pPr>
-    <a:lvl6pPr marL="2286000" algn="l" defTabSz="457200" rtl="0" eaLnBrk="1" latinLnBrk="0" hangingPunct="1">
-      <a:defRPr sz="1800" kern="1200">
+    <a:lvl6pPr marL="2286000" algn="l" defTabSz="914400" rtl="0" eaLnBrk="1" latinLnBrk="0" hangingPunct="1">
+      <a:defRPr kern="1200">
         <a:solidFill>
           <a:schemeClr val="tx1"/>
         </a:solidFill>
-        <a:latin typeface="+mn-lt"/>
+        <a:latin typeface="Arial" charset="0"/>
         <a:ea typeface="+mn-ea"/>
-        <a:cs typeface="+mn-cs"/>
+        <a:cs typeface="Arial" charset="0"/>
       </a:defRPr>
     </a:lvl6pPr>
-    <a:lvl7pPr marL="2743200" algn="l" defTabSz="457200" rtl="0" eaLnBrk="1" latinLnBrk="0" hangingPunct="1">
-      <a:defRPr sz="1800" kern="1200">
+    <a:lvl7pPr marL="2743200" algn="l" defTabSz="914400" rtl="0" eaLnBrk="1" latinLnBrk="0" hangingPunct="1">
+      <a:defRPr kern="1200">
         <a:solidFill>
           <a:schemeClr val="tx1"/>
         </a:solidFill>
-        <a:latin typeface="+mn-lt"/>
+        <a:latin typeface="Arial" charset="0"/>
         <a:ea typeface="+mn-ea"/>
-        <a:cs typeface="+mn-cs"/>
+        <a:cs typeface="Arial" charset="0"/>
       </a:defRPr>
     </a:lvl7pPr>
-    <a:lvl8pPr marL="3200400" algn="l" defTabSz="457200" rtl="0" eaLnBrk="1" latinLnBrk="0" hangingPunct="1">
-      <a:defRPr sz="1800" kern="1200">
+    <a:lvl8pPr marL="3200400" algn="l" defTabSz="914400" rtl="0" eaLnBrk="1" latinLnBrk="0" hangingPunct="1">
+      <a:defRPr kern="1200">
         <a:solidFill>
           <a:schemeClr val="tx1"/>
         </a:solidFill>
-        <a:latin typeface="+mn-lt"/>
+        <a:latin typeface="Arial" charset="0"/>
         <a:ea typeface="+mn-ea"/>
-        <a:cs typeface="+mn-cs"/>
+        <a:cs typeface="Arial" charset="0"/>
       </a:defRPr>
     </a:lvl8pPr>
-    <a:lvl9pPr marL="3657600" algn="l" defTabSz="457200" rtl="0" eaLnBrk="1" latinLnBrk="0" hangingPunct="1">
-      <a:defRPr sz="1800" kern="1200">
+    <a:lvl9pPr marL="3657600" algn="l" defTabSz="914400" rtl="0" eaLnBrk="1" latinLnBrk="0" hangingPunct="1">
+      <a:defRPr kern="1200">
         <a:solidFill>
           <a:schemeClr val="tx1"/>
         </a:solidFill>
-        <a:latin typeface="+mn-lt"/>
+        <a:latin typeface="Arial" charset="0"/>
         <a:ea typeface="+mn-ea"/>
-        <a:cs typeface="+mn-cs"/>
+        <a:cs typeface="Arial" charset="0"/>
       </a:defRPr>
     </a:lvl9pPr>
   </p:defaultTextStyle>
@@ -108,7 +138,7 @@
 </file>
 
 <file path=ppt/slideLayouts/slideLayout1.xml><?xml version="1.0" encoding="utf-8"?>
-<p:sldLayout xmlns:a="http://schemas.openxmlformats.org/drawingml/2006/main" xmlns:r="http://schemas.openxmlformats.org/officeDocument/2006/relationships" xmlns:mc="http://schemas.openxmlformats.org/markup-compatibility/2006" xmlns:mv="urn:schemas-microsoft-com:mac:vml" xmlns:p="http://schemas.openxmlformats.org/presentationml/2006/main" mc:Ignorable="mv" mc:PreserveAttributes="mv:*" type="title" preserve="1">
+<p:sldLayout xmlns:a="http://schemas.openxmlformats.org/drawingml/2006/main" xmlns:r="http://schemas.openxmlformats.org/officeDocument/2006/relationships" xmlns:p="http://schemas.openxmlformats.org/presentationml/2006/main" type="title" preserve="1">
   <p:cSld name="Title Slide">
     <p:spTree>
       <p:nvGrpSpPr>
@@ -284,12 +314,21 @@
         <p:spPr/>
         <p:txBody>
           <a:bodyPr/>
-          <a:lstStyle/>
-          <a:p>
-            <a:fld id="{4FCECDFD-BFFC-6141-83BB-B602E64518FB}" type="datetimeFigureOut">
-              <a:rPr lang="en-US" smtClean="0"/>
-              <a:pPr/>
-              <a:t>4/5/11</a:t>
+          <a:lstStyle>
+            <a:lvl1pPr>
+              <a:defRPr/>
+            </a:lvl1pPr>
+          </a:lstStyle>
+          <a:p>
+            <a:pPr>
+              <a:defRPr/>
+            </a:pPr>
+            <a:fld id="{EA869C11-907D-4A7F-9EA7-EFD46A12E100}" type="datetimeFigureOut">
+              <a:rPr lang="en-US"/>
+              <a:pPr>
+                <a:defRPr/>
+              </a:pPr>
+              <a:t>7/5/2012</a:t>
             </a:fld>
             <a:endParaRPr lang="en-US"/>
           </a:p>
@@ -308,8 +347,15 @@
         <p:spPr/>
         <p:txBody>
           <a:bodyPr/>
-          <a:lstStyle/>
-          <a:p>
+          <a:lstStyle>
+            <a:lvl1pPr>
+              <a:defRPr/>
+            </a:lvl1pPr>
+          </a:lstStyle>
+          <a:p>
+            <a:pPr>
+              <a:defRPr/>
+            </a:pPr>
             <a:endParaRPr lang="en-US"/>
           </a:p>
         </p:txBody>
@@ -327,11 +373,20 @@
         <p:spPr/>
         <p:txBody>
           <a:bodyPr/>
-          <a:lstStyle/>
-          <a:p>
-            <a:fld id="{8683ECDB-7790-CD47-A480-1CA096506802}" type="slidenum">
-              <a:rPr lang="en-US" smtClean="0"/>
-              <a:pPr/>
+          <a:lstStyle>
+            <a:lvl1pPr>
+              <a:defRPr/>
+            </a:lvl1pPr>
+          </a:lstStyle>
+          <a:p>
+            <a:pPr>
+              <a:defRPr/>
+            </a:pPr>
+            <a:fld id="{C80855D0-533B-4B6F-AF0D-03BF56607AB1}" type="slidenum">
+              <a:rPr lang="en-US"/>
+              <a:pPr>
+                <a:defRPr/>
+              </a:pPr>
               <a:t>‹#›</a:t>
             </a:fld>
             <a:endParaRPr lang="en-US"/>
@@ -347,7 +402,7 @@
 </file>
 
 <file path=ppt/slideLayouts/slideLayout10.xml><?xml version="1.0" encoding="utf-8"?>
-<p:sldLayout xmlns:a="http://schemas.openxmlformats.org/drawingml/2006/main" xmlns:r="http://schemas.openxmlformats.org/officeDocument/2006/relationships" xmlns:mc="http://schemas.openxmlformats.org/markup-compatibility/2006" xmlns:mv="urn:schemas-microsoft-com:mac:vml" xmlns:p="http://schemas.openxmlformats.org/presentationml/2006/main" mc:Ignorable="mv" mc:PreserveAttributes="mv:*" type="vertTx" preserve="1">
+<p:sldLayout xmlns:a="http://schemas.openxmlformats.org/drawingml/2006/main" xmlns:r="http://schemas.openxmlformats.org/officeDocument/2006/relationships" xmlns:p="http://schemas.openxmlformats.org/presentationml/2006/main" type="vertTx" preserve="1">
   <p:cSld name="Title and Vertical Text">
     <p:spTree>
       <p:nvGrpSpPr>
@@ -451,12 +506,21 @@
         <p:spPr/>
         <p:txBody>
           <a:bodyPr/>
-          <a:lstStyle/>
-          <a:p>
-            <a:fld id="{4FCECDFD-BFFC-6141-83BB-B602E64518FB}" type="datetimeFigureOut">
-              <a:rPr lang="en-US" smtClean="0"/>
-              <a:pPr/>
-              <a:t>4/5/11</a:t>
+          <a:lstStyle>
+            <a:lvl1pPr>
+              <a:defRPr/>
+            </a:lvl1pPr>
+          </a:lstStyle>
+          <a:p>
+            <a:pPr>
+              <a:defRPr/>
+            </a:pPr>
+            <a:fld id="{0467ED37-AAA3-4EAD-A830-705697ADDE64}" type="datetimeFigureOut">
+              <a:rPr lang="en-US"/>
+              <a:pPr>
+                <a:defRPr/>
+              </a:pPr>
+              <a:t>7/5/2012</a:t>
             </a:fld>
             <a:endParaRPr lang="en-US"/>
           </a:p>
@@ -475,8 +539,15 @@
         <p:spPr/>
         <p:txBody>
           <a:bodyPr/>
-          <a:lstStyle/>
-          <a:p>
+          <a:lstStyle>
+            <a:lvl1pPr>
+              <a:defRPr/>
+            </a:lvl1pPr>
+          </a:lstStyle>
+          <a:p>
+            <a:pPr>
+              <a:defRPr/>
+            </a:pPr>
             <a:endParaRPr lang="en-US"/>
           </a:p>
         </p:txBody>
@@ -494,11 +565,20 @@
         <p:spPr/>
         <p:txBody>
           <a:bodyPr/>
-          <a:lstStyle/>
-          <a:p>
-            <a:fld id="{8683ECDB-7790-CD47-A480-1CA096506802}" type="slidenum">
-              <a:rPr lang="en-US" smtClean="0"/>
-              <a:pPr/>
+          <a:lstStyle>
+            <a:lvl1pPr>
+              <a:defRPr/>
+            </a:lvl1pPr>
+          </a:lstStyle>
+          <a:p>
+            <a:pPr>
+              <a:defRPr/>
+            </a:pPr>
+            <a:fld id="{191A86E2-A51C-42C9-AEA2-FEBB4B52279B}" type="slidenum">
+              <a:rPr lang="en-US"/>
+              <a:pPr>
+                <a:defRPr/>
+              </a:pPr>
               <a:t>‹#›</a:t>
             </a:fld>
             <a:endParaRPr lang="en-US"/>
@@ -514,7 +594,7 @@
 </file>
 
 <file path=ppt/slideLayouts/slideLayout11.xml><?xml version="1.0" encoding="utf-8"?>
-<p:sldLayout xmlns:a="http://schemas.openxmlformats.org/drawingml/2006/main" xmlns:r="http://schemas.openxmlformats.org/officeDocument/2006/relationships" xmlns:mc="http://schemas.openxmlformats.org/markup-compatibility/2006" xmlns:mv="urn:schemas-microsoft-com:mac:vml" xmlns:p="http://schemas.openxmlformats.org/presentationml/2006/main" mc:Ignorable="mv" mc:PreserveAttributes="mv:*" type="vertTitleAndTx" preserve="1">
+<p:sldLayout xmlns:a="http://schemas.openxmlformats.org/drawingml/2006/main" xmlns:r="http://schemas.openxmlformats.org/officeDocument/2006/relationships" xmlns:p="http://schemas.openxmlformats.org/presentationml/2006/main" type="vertTitleAndTx" preserve="1">
   <p:cSld name="Vertical Title and Text">
     <p:spTree>
       <p:nvGrpSpPr>
@@ -628,12 +708,21 @@
         <p:spPr/>
         <p:txBody>
           <a:bodyPr/>
-          <a:lstStyle/>
-          <a:p>
-            <a:fld id="{4FCECDFD-BFFC-6141-83BB-B602E64518FB}" type="datetimeFigureOut">
-              <a:rPr lang="en-US" smtClean="0"/>
-              <a:pPr/>
-              <a:t>4/5/11</a:t>
+          <a:lstStyle>
+            <a:lvl1pPr>
+              <a:defRPr/>
+            </a:lvl1pPr>
+          </a:lstStyle>
+          <a:p>
+            <a:pPr>
+              <a:defRPr/>
+            </a:pPr>
+            <a:fld id="{24F69AC6-04E4-4F60-B85D-479D1FB806BE}" type="datetimeFigureOut">
+              <a:rPr lang="en-US"/>
+              <a:pPr>
+                <a:defRPr/>
+              </a:pPr>
+              <a:t>7/5/2012</a:t>
             </a:fld>
             <a:endParaRPr lang="en-US"/>
           </a:p>
@@ -652,8 +741,15 @@
         <p:spPr/>
         <p:txBody>
           <a:bodyPr/>
-          <a:lstStyle/>
-          <a:p>
+          <a:lstStyle>
+            <a:lvl1pPr>
+              <a:defRPr/>
+            </a:lvl1pPr>
+          </a:lstStyle>
+          <a:p>
+            <a:pPr>
+              <a:defRPr/>
+            </a:pPr>
             <a:endParaRPr lang="en-US"/>
           </a:p>
         </p:txBody>
@@ -671,11 +767,20 @@
         <p:spPr/>
         <p:txBody>
           <a:bodyPr/>
-          <a:lstStyle/>
-          <a:p>
-            <a:fld id="{8683ECDB-7790-CD47-A480-1CA096506802}" type="slidenum">
-              <a:rPr lang="en-US" smtClean="0"/>
-              <a:pPr/>
+          <a:lstStyle>
+            <a:lvl1pPr>
+              <a:defRPr/>
+            </a:lvl1pPr>
+          </a:lstStyle>
+          <a:p>
+            <a:pPr>
+              <a:defRPr/>
+            </a:pPr>
+            <a:fld id="{607962A7-0C62-4D1F-95BE-035BE58672D9}" type="slidenum">
+              <a:rPr lang="en-US"/>
+              <a:pPr>
+                <a:defRPr/>
+              </a:pPr>
               <a:t>‹#›</a:t>
             </a:fld>
             <a:endParaRPr lang="en-US"/>
@@ -691,7 +796,7 @@
 </file>
 
 <file path=ppt/slideLayouts/slideLayout2.xml><?xml version="1.0" encoding="utf-8"?>
-<p:sldLayout xmlns:a="http://schemas.openxmlformats.org/drawingml/2006/main" xmlns:r="http://schemas.openxmlformats.org/officeDocument/2006/relationships" xmlns:mc="http://schemas.openxmlformats.org/markup-compatibility/2006" xmlns:mv="urn:schemas-microsoft-com:mac:vml" xmlns:p="http://schemas.openxmlformats.org/presentationml/2006/main" mc:Ignorable="mv" mc:PreserveAttributes="mv:*" type="obj" preserve="1">
+<p:sldLayout xmlns:a="http://schemas.openxmlformats.org/drawingml/2006/main" xmlns:r="http://schemas.openxmlformats.org/officeDocument/2006/relationships" xmlns:p="http://schemas.openxmlformats.org/presentationml/2006/main" type="obj" preserve="1">
   <p:cSld name="Title and Content">
     <p:spTree>
       <p:nvGrpSpPr>
@@ -795,12 +900,21 @@
         <p:spPr/>
         <p:txBody>
           <a:bodyPr/>
-          <a:lstStyle/>
-          <a:p>
-            <a:fld id="{4FCECDFD-BFFC-6141-83BB-B602E64518FB}" type="datetimeFigureOut">
-              <a:rPr lang="en-US" smtClean="0"/>
-              <a:pPr/>
-              <a:t>4/5/11</a:t>
+          <a:lstStyle>
+            <a:lvl1pPr>
+              <a:defRPr/>
+            </a:lvl1pPr>
+          </a:lstStyle>
+          <a:p>
+            <a:pPr>
+              <a:defRPr/>
+            </a:pPr>
+            <a:fld id="{C44A5AF7-AB9C-430F-ACB2-70583A16FFF2}" type="datetimeFigureOut">
+              <a:rPr lang="en-US"/>
+              <a:pPr>
+                <a:defRPr/>
+              </a:pPr>
+              <a:t>7/5/2012</a:t>
             </a:fld>
             <a:endParaRPr lang="en-US"/>
           </a:p>
@@ -819,8 +933,15 @@
         <p:spPr/>
         <p:txBody>
           <a:bodyPr/>
-          <a:lstStyle/>
-          <a:p>
+          <a:lstStyle>
+            <a:lvl1pPr>
+              <a:defRPr/>
+            </a:lvl1pPr>
+          </a:lstStyle>
+          <a:p>
+            <a:pPr>
+              <a:defRPr/>
+            </a:pPr>
             <a:endParaRPr lang="en-US"/>
           </a:p>
         </p:txBody>
@@ -838,11 +959,20 @@
         <p:spPr/>
         <p:txBody>
           <a:bodyPr/>
-          <a:lstStyle/>
-          <a:p>
-            <a:fld id="{8683ECDB-7790-CD47-A480-1CA096506802}" type="slidenum">
-              <a:rPr lang="en-US" smtClean="0"/>
-              <a:pPr/>
+          <a:lstStyle>
+            <a:lvl1pPr>
+              <a:defRPr/>
+            </a:lvl1pPr>
+          </a:lstStyle>
+          <a:p>
+            <a:pPr>
+              <a:defRPr/>
+            </a:pPr>
+            <a:fld id="{57736D0B-2229-4661-AA7E-7FFAED76AF03}" type="slidenum">
+              <a:rPr lang="en-US"/>
+              <a:pPr>
+                <a:defRPr/>
+              </a:pPr>
               <a:t>‹#›</a:t>
             </a:fld>
             <a:endParaRPr lang="en-US"/>
@@ -858,7 +988,7 @@
 </file>
 
 <file path=ppt/slideLayouts/slideLayout3.xml><?xml version="1.0" encoding="utf-8"?>
-<p:sldLayout xmlns:a="http://schemas.openxmlformats.org/drawingml/2006/main" xmlns:r="http://schemas.openxmlformats.org/officeDocument/2006/relationships" xmlns:mc="http://schemas.openxmlformats.org/markup-compatibility/2006" xmlns:mv="urn:schemas-microsoft-com:mac:vml" xmlns:p="http://schemas.openxmlformats.org/presentationml/2006/main" mc:Ignorable="mv" mc:PreserveAttributes="mv:*" type="secHead" preserve="1">
+<p:sldLayout xmlns:a="http://schemas.openxmlformats.org/drawingml/2006/main" xmlns:r="http://schemas.openxmlformats.org/officeDocument/2006/relationships" xmlns:p="http://schemas.openxmlformats.org/presentationml/2006/main" type="secHead" preserve="1">
   <p:cSld name="Section Header">
     <p:spTree>
       <p:nvGrpSpPr>
@@ -1038,12 +1168,21 @@
         <p:spPr/>
         <p:txBody>
           <a:bodyPr/>
-          <a:lstStyle/>
-          <a:p>
-            <a:fld id="{4FCECDFD-BFFC-6141-83BB-B602E64518FB}" type="datetimeFigureOut">
-              <a:rPr lang="en-US" smtClean="0"/>
-              <a:pPr/>
-              <a:t>4/5/11</a:t>
+          <a:lstStyle>
+            <a:lvl1pPr>
+              <a:defRPr/>
+            </a:lvl1pPr>
+          </a:lstStyle>
+          <a:p>
+            <a:pPr>
+              <a:defRPr/>
+            </a:pPr>
+            <a:fld id="{201E5E0F-B8C0-4ABA-9C6F-CD47FF03D444}" type="datetimeFigureOut">
+              <a:rPr lang="en-US"/>
+              <a:pPr>
+                <a:defRPr/>
+              </a:pPr>
+              <a:t>7/5/2012</a:t>
             </a:fld>
             <a:endParaRPr lang="en-US"/>
           </a:p>
@@ -1062,8 +1201,15 @@
         <p:spPr/>
         <p:txBody>
           <a:bodyPr/>
-          <a:lstStyle/>
-          <a:p>
+          <a:lstStyle>
+            <a:lvl1pPr>
+              <a:defRPr/>
+            </a:lvl1pPr>
+          </a:lstStyle>
+          <a:p>
+            <a:pPr>
+              <a:defRPr/>
+            </a:pPr>
             <a:endParaRPr lang="en-US"/>
           </a:p>
         </p:txBody>
@@ -1081,11 +1227,20 @@
         <p:spPr/>
         <p:txBody>
           <a:bodyPr/>
-          <a:lstStyle/>
-          <a:p>
-            <a:fld id="{8683ECDB-7790-CD47-A480-1CA096506802}" type="slidenum">
-              <a:rPr lang="en-US" smtClean="0"/>
-              <a:pPr/>
+          <a:lstStyle>
+            <a:lvl1pPr>
+              <a:defRPr/>
+            </a:lvl1pPr>
+          </a:lstStyle>
+          <a:p>
+            <a:pPr>
+              <a:defRPr/>
+            </a:pPr>
+            <a:fld id="{3D1619AF-B268-45A6-AA9D-F07579FEC687}" type="slidenum">
+              <a:rPr lang="en-US"/>
+              <a:pPr>
+                <a:defRPr/>
+              </a:pPr>
               <a:t>‹#›</a:t>
             </a:fld>
             <a:endParaRPr lang="en-US"/>
@@ -1101,7 +1256,7 @@
 </file>
 
 <file path=ppt/slideLayouts/slideLayout4.xml><?xml version="1.0" encoding="utf-8"?>
-<p:sldLayout xmlns:a="http://schemas.openxmlformats.org/drawingml/2006/main" xmlns:r="http://schemas.openxmlformats.org/officeDocument/2006/relationships" xmlns:mc="http://schemas.openxmlformats.org/markup-compatibility/2006" xmlns:mv="urn:schemas-microsoft-com:mac:vml" xmlns:p="http://schemas.openxmlformats.org/presentationml/2006/main" mc:Ignorable="mv" mc:PreserveAttributes="mv:*" type="twoObj" preserve="1">
+<p:sldLayout xmlns:a="http://schemas.openxmlformats.org/drawingml/2006/main" xmlns:r="http://schemas.openxmlformats.org/officeDocument/2006/relationships" xmlns:p="http://schemas.openxmlformats.org/presentationml/2006/main" type="twoObj" preserve="1">
   <p:cSld name="Two Content">
     <p:spTree>
       <p:nvGrpSpPr>
@@ -1312,7 +1467,7 @@
       </p:sp>
       <p:sp>
         <p:nvSpPr>
-          <p:cNvPr id="5" name="Date Placeholder 4"/>
+          <p:cNvPr id="5" name="Date Placeholder 3"/>
           <p:cNvSpPr>
             <a:spLocks noGrp="1"/>
           </p:cNvSpPr>
@@ -1323,12 +1478,21 @@
         <p:spPr/>
         <p:txBody>
           <a:bodyPr/>
-          <a:lstStyle/>
-          <a:p>
-            <a:fld id="{4FCECDFD-BFFC-6141-83BB-B602E64518FB}" type="datetimeFigureOut">
-              <a:rPr lang="en-US" smtClean="0"/>
-              <a:pPr/>
-              <a:t>4/5/11</a:t>
+          <a:lstStyle>
+            <a:lvl1pPr>
+              <a:defRPr/>
+            </a:lvl1pPr>
+          </a:lstStyle>
+          <a:p>
+            <a:pPr>
+              <a:defRPr/>
+            </a:pPr>
+            <a:fld id="{EBF747BF-6E29-4437-AC11-2005B4CB9278}" type="datetimeFigureOut">
+              <a:rPr lang="en-US"/>
+              <a:pPr>
+                <a:defRPr/>
+              </a:pPr>
+              <a:t>7/5/2012</a:t>
             </a:fld>
             <a:endParaRPr lang="en-US"/>
           </a:p>
@@ -1336,7 +1500,7 @@
       </p:sp>
       <p:sp>
         <p:nvSpPr>
-          <p:cNvPr id="6" name="Footer Placeholder 5"/>
+          <p:cNvPr id="6" name="Footer Placeholder 4"/>
           <p:cNvSpPr>
             <a:spLocks noGrp="1"/>
           </p:cNvSpPr>
@@ -1347,15 +1511,22 @@
         <p:spPr/>
         <p:txBody>
           <a:bodyPr/>
-          <a:lstStyle/>
-          <a:p>
-            <a:endParaRPr lang="en-US"/>
-          </a:p>
-        </p:txBody>
-      </p:sp>
-      <p:sp>
-        <p:nvSpPr>
-          <p:cNvPr id="7" name="Slide Number Placeholder 6"/>
+          <a:lstStyle>
+            <a:lvl1pPr>
+              <a:defRPr/>
+            </a:lvl1pPr>
+          </a:lstStyle>
+          <a:p>
+            <a:pPr>
+              <a:defRPr/>
+            </a:pPr>
+            <a:endParaRPr lang="en-US"/>
+          </a:p>
+        </p:txBody>
+      </p:sp>
+      <p:sp>
+        <p:nvSpPr>
+          <p:cNvPr id="7" name="Slide Number Placeholder 5"/>
           <p:cNvSpPr>
             <a:spLocks noGrp="1"/>
           </p:cNvSpPr>
@@ -1366,11 +1537,20 @@
         <p:spPr/>
         <p:txBody>
           <a:bodyPr/>
-          <a:lstStyle/>
-          <a:p>
-            <a:fld id="{8683ECDB-7790-CD47-A480-1CA096506802}" type="slidenum">
-              <a:rPr lang="en-US" smtClean="0"/>
-              <a:pPr/>
+          <a:lstStyle>
+            <a:lvl1pPr>
+              <a:defRPr/>
+            </a:lvl1pPr>
+          </a:lstStyle>
+          <a:p>
+            <a:pPr>
+              <a:defRPr/>
+            </a:pPr>
+            <a:fld id="{DFF1E6BD-0AED-4CA9-9911-18A254D86A0B}" type="slidenum">
+              <a:rPr lang="en-US"/>
+              <a:pPr>
+                <a:defRPr/>
+              </a:pPr>
               <a:t>‹#›</a:t>
             </a:fld>
             <a:endParaRPr lang="en-US"/>
@@ -1386,7 +1566,7 @@
 </file>
 
 <file path=ppt/slideLayouts/slideLayout5.xml><?xml version="1.0" encoding="utf-8"?>
-<p:sldLayout xmlns:a="http://schemas.openxmlformats.org/drawingml/2006/main" xmlns:r="http://schemas.openxmlformats.org/officeDocument/2006/relationships" xmlns:mc="http://schemas.openxmlformats.org/markup-compatibility/2006" xmlns:mv="urn:schemas-microsoft-com:mac:vml" xmlns:p="http://schemas.openxmlformats.org/presentationml/2006/main" mc:Ignorable="mv" mc:PreserveAttributes="mv:*" type="twoTxTwoObj" preserve="1">
+<p:sldLayout xmlns:a="http://schemas.openxmlformats.org/drawingml/2006/main" xmlns:r="http://schemas.openxmlformats.org/officeDocument/2006/relationships" xmlns:p="http://schemas.openxmlformats.org/presentationml/2006/main" type="twoTxTwoObj" preserve="1">
   <p:cSld name="Comparison">
     <p:spTree>
       <p:nvGrpSpPr>
@@ -1731,7 +1911,7 @@
       </p:sp>
       <p:sp>
         <p:nvSpPr>
-          <p:cNvPr id="7" name="Date Placeholder 6"/>
+          <p:cNvPr id="7" name="Date Placeholder 3"/>
           <p:cNvSpPr>
             <a:spLocks noGrp="1"/>
           </p:cNvSpPr>
@@ -1742,12 +1922,21 @@
         <p:spPr/>
         <p:txBody>
           <a:bodyPr/>
-          <a:lstStyle/>
-          <a:p>
-            <a:fld id="{4FCECDFD-BFFC-6141-83BB-B602E64518FB}" type="datetimeFigureOut">
-              <a:rPr lang="en-US" smtClean="0"/>
-              <a:pPr/>
-              <a:t>4/5/11</a:t>
+          <a:lstStyle>
+            <a:lvl1pPr>
+              <a:defRPr/>
+            </a:lvl1pPr>
+          </a:lstStyle>
+          <a:p>
+            <a:pPr>
+              <a:defRPr/>
+            </a:pPr>
+            <a:fld id="{B33299F7-6BA2-4DC5-800A-D39A11919286}" type="datetimeFigureOut">
+              <a:rPr lang="en-US"/>
+              <a:pPr>
+                <a:defRPr/>
+              </a:pPr>
+              <a:t>7/5/2012</a:t>
             </a:fld>
             <a:endParaRPr lang="en-US"/>
           </a:p>
@@ -1755,7 +1944,7 @@
       </p:sp>
       <p:sp>
         <p:nvSpPr>
-          <p:cNvPr id="8" name="Footer Placeholder 7"/>
+          <p:cNvPr id="8" name="Footer Placeholder 4"/>
           <p:cNvSpPr>
             <a:spLocks noGrp="1"/>
           </p:cNvSpPr>
@@ -1766,15 +1955,22 @@
         <p:spPr/>
         <p:txBody>
           <a:bodyPr/>
-          <a:lstStyle/>
-          <a:p>
-            <a:endParaRPr lang="en-US"/>
-          </a:p>
-        </p:txBody>
-      </p:sp>
-      <p:sp>
-        <p:nvSpPr>
-          <p:cNvPr id="9" name="Slide Number Placeholder 8"/>
+          <a:lstStyle>
+            <a:lvl1pPr>
+              <a:defRPr/>
+            </a:lvl1pPr>
+          </a:lstStyle>
+          <a:p>
+            <a:pPr>
+              <a:defRPr/>
+            </a:pPr>
+            <a:endParaRPr lang="en-US"/>
+          </a:p>
+        </p:txBody>
+      </p:sp>
+      <p:sp>
+        <p:nvSpPr>
+          <p:cNvPr id="9" name="Slide Number Placeholder 5"/>
           <p:cNvSpPr>
             <a:spLocks noGrp="1"/>
           </p:cNvSpPr>
@@ -1785,11 +1981,20 @@
         <p:spPr/>
         <p:txBody>
           <a:bodyPr/>
-          <a:lstStyle/>
-          <a:p>
-            <a:fld id="{8683ECDB-7790-CD47-A480-1CA096506802}" type="slidenum">
-              <a:rPr lang="en-US" smtClean="0"/>
-              <a:pPr/>
+          <a:lstStyle>
+            <a:lvl1pPr>
+              <a:defRPr/>
+            </a:lvl1pPr>
+          </a:lstStyle>
+          <a:p>
+            <a:pPr>
+              <a:defRPr/>
+            </a:pPr>
+            <a:fld id="{AA45CA4C-7773-4BB3-92F9-3B1E2FCC57F3}" type="slidenum">
+              <a:rPr lang="en-US"/>
+              <a:pPr>
+                <a:defRPr/>
+              </a:pPr>
               <a:t>‹#›</a:t>
             </a:fld>
             <a:endParaRPr lang="en-US"/>
@@ -1805,7 +2010,7 @@
 </file>
 
 <file path=ppt/slideLayouts/slideLayout6.xml><?xml version="1.0" encoding="utf-8"?>
-<p:sldLayout xmlns:a="http://schemas.openxmlformats.org/drawingml/2006/main" xmlns:r="http://schemas.openxmlformats.org/officeDocument/2006/relationships" xmlns:mc="http://schemas.openxmlformats.org/markup-compatibility/2006" xmlns:mv="urn:schemas-microsoft-com:mac:vml" xmlns:p="http://schemas.openxmlformats.org/presentationml/2006/main" mc:Ignorable="mv" mc:PreserveAttributes="mv:*" type="titleOnly" preserve="1">
+<p:sldLayout xmlns:a="http://schemas.openxmlformats.org/drawingml/2006/main" xmlns:r="http://schemas.openxmlformats.org/officeDocument/2006/relationships" xmlns:p="http://schemas.openxmlformats.org/presentationml/2006/main" type="titleOnly" preserve="1">
   <p:cSld name="Title Only">
     <p:spTree>
       <p:nvGrpSpPr>
@@ -1846,7 +2051,7 @@
       </p:sp>
       <p:sp>
         <p:nvSpPr>
-          <p:cNvPr id="3" name="Date Placeholder 2"/>
+          <p:cNvPr id="3" name="Date Placeholder 3"/>
           <p:cNvSpPr>
             <a:spLocks noGrp="1"/>
           </p:cNvSpPr>
@@ -1857,12 +2062,21 @@
         <p:spPr/>
         <p:txBody>
           <a:bodyPr/>
-          <a:lstStyle/>
-          <a:p>
-            <a:fld id="{4FCECDFD-BFFC-6141-83BB-B602E64518FB}" type="datetimeFigureOut">
-              <a:rPr lang="en-US" smtClean="0"/>
-              <a:pPr/>
-              <a:t>4/5/11</a:t>
+          <a:lstStyle>
+            <a:lvl1pPr>
+              <a:defRPr/>
+            </a:lvl1pPr>
+          </a:lstStyle>
+          <a:p>
+            <a:pPr>
+              <a:defRPr/>
+            </a:pPr>
+            <a:fld id="{25C03C68-02DE-4C4E-941A-96ECF28F7C67}" type="datetimeFigureOut">
+              <a:rPr lang="en-US"/>
+              <a:pPr>
+                <a:defRPr/>
+              </a:pPr>
+              <a:t>7/5/2012</a:t>
             </a:fld>
             <a:endParaRPr lang="en-US"/>
           </a:p>
@@ -1870,7 +2084,7 @@
       </p:sp>
       <p:sp>
         <p:nvSpPr>
-          <p:cNvPr id="4" name="Footer Placeholder 3"/>
+          <p:cNvPr id="4" name="Footer Placeholder 4"/>
           <p:cNvSpPr>
             <a:spLocks noGrp="1"/>
           </p:cNvSpPr>
@@ -1881,15 +2095,22 @@
         <p:spPr/>
         <p:txBody>
           <a:bodyPr/>
-          <a:lstStyle/>
-          <a:p>
-            <a:endParaRPr lang="en-US"/>
-          </a:p>
-        </p:txBody>
-      </p:sp>
-      <p:sp>
-        <p:nvSpPr>
-          <p:cNvPr id="5" name="Slide Number Placeholder 4"/>
+          <a:lstStyle>
+            <a:lvl1pPr>
+              <a:defRPr/>
+            </a:lvl1pPr>
+          </a:lstStyle>
+          <a:p>
+            <a:pPr>
+              <a:defRPr/>
+            </a:pPr>
+            <a:endParaRPr lang="en-US"/>
+          </a:p>
+        </p:txBody>
+      </p:sp>
+      <p:sp>
+        <p:nvSpPr>
+          <p:cNvPr id="5" name="Slide Number Placeholder 5"/>
           <p:cNvSpPr>
             <a:spLocks noGrp="1"/>
           </p:cNvSpPr>
@@ -1900,11 +2121,20 @@
         <p:spPr/>
         <p:txBody>
           <a:bodyPr/>
-          <a:lstStyle/>
-          <a:p>
-            <a:fld id="{8683ECDB-7790-CD47-A480-1CA096506802}" type="slidenum">
-              <a:rPr lang="en-US" smtClean="0"/>
-              <a:pPr/>
+          <a:lstStyle>
+            <a:lvl1pPr>
+              <a:defRPr/>
+            </a:lvl1pPr>
+          </a:lstStyle>
+          <a:p>
+            <a:pPr>
+              <a:defRPr/>
+            </a:pPr>
+            <a:fld id="{7F04C4E5-A64F-4658-BAC7-979F6381C29E}" type="slidenum">
+              <a:rPr lang="en-US"/>
+              <a:pPr>
+                <a:defRPr/>
+              </a:pPr>
               <a:t>‹#›</a:t>
             </a:fld>
             <a:endParaRPr lang="en-US"/>
@@ -1920,7 +2150,7 @@
 </file>
 
 <file path=ppt/slideLayouts/slideLayout7.xml><?xml version="1.0" encoding="utf-8"?>
-<p:sldLayout xmlns:a="http://schemas.openxmlformats.org/drawingml/2006/main" xmlns:r="http://schemas.openxmlformats.org/officeDocument/2006/relationships" xmlns:mc="http://schemas.openxmlformats.org/markup-compatibility/2006" xmlns:mv="urn:schemas-microsoft-com:mac:vml" xmlns:p="http://schemas.openxmlformats.org/presentationml/2006/main" mc:Ignorable="mv" mc:PreserveAttributes="mv:*" type="blank" preserve="1">
+<p:sldLayout xmlns:a="http://schemas.openxmlformats.org/drawingml/2006/main" xmlns:r="http://schemas.openxmlformats.org/officeDocument/2006/relationships" xmlns:p="http://schemas.openxmlformats.org/presentationml/2006/main" type="blank" preserve="1">
   <p:cSld name="Blank">
     <p:spTree>
       <p:nvGrpSpPr>
@@ -1938,7 +2168,7 @@
       </p:grpSpPr>
       <p:sp>
         <p:nvSpPr>
-          <p:cNvPr id="2" name="Date Placeholder 1"/>
+          <p:cNvPr id="2" name="Date Placeholder 3"/>
           <p:cNvSpPr>
             <a:spLocks noGrp="1"/>
           </p:cNvSpPr>
@@ -1949,12 +2179,21 @@
         <p:spPr/>
         <p:txBody>
           <a:bodyPr/>
-          <a:lstStyle/>
-          <a:p>
-            <a:fld id="{4FCECDFD-BFFC-6141-83BB-B602E64518FB}" type="datetimeFigureOut">
-              <a:rPr lang="en-US" smtClean="0"/>
-              <a:pPr/>
-              <a:t>4/5/11</a:t>
+          <a:lstStyle>
+            <a:lvl1pPr>
+              <a:defRPr/>
+            </a:lvl1pPr>
+          </a:lstStyle>
+          <a:p>
+            <a:pPr>
+              <a:defRPr/>
+            </a:pPr>
+            <a:fld id="{D9A589FA-27C3-4FD1-B7A7-82FFAEF89949}" type="datetimeFigureOut">
+              <a:rPr lang="en-US"/>
+              <a:pPr>
+                <a:defRPr/>
+              </a:pPr>
+              <a:t>7/5/2012</a:t>
             </a:fld>
             <a:endParaRPr lang="en-US"/>
           </a:p>
@@ -1962,7 +2201,7 @@
       </p:sp>
       <p:sp>
         <p:nvSpPr>
-          <p:cNvPr id="3" name="Footer Placeholder 2"/>
+          <p:cNvPr id="3" name="Footer Placeholder 4"/>
           <p:cNvSpPr>
             <a:spLocks noGrp="1"/>
           </p:cNvSpPr>
@@ -1973,15 +2212,22 @@
         <p:spPr/>
         <p:txBody>
           <a:bodyPr/>
-          <a:lstStyle/>
-          <a:p>
-            <a:endParaRPr lang="en-US"/>
-          </a:p>
-        </p:txBody>
-      </p:sp>
-      <p:sp>
-        <p:nvSpPr>
-          <p:cNvPr id="4" name="Slide Number Placeholder 3"/>
+          <a:lstStyle>
+            <a:lvl1pPr>
+              <a:defRPr/>
+            </a:lvl1pPr>
+          </a:lstStyle>
+          <a:p>
+            <a:pPr>
+              <a:defRPr/>
+            </a:pPr>
+            <a:endParaRPr lang="en-US"/>
+          </a:p>
+        </p:txBody>
+      </p:sp>
+      <p:sp>
+        <p:nvSpPr>
+          <p:cNvPr id="4" name="Slide Number Placeholder 5"/>
           <p:cNvSpPr>
             <a:spLocks noGrp="1"/>
           </p:cNvSpPr>
@@ -1992,11 +2238,20 @@
         <p:spPr/>
         <p:txBody>
           <a:bodyPr/>
-          <a:lstStyle/>
-          <a:p>
-            <a:fld id="{8683ECDB-7790-CD47-A480-1CA096506802}" type="slidenum">
-              <a:rPr lang="en-US" smtClean="0"/>
-              <a:pPr/>
+          <a:lstStyle>
+            <a:lvl1pPr>
+              <a:defRPr/>
+            </a:lvl1pPr>
+          </a:lstStyle>
+          <a:p>
+            <a:pPr>
+              <a:defRPr/>
+            </a:pPr>
+            <a:fld id="{AD2585F0-FCA0-4BA4-80AD-C2DC395DB445}" type="slidenum">
+              <a:rPr lang="en-US"/>
+              <a:pPr>
+                <a:defRPr/>
+              </a:pPr>
               <a:t>‹#›</a:t>
             </a:fld>
             <a:endParaRPr lang="en-US"/>
@@ -2012,7 +2267,7 @@
 </file>
 
 <file path=ppt/slideLayouts/slideLayout8.xml><?xml version="1.0" encoding="utf-8"?>
-<p:sldLayout xmlns:a="http://schemas.openxmlformats.org/drawingml/2006/main" xmlns:r="http://schemas.openxmlformats.org/officeDocument/2006/relationships" xmlns:mc="http://schemas.openxmlformats.org/markup-compatibility/2006" xmlns:mv="urn:schemas-microsoft-com:mac:vml" xmlns:p="http://schemas.openxmlformats.org/presentationml/2006/main" mc:Ignorable="mv" mc:PreserveAttributes="mv:*" type="objTx" preserve="1">
+<p:sldLayout xmlns:a="http://schemas.openxmlformats.org/drawingml/2006/main" xmlns:r="http://schemas.openxmlformats.org/officeDocument/2006/relationships" xmlns:p="http://schemas.openxmlformats.org/presentationml/2006/main" type="objTx" preserve="1">
   <p:cSld name="Content with Caption">
     <p:spTree>
       <p:nvGrpSpPr>
@@ -2212,7 +2467,7 @@
       </p:sp>
       <p:sp>
         <p:nvSpPr>
-          <p:cNvPr id="5" name="Date Placeholder 4"/>
+          <p:cNvPr id="5" name="Date Placeholder 3"/>
           <p:cNvSpPr>
             <a:spLocks noGrp="1"/>
           </p:cNvSpPr>
@@ -2223,12 +2478,21 @@
         <p:spPr/>
         <p:txBody>
           <a:bodyPr/>
-          <a:lstStyle/>
-          <a:p>
-            <a:fld id="{4FCECDFD-BFFC-6141-83BB-B602E64518FB}" type="datetimeFigureOut">
-              <a:rPr lang="en-US" smtClean="0"/>
-              <a:pPr/>
-              <a:t>4/5/11</a:t>
+          <a:lstStyle>
+            <a:lvl1pPr>
+              <a:defRPr/>
+            </a:lvl1pPr>
+          </a:lstStyle>
+          <a:p>
+            <a:pPr>
+              <a:defRPr/>
+            </a:pPr>
+            <a:fld id="{7B5ADE40-7230-43BF-9A60-976B754BB36D}" type="datetimeFigureOut">
+              <a:rPr lang="en-US"/>
+              <a:pPr>
+                <a:defRPr/>
+              </a:pPr>
+              <a:t>7/5/2012</a:t>
             </a:fld>
             <a:endParaRPr lang="en-US"/>
           </a:p>
@@ -2236,7 +2500,7 @@
       </p:sp>
       <p:sp>
         <p:nvSpPr>
-          <p:cNvPr id="6" name="Footer Placeholder 5"/>
+          <p:cNvPr id="6" name="Footer Placeholder 4"/>
           <p:cNvSpPr>
             <a:spLocks noGrp="1"/>
           </p:cNvSpPr>
@@ -2247,15 +2511,22 @@
         <p:spPr/>
         <p:txBody>
           <a:bodyPr/>
-          <a:lstStyle/>
-          <a:p>
-            <a:endParaRPr lang="en-US"/>
-          </a:p>
-        </p:txBody>
-      </p:sp>
-      <p:sp>
-        <p:nvSpPr>
-          <p:cNvPr id="7" name="Slide Number Placeholder 6"/>
+          <a:lstStyle>
+            <a:lvl1pPr>
+              <a:defRPr/>
+            </a:lvl1pPr>
+          </a:lstStyle>
+          <a:p>
+            <a:pPr>
+              <a:defRPr/>
+            </a:pPr>
+            <a:endParaRPr lang="en-US"/>
+          </a:p>
+        </p:txBody>
+      </p:sp>
+      <p:sp>
+        <p:nvSpPr>
+          <p:cNvPr id="7" name="Slide Number Placeholder 5"/>
           <p:cNvSpPr>
             <a:spLocks noGrp="1"/>
           </p:cNvSpPr>
@@ -2266,11 +2537,20 @@
         <p:spPr/>
         <p:txBody>
           <a:bodyPr/>
-          <a:lstStyle/>
-          <a:p>
-            <a:fld id="{8683ECDB-7790-CD47-A480-1CA096506802}" type="slidenum">
-              <a:rPr lang="en-US" smtClean="0"/>
-              <a:pPr/>
+          <a:lstStyle>
+            <a:lvl1pPr>
+              <a:defRPr/>
+            </a:lvl1pPr>
+          </a:lstStyle>
+          <a:p>
+            <a:pPr>
+              <a:defRPr/>
+            </a:pPr>
+            <a:fld id="{26D76953-EE80-4FAF-B5CF-0E397D49EF9B}" type="slidenum">
+              <a:rPr lang="en-US"/>
+              <a:pPr>
+                <a:defRPr/>
+              </a:pPr>
               <a:t>‹#›</a:t>
             </a:fld>
             <a:endParaRPr lang="en-US"/>
@@ -2286,7 +2566,7 @@
 </file>
 
 <file path=ppt/slideLayouts/slideLayout9.xml><?xml version="1.0" encoding="utf-8"?>
-<p:sldLayout xmlns:a="http://schemas.openxmlformats.org/drawingml/2006/main" xmlns:r="http://schemas.openxmlformats.org/officeDocument/2006/relationships" xmlns:mc="http://schemas.openxmlformats.org/markup-compatibility/2006" xmlns:mv="urn:schemas-microsoft-com:mac:vml" xmlns:p="http://schemas.openxmlformats.org/presentationml/2006/main" mc:Ignorable="mv" mc:PreserveAttributes="mv:*" type="picTx" preserve="1">
+<p:sldLayout xmlns:a="http://schemas.openxmlformats.org/drawingml/2006/main" xmlns:r="http://schemas.openxmlformats.org/officeDocument/2006/relationships" xmlns:p="http://schemas.openxmlformats.org/presentationml/2006/main" type="picTx" preserve="1">
   <p:cSld name="Picture with Caption">
     <p:spTree>
       <p:nvGrpSpPr>
@@ -2351,7 +2631,9 @@
           </a:xfrm>
         </p:spPr>
         <p:txBody>
-          <a:bodyPr/>
+          <a:bodyPr rtlCol="0">
+            <a:normAutofit/>
+          </a:bodyPr>
           <a:lstStyle>
             <a:lvl1pPr marL="0" indent="0">
               <a:buNone/>
@@ -2391,7 +2673,8 @@
             </a:lvl9pPr>
           </a:lstStyle>
           <a:p>
-            <a:endParaRPr lang="en-US"/>
+            <a:pPr lvl="0"/>
+            <a:endParaRPr lang="en-US" noProof="0"/>
           </a:p>
         </p:txBody>
       </p:sp>
@@ -2462,7 +2745,7 @@
       </p:sp>
       <p:sp>
         <p:nvSpPr>
-          <p:cNvPr id="5" name="Date Placeholder 4"/>
+          <p:cNvPr id="5" name="Date Placeholder 3"/>
           <p:cNvSpPr>
             <a:spLocks noGrp="1"/>
           </p:cNvSpPr>
@@ -2473,12 +2756,21 @@
         <p:spPr/>
         <p:txBody>
           <a:bodyPr/>
-          <a:lstStyle/>
-          <a:p>
-            <a:fld id="{4FCECDFD-BFFC-6141-83BB-B602E64518FB}" type="datetimeFigureOut">
-              <a:rPr lang="en-US" smtClean="0"/>
-              <a:pPr/>
-              <a:t>4/5/11</a:t>
+          <a:lstStyle>
+            <a:lvl1pPr>
+              <a:defRPr/>
+            </a:lvl1pPr>
+          </a:lstStyle>
+          <a:p>
+            <a:pPr>
+              <a:defRPr/>
+            </a:pPr>
+            <a:fld id="{FEFFC9D6-420E-4A04-BCC6-71D068D97AFE}" type="datetimeFigureOut">
+              <a:rPr lang="en-US"/>
+              <a:pPr>
+                <a:defRPr/>
+              </a:pPr>
+              <a:t>7/5/2012</a:t>
             </a:fld>
             <a:endParaRPr lang="en-US"/>
           </a:p>
@@ -2486,7 +2778,7 @@
       </p:sp>
       <p:sp>
         <p:nvSpPr>
-          <p:cNvPr id="6" name="Footer Placeholder 5"/>
+          <p:cNvPr id="6" name="Footer Placeholder 4"/>
           <p:cNvSpPr>
             <a:spLocks noGrp="1"/>
           </p:cNvSpPr>
@@ -2497,15 +2789,22 @@
         <p:spPr/>
         <p:txBody>
           <a:bodyPr/>
-          <a:lstStyle/>
-          <a:p>
-            <a:endParaRPr lang="en-US"/>
-          </a:p>
-        </p:txBody>
-      </p:sp>
-      <p:sp>
-        <p:nvSpPr>
-          <p:cNvPr id="7" name="Slide Number Placeholder 6"/>
+          <a:lstStyle>
+            <a:lvl1pPr>
+              <a:defRPr/>
+            </a:lvl1pPr>
+          </a:lstStyle>
+          <a:p>
+            <a:pPr>
+              <a:defRPr/>
+            </a:pPr>
+            <a:endParaRPr lang="en-US"/>
+          </a:p>
+        </p:txBody>
+      </p:sp>
+      <p:sp>
+        <p:nvSpPr>
+          <p:cNvPr id="7" name="Slide Number Placeholder 5"/>
           <p:cNvSpPr>
             <a:spLocks noGrp="1"/>
           </p:cNvSpPr>
@@ -2516,11 +2815,20 @@
         <p:spPr/>
         <p:txBody>
           <a:bodyPr/>
-          <a:lstStyle/>
-          <a:p>
-            <a:fld id="{8683ECDB-7790-CD47-A480-1CA096506802}" type="slidenum">
-              <a:rPr lang="en-US" smtClean="0"/>
-              <a:pPr/>
+          <a:lstStyle>
+            <a:lvl1pPr>
+              <a:defRPr/>
+            </a:lvl1pPr>
+          </a:lstStyle>
+          <a:p>
+            <a:pPr>
+              <a:defRPr/>
+            </a:pPr>
+            <a:fld id="{5E817595-02ED-404B-B6B7-34656E1A59B0}" type="slidenum">
+              <a:rPr lang="en-US"/>
+              <a:pPr>
+                <a:defRPr/>
+              </a:pPr>
               <a:t>‹#›</a:t>
             </a:fld>
             <a:endParaRPr lang="en-US"/>
@@ -2536,7 +2844,7 @@
 </file>
 
 <file path=ppt/slideMasters/slideMaster1.xml><?xml version="1.0" encoding="utf-8"?>
-<p:sldMaster xmlns:a="http://schemas.openxmlformats.org/drawingml/2006/main" xmlns:r="http://schemas.openxmlformats.org/officeDocument/2006/relationships" xmlns:mc="http://schemas.openxmlformats.org/markup-compatibility/2006" xmlns:mv="urn:schemas-microsoft-com:mac:vml" xmlns:p="http://schemas.openxmlformats.org/presentationml/2006/main" mc:Ignorable="mv" mc:PreserveAttributes="mv:*">
+<p:sldMaster xmlns:a="http://schemas.openxmlformats.org/drawingml/2006/main" xmlns:r="http://schemas.openxmlformats.org/officeDocument/2006/relationships" xmlns:p="http://schemas.openxmlformats.org/presentationml/2006/main">
   <p:cSld>
     <p:bg>
       <p:bgRef idx="1001">
@@ -2559,7 +2867,7 @@
       </p:grpSpPr>
       <p:sp>
         <p:nvSpPr>
-          <p:cNvPr id="2" name="Title Placeholder 1"/>
+          <p:cNvPr id="1026" name="Title Placeholder 1"/>
           <p:cNvSpPr>
             <a:spLocks noGrp="1"/>
           </p:cNvSpPr>
@@ -2567,7 +2875,7 @@
             <p:ph type="title"/>
           </p:nvPr>
         </p:nvSpPr>
-        <p:spPr>
+        <p:spPr bwMode="auto">
           <a:xfrm>
             <a:off x="457200" y="274638"/>
             <a:ext cx="8229600" cy="1143000"/>
@@ -2575,24 +2883,33 @@
           <a:prstGeom prst="rect">
             <a:avLst/>
           </a:prstGeom>
-        </p:spPr>
-        <p:txBody>
-          <a:bodyPr vert="horz" lIns="91440" tIns="45720" rIns="91440" bIns="45720" rtlCol="0" anchor="ctr">
-            <a:normAutofit/>
+          <a:noFill/>
+          <a:ln w="9525">
+            <a:noFill/>
+            <a:miter lim="800000"/>
+            <a:headEnd/>
+            <a:tailEnd/>
+          </a:ln>
+        </p:spPr>
+        <p:txBody>
+          <a:bodyPr vert="horz" wrap="square" lIns="91440" tIns="45720" rIns="91440" bIns="45720" numCol="1" anchor="ctr" anchorCtr="0" compatLnSpc="1">
+            <a:prstTxWarp prst="textNoShape">
+              <a:avLst/>
+            </a:prstTxWarp>
           </a:bodyPr>
           <a:lstStyle/>
           <a:p>
+            <a:pPr lvl="0"/>
             <a:r>
               <a:rPr lang="en-US" smtClean="0"/>
               <a:t>Click to edit Master title style</a:t>
             </a:r>
-            <a:endParaRPr lang="en-US"/>
-          </a:p>
-        </p:txBody>
-      </p:sp>
-      <p:sp>
-        <p:nvSpPr>
-          <p:cNvPr id="3" name="Text Placeholder 2"/>
+          </a:p>
+        </p:txBody>
+      </p:sp>
+      <p:sp>
+        <p:nvSpPr>
+          <p:cNvPr id="1027" name="Text Placeholder 2"/>
           <p:cNvSpPr>
             <a:spLocks noGrp="1"/>
           </p:cNvSpPr>
@@ -2600,7 +2917,7 @@
             <p:ph type="body" idx="1"/>
           </p:nvPr>
         </p:nvSpPr>
-        <p:spPr>
+        <p:spPr bwMode="auto">
           <a:xfrm>
             <a:off x="457200" y="1600200"/>
             <a:ext cx="8229600" cy="4525963"/>
@@ -2608,10 +2925,19 @@
           <a:prstGeom prst="rect">
             <a:avLst/>
           </a:prstGeom>
-        </p:spPr>
-        <p:txBody>
-          <a:bodyPr vert="horz" lIns="91440" tIns="45720" rIns="91440" bIns="45720" rtlCol="0">
-            <a:normAutofit/>
+          <a:noFill/>
+          <a:ln w="9525">
+            <a:noFill/>
+            <a:miter lim="800000"/>
+            <a:headEnd/>
+            <a:tailEnd/>
+          </a:ln>
+        </p:spPr>
+        <p:txBody>
+          <a:bodyPr vert="horz" wrap="square" lIns="91440" tIns="45720" rIns="91440" bIns="45720" numCol="1" anchor="t" anchorCtr="0" compatLnSpc="1">
+            <a:prstTxWarp prst="textNoShape">
+              <a:avLst/>
+            </a:prstTxWarp>
           </a:bodyPr>
           <a:lstStyle/>
           <a:p>
@@ -2648,7 +2974,6 @@
               <a:rPr lang="en-US" smtClean="0"/>
               <a:t>Fifth level</a:t>
             </a:r>
-            <a:endParaRPr lang="en-US"/>
           </a:p>
         </p:txBody>
       </p:sp>
@@ -2674,40 +2999,101 @@
         <p:txBody>
           <a:bodyPr vert="horz" lIns="91440" tIns="45720" rIns="91440" bIns="45720" rtlCol="0" anchor="ctr"/>
           <a:lstStyle>
-            <a:lvl1pPr algn="l">
+            <a:lvl1pPr algn="l" fontAlgn="auto">
+              <a:spcBef>
+                <a:spcPts val="0"/>
+              </a:spcBef>
+              <a:spcAft>
+                <a:spcPts val="0"/>
+              </a:spcAft>
+              <a:defRPr sz="1200" smtClean="0">
+                <a:solidFill>
+                  <a:schemeClr val="tx1">
+                    <a:tint val="75000"/>
+                  </a:schemeClr>
+                </a:solidFill>
+                <a:latin typeface="+mn-lt"/>
+                <a:cs typeface="+mn-cs"/>
+              </a:defRPr>
+            </a:lvl1pPr>
+          </a:lstStyle>
+          <a:p>
+            <a:pPr>
+              <a:defRPr/>
+            </a:pPr>
+            <a:fld id="{53920EE2-9CA1-4F3F-9FD5-0673D5D0DB53}" type="datetimeFigureOut">
+              <a:rPr lang="en-US"/>
+              <a:pPr>
+                <a:defRPr/>
+              </a:pPr>
+              <a:t>7/5/2012</a:t>
+            </a:fld>
+            <a:endParaRPr lang="en-US"/>
+          </a:p>
+        </p:txBody>
+      </p:sp>
+      <p:sp>
+        <p:nvSpPr>
+          <p:cNvPr id="5" name="Footer Placeholder 4"/>
+          <p:cNvSpPr>
+            <a:spLocks noGrp="1"/>
+          </p:cNvSpPr>
+          <p:nvPr>
+            <p:ph type="ftr" sz="quarter" idx="3"/>
+          </p:nvPr>
+        </p:nvSpPr>
+        <p:spPr>
+          <a:xfrm>
+            <a:off x="3124200" y="6356350"/>
+            <a:ext cx="2895600" cy="365125"/>
+          </a:xfrm>
+          <a:prstGeom prst="rect">
+            <a:avLst/>
+          </a:prstGeom>
+        </p:spPr>
+        <p:txBody>
+          <a:bodyPr vert="horz" lIns="91440" tIns="45720" rIns="91440" bIns="45720" rtlCol="0" anchor="ctr"/>
+          <a:lstStyle>
+            <a:lvl1pPr algn="ctr" fontAlgn="auto">
+              <a:spcBef>
+                <a:spcPts val="0"/>
+              </a:spcBef>
+              <a:spcAft>
+                <a:spcPts val="0"/>
+              </a:spcAft>
               <a:defRPr sz="1200">
                 <a:solidFill>
                   <a:schemeClr val="tx1">
                     <a:tint val="75000"/>
                   </a:schemeClr>
                 </a:solidFill>
+                <a:latin typeface="+mn-lt"/>
+                <a:cs typeface="+mn-cs"/>
               </a:defRPr>
             </a:lvl1pPr>
           </a:lstStyle>
           <a:p>
-            <a:fld id="{4FCECDFD-BFFC-6141-83BB-B602E64518FB}" type="datetimeFigureOut">
-              <a:rPr lang="en-US" smtClean="0"/>
-              <a:pPr/>
-              <a:t>4/5/11</a:t>
-            </a:fld>
-            <a:endParaRPr lang="en-US"/>
-          </a:p>
-        </p:txBody>
-      </p:sp>
-      <p:sp>
-        <p:nvSpPr>
-          <p:cNvPr id="5" name="Footer Placeholder 4"/>
-          <p:cNvSpPr>
-            <a:spLocks noGrp="1"/>
-          </p:cNvSpPr>
-          <p:nvPr>
-            <p:ph type="ftr" sz="quarter" idx="3"/>
+            <a:pPr>
+              <a:defRPr/>
+            </a:pPr>
+            <a:endParaRPr lang="en-US"/>
+          </a:p>
+        </p:txBody>
+      </p:sp>
+      <p:sp>
+        <p:nvSpPr>
+          <p:cNvPr id="6" name="Slide Number Placeholder 5"/>
+          <p:cNvSpPr>
+            <a:spLocks noGrp="1"/>
+          </p:cNvSpPr>
+          <p:nvPr>
+            <p:ph type="sldNum" sz="quarter" idx="4"/>
           </p:nvPr>
         </p:nvSpPr>
         <p:spPr>
           <a:xfrm>
-            <a:off x="3124200" y="6356350"/>
-            <a:ext cx="2895600" cy="365125"/>
+            <a:off x="6553200" y="6356350"/>
+            <a:ext cx="2133600" cy="365125"/>
           </a:xfrm>
           <a:prstGeom prst="rect">
             <a:avLst/>
@@ -2716,57 +3102,33 @@
         <p:txBody>
           <a:bodyPr vert="horz" lIns="91440" tIns="45720" rIns="91440" bIns="45720" rtlCol="0" anchor="ctr"/>
           <a:lstStyle>
-            <a:lvl1pPr algn="ctr">
-              <a:defRPr sz="1200">
+            <a:lvl1pPr algn="r" fontAlgn="auto">
+              <a:spcBef>
+                <a:spcPts val="0"/>
+              </a:spcBef>
+              <a:spcAft>
+                <a:spcPts val="0"/>
+              </a:spcAft>
+              <a:defRPr sz="1200" smtClean="0">
                 <a:solidFill>
                   <a:schemeClr val="tx1">
                     <a:tint val="75000"/>
                   </a:schemeClr>
                 </a:solidFill>
+                <a:latin typeface="+mn-lt"/>
+                <a:cs typeface="+mn-cs"/>
               </a:defRPr>
             </a:lvl1pPr>
           </a:lstStyle>
           <a:p>
-            <a:endParaRPr lang="en-US"/>
-          </a:p>
-        </p:txBody>
-      </p:sp>
-      <p:sp>
-        <p:nvSpPr>
-          <p:cNvPr id="6" name="Slide Number Placeholder 5"/>
-          <p:cNvSpPr>
-            <a:spLocks noGrp="1"/>
-          </p:cNvSpPr>
-          <p:nvPr>
-            <p:ph type="sldNum" sz="quarter" idx="4"/>
-          </p:nvPr>
-        </p:nvSpPr>
-        <p:spPr>
-          <a:xfrm>
-            <a:off x="6553200" y="6356350"/>
-            <a:ext cx="2133600" cy="365125"/>
-          </a:xfrm>
-          <a:prstGeom prst="rect">
-            <a:avLst/>
-          </a:prstGeom>
-        </p:spPr>
-        <p:txBody>
-          <a:bodyPr vert="horz" lIns="91440" tIns="45720" rIns="91440" bIns="45720" rtlCol="0" anchor="ctr"/>
-          <a:lstStyle>
-            <a:lvl1pPr algn="r">
-              <a:defRPr sz="1200">
-                <a:solidFill>
-                  <a:schemeClr val="tx1">
-                    <a:tint val="75000"/>
-                  </a:schemeClr>
-                </a:solidFill>
-              </a:defRPr>
-            </a:lvl1pPr>
-          </a:lstStyle>
-          <a:p>
-            <a:fld id="{8683ECDB-7790-CD47-A480-1CA096506802}" type="slidenum">
-              <a:rPr lang="en-US" smtClean="0"/>
-              <a:pPr/>
+            <a:pPr>
+              <a:defRPr/>
+            </a:pPr>
+            <a:fld id="{ABFE99C4-9921-4EC1-B89D-4BB7C5D58CB9}" type="slidenum">
+              <a:rPr lang="en-US"/>
+              <a:pPr>
+                <a:defRPr/>
+              </a:pPr>
               <a:t>‹#›</a:t>
             </a:fld>
             <a:endParaRPr lang="en-US"/>
@@ -2777,25 +3139,27 @@
   </p:cSld>
   <p:clrMap bg1="lt1" tx1="dk1" bg2="lt2" tx2="dk2" accent1="accent1" accent2="accent2" accent3="accent3" accent4="accent4" accent5="accent5" accent6="accent6" hlink="hlink" folHlink="folHlink"/>
   <p:sldLayoutIdLst>
-    <p:sldLayoutId id="2147483649" r:id="rId1"/>
-    <p:sldLayoutId id="2147483650" r:id="rId2"/>
-    <p:sldLayoutId id="2147483651" r:id="rId3"/>
-    <p:sldLayoutId id="2147483652" r:id="rId4"/>
-    <p:sldLayoutId id="2147483653" r:id="rId5"/>
+    <p:sldLayoutId id="2147483659" r:id="rId1"/>
+    <p:sldLayoutId id="2147483658" r:id="rId2"/>
+    <p:sldLayoutId id="2147483657" r:id="rId3"/>
+    <p:sldLayoutId id="2147483656" r:id="rId4"/>
+    <p:sldLayoutId id="2147483655" r:id="rId5"/>
     <p:sldLayoutId id="2147483654" r:id="rId6"/>
-    <p:sldLayoutId id="2147483655" r:id="rId7"/>
-    <p:sldLayoutId id="2147483656" r:id="rId8"/>
-    <p:sldLayoutId id="2147483657" r:id="rId9"/>
-    <p:sldLayoutId id="2147483658" r:id="rId10"/>
-    <p:sldLayoutId id="2147483659" r:id="rId11"/>
+    <p:sldLayoutId id="2147483653" r:id="rId7"/>
+    <p:sldLayoutId id="2147483652" r:id="rId8"/>
+    <p:sldLayoutId id="2147483651" r:id="rId9"/>
+    <p:sldLayoutId id="2147483650" r:id="rId10"/>
+    <p:sldLayoutId id="2147483649" r:id="rId11"/>
   </p:sldLayoutIdLst>
   <p:txStyles>
     <p:titleStyle>
-      <a:lvl1pPr algn="ctr" defTabSz="457200" rtl="0" eaLnBrk="1" latinLnBrk="0" hangingPunct="1">
+      <a:lvl1pPr algn="ctr" defTabSz="457200" rtl="0" fontAlgn="base">
         <a:spcBef>
           <a:spcPct val="0"/>
         </a:spcBef>
-        <a:buNone/>
+        <a:spcAft>
+          <a:spcPct val="0"/>
+        </a:spcAft>
         <a:defRPr sz="4400" kern="1200">
           <a:solidFill>
             <a:schemeClr val="tx1"/>
@@ -2805,13 +3169,128 @@
           <a:cs typeface="+mj-cs"/>
         </a:defRPr>
       </a:lvl1pPr>
+      <a:lvl2pPr algn="ctr" defTabSz="457200" rtl="0" fontAlgn="base">
+        <a:spcBef>
+          <a:spcPct val="0"/>
+        </a:spcBef>
+        <a:spcAft>
+          <a:spcPct val="0"/>
+        </a:spcAft>
+        <a:defRPr sz="4400">
+          <a:solidFill>
+            <a:schemeClr val="tx1"/>
+          </a:solidFill>
+          <a:latin typeface="Calibri" pitchFamily="34" charset="0"/>
+        </a:defRPr>
+      </a:lvl2pPr>
+      <a:lvl3pPr algn="ctr" defTabSz="457200" rtl="0" fontAlgn="base">
+        <a:spcBef>
+          <a:spcPct val="0"/>
+        </a:spcBef>
+        <a:spcAft>
+          <a:spcPct val="0"/>
+        </a:spcAft>
+        <a:defRPr sz="4400">
+          <a:solidFill>
+            <a:schemeClr val="tx1"/>
+          </a:solidFill>
+          <a:latin typeface="Calibri" pitchFamily="34" charset="0"/>
+        </a:defRPr>
+      </a:lvl3pPr>
+      <a:lvl4pPr algn="ctr" defTabSz="457200" rtl="0" fontAlgn="base">
+        <a:spcBef>
+          <a:spcPct val="0"/>
+        </a:spcBef>
+        <a:spcAft>
+          <a:spcPct val="0"/>
+        </a:spcAft>
+        <a:defRPr sz="4400">
+          <a:solidFill>
+            <a:schemeClr val="tx1"/>
+          </a:solidFill>
+          <a:latin typeface="Calibri" pitchFamily="34" charset="0"/>
+        </a:defRPr>
+      </a:lvl4pPr>
+      <a:lvl5pPr algn="ctr" defTabSz="457200" rtl="0" fontAlgn="base">
+        <a:spcBef>
+          <a:spcPct val="0"/>
+        </a:spcBef>
+        <a:spcAft>
+          <a:spcPct val="0"/>
+        </a:spcAft>
+        <a:defRPr sz="4400">
+          <a:solidFill>
+            <a:schemeClr val="tx1"/>
+          </a:solidFill>
+          <a:latin typeface="Calibri" pitchFamily="34" charset="0"/>
+        </a:defRPr>
+      </a:lvl5pPr>
+      <a:lvl6pPr marL="457200" algn="ctr" defTabSz="457200" rtl="0" fontAlgn="base">
+        <a:spcBef>
+          <a:spcPct val="0"/>
+        </a:spcBef>
+        <a:spcAft>
+          <a:spcPct val="0"/>
+        </a:spcAft>
+        <a:defRPr sz="4400">
+          <a:solidFill>
+            <a:schemeClr val="tx1"/>
+          </a:solidFill>
+          <a:latin typeface="Calibri" pitchFamily="34" charset="0"/>
+        </a:defRPr>
+      </a:lvl6pPr>
+      <a:lvl7pPr marL="914400" algn="ctr" defTabSz="457200" rtl="0" fontAlgn="base">
+        <a:spcBef>
+          <a:spcPct val="0"/>
+        </a:spcBef>
+        <a:spcAft>
+          <a:spcPct val="0"/>
+        </a:spcAft>
+        <a:defRPr sz="4400">
+          <a:solidFill>
+            <a:schemeClr val="tx1"/>
+          </a:solidFill>
+          <a:latin typeface="Calibri" pitchFamily="34" charset="0"/>
+        </a:defRPr>
+      </a:lvl7pPr>
+      <a:lvl8pPr marL="1371600" algn="ctr" defTabSz="457200" rtl="0" fontAlgn="base">
+        <a:spcBef>
+          <a:spcPct val="0"/>
+        </a:spcBef>
+        <a:spcAft>
+          <a:spcPct val="0"/>
+        </a:spcAft>
+        <a:defRPr sz="4400">
+          <a:solidFill>
+            <a:schemeClr val="tx1"/>
+          </a:solidFill>
+          <a:latin typeface="Calibri" pitchFamily="34" charset="0"/>
+        </a:defRPr>
+      </a:lvl8pPr>
+      <a:lvl9pPr marL="1828800" algn="ctr" defTabSz="457200" rtl="0" fontAlgn="base">
+        <a:spcBef>
+          <a:spcPct val="0"/>
+        </a:spcBef>
+        <a:spcAft>
+          <a:spcPct val="0"/>
+        </a:spcAft>
+        <a:defRPr sz="4400">
+          <a:solidFill>
+            <a:schemeClr val="tx1"/>
+          </a:solidFill>
+          <a:latin typeface="Calibri" pitchFamily="34" charset="0"/>
+        </a:defRPr>
+      </a:lvl9pPr>
     </p:titleStyle>
     <p:bodyStyle>
-      <a:lvl1pPr marL="342900" indent="-342900" algn="l" defTabSz="457200" rtl="0" eaLnBrk="1" latinLnBrk="0" hangingPunct="1">
+      <a:lvl1pPr marL="342900" indent="-342900" algn="l" defTabSz="457200" rtl="0" fontAlgn="base">
         <a:spcBef>
           <a:spcPct val="20000"/>
         </a:spcBef>
-        <a:buFont typeface="Arial"/>
+        <a:spcAft>
+          <a:spcPct val="0"/>
+        </a:spcAft>
+        <a:buFont typeface="Arial" charset="0"/>
         <a:buChar char="•"/>
         <a:defRPr sz="3200" kern="1200">
           <a:solidFill>
@@ -2822,11 +3301,14 @@
           <a:cs typeface="+mn-cs"/>
         </a:defRPr>
       </a:lvl1pPr>
-      <a:lvl2pPr marL="742950" indent="-285750" algn="l" defTabSz="457200" rtl="0" eaLnBrk="1" latinLnBrk="0" hangingPunct="1">
+      <a:lvl2pPr marL="742950" indent="-285750" algn="l" defTabSz="457200" rtl="0" fontAlgn="base">
         <a:spcBef>
           <a:spcPct val="20000"/>
         </a:spcBef>
-        <a:buFont typeface="Arial"/>
+        <a:spcAft>
+          <a:spcPct val="0"/>
+        </a:spcAft>
+        <a:buFont typeface="Arial" charset="0"/>
         <a:buChar char="–"/>
         <a:defRPr sz="2800" kern="1200">
           <a:solidFill>
@@ -2837,11 +3319,14 @@
           <a:cs typeface="+mn-cs"/>
         </a:defRPr>
       </a:lvl2pPr>
-      <a:lvl3pPr marL="1143000" indent="-228600" algn="l" defTabSz="457200" rtl="0" eaLnBrk="1" latinLnBrk="0" hangingPunct="1">
+      <a:lvl3pPr marL="1143000" indent="-228600" algn="l" defTabSz="457200" rtl="0" fontAlgn="base">
         <a:spcBef>
           <a:spcPct val="20000"/>
         </a:spcBef>
-        <a:buFont typeface="Arial"/>
+        <a:spcAft>
+          <a:spcPct val="0"/>
+        </a:spcAft>
+        <a:buFont typeface="Arial" charset="0"/>
         <a:buChar char="•"/>
         <a:defRPr sz="2400" kern="1200">
           <a:solidFill>
@@ -2852,11 +3337,14 @@
           <a:cs typeface="+mn-cs"/>
         </a:defRPr>
       </a:lvl3pPr>
-      <a:lvl4pPr marL="1600200" indent="-228600" algn="l" defTabSz="457200" rtl="0" eaLnBrk="1" latinLnBrk="0" hangingPunct="1">
+      <a:lvl4pPr marL="1600200" indent="-228600" algn="l" defTabSz="457200" rtl="0" fontAlgn="base">
         <a:spcBef>
           <a:spcPct val="20000"/>
         </a:spcBef>
-        <a:buFont typeface="Arial"/>
+        <a:spcAft>
+          <a:spcPct val="0"/>
+        </a:spcAft>
+        <a:buFont typeface="Arial" charset="0"/>
         <a:buChar char="–"/>
         <a:defRPr sz="2000" kern="1200">
           <a:solidFill>
@@ -2867,11 +3355,14 @@
           <a:cs typeface="+mn-cs"/>
         </a:defRPr>
       </a:lvl4pPr>
-      <a:lvl5pPr marL="2057400" indent="-228600" algn="l" defTabSz="457200" rtl="0" eaLnBrk="1" latinLnBrk="0" hangingPunct="1">
+      <a:lvl5pPr marL="2057400" indent="-228600" algn="l" defTabSz="457200" rtl="0" fontAlgn="base">
         <a:spcBef>
           <a:spcPct val="20000"/>
         </a:spcBef>
-        <a:buFont typeface="Arial"/>
+        <a:spcAft>
+          <a:spcPct val="0"/>
+        </a:spcAft>
+        <a:buFont typeface="Arial" charset="0"/>
         <a:buChar char="»"/>
         <a:defRPr sz="2000" kern="1200">
           <a:solidFill>
@@ -3043,7 +3534,7 @@
 </file>
 
 <file path=ppt/slides/slide1.xml><?xml version="1.0" encoding="utf-8"?>
-<p:sld xmlns:a="http://schemas.openxmlformats.org/drawingml/2006/main" xmlns:r="http://schemas.openxmlformats.org/officeDocument/2006/relationships" xmlns:mc="http://schemas.openxmlformats.org/markup-compatibility/2006" xmlns:mv="urn:schemas-microsoft-com:mac:vml" xmlns:p="http://schemas.openxmlformats.org/presentationml/2006/main" mc:Ignorable="mv" mc:PreserveAttributes="mv:*">
+<p:sld xmlns:a="http://schemas.openxmlformats.org/drawingml/2006/main" xmlns:r="http://schemas.openxmlformats.org/officeDocument/2006/relationships" xmlns:p="http://schemas.openxmlformats.org/presentationml/2006/main">
   <p:cSld>
     <p:spTree>
       <p:nvGrpSpPr>
@@ -3061,14 +3552,14 @@
       </p:grpSpPr>
       <p:sp>
         <p:nvSpPr>
-          <p:cNvPr id="4" name="Rectangle 3"/>
+          <p:cNvPr id="6" name="Rectangle 5"/>
           <p:cNvSpPr/>
           <p:nvPr/>
         </p:nvSpPr>
         <p:spPr>
           <a:xfrm>
-            <a:off x="2590800" y="1905000"/>
-            <a:ext cx="2133600" cy="609600"/>
+            <a:off x="3121025" y="3216275"/>
+            <a:ext cx="612775" cy="650875"/>
           </a:xfrm>
           <a:prstGeom prst="rect">
             <a:avLst/>
@@ -3099,23 +3590,31 @@
           </a:fontRef>
         </p:style>
         <p:txBody>
-          <a:bodyPr rtlCol="0" anchor="ctr"/>
+          <a:bodyPr anchor="ctr"/>
           <a:lstStyle/>
           <a:p>
-            <a:pPr algn="ctr"/>
-            <a:endParaRPr lang="en-US" dirty="0"/>
-          </a:p>
-        </p:txBody>
-      </p:sp>
-      <p:sp>
-        <p:nvSpPr>
-          <p:cNvPr id="5" name="Rectangle 4"/>
+            <a:pPr algn="ctr" fontAlgn="auto">
+              <a:spcBef>
+                <a:spcPts val="0"/>
+              </a:spcBef>
+              <a:spcAft>
+                <a:spcPts val="0"/>
+              </a:spcAft>
+              <a:defRPr/>
+            </a:pPr>
+            <a:endParaRPr lang="en-US"/>
+          </a:p>
+        </p:txBody>
+      </p:sp>
+      <p:sp>
+        <p:nvSpPr>
+          <p:cNvPr id="4" name="Rectangle 3"/>
           <p:cNvSpPr/>
           <p:nvPr/>
         </p:nvSpPr>
         <p:spPr>
           <a:xfrm>
-            <a:off x="1066800" y="685800"/>
+            <a:off x="1676400" y="1863725"/>
             <a:ext cx="2133600" cy="609600"/>
           </a:xfrm>
           <a:prstGeom prst="rect">
@@ -3147,23 +3646,31 @@
           </a:fontRef>
         </p:style>
         <p:txBody>
-          <a:bodyPr rtlCol="0" anchor="ctr"/>
+          <a:bodyPr anchor="ctr"/>
           <a:lstStyle/>
           <a:p>
-            <a:pPr algn="ctr"/>
-            <a:endParaRPr lang="en-US"/>
-          </a:p>
-        </p:txBody>
-      </p:sp>
-      <p:sp>
-        <p:nvSpPr>
-          <p:cNvPr id="6" name="Rectangle 5"/>
+            <a:pPr algn="ctr" fontAlgn="auto">
+              <a:spcBef>
+                <a:spcPts val="0"/>
+              </a:spcBef>
+              <a:spcAft>
+                <a:spcPts val="0"/>
+              </a:spcAft>
+              <a:defRPr/>
+            </a:pPr>
+            <a:endParaRPr lang="en-US" dirty="0"/>
+          </a:p>
+        </p:txBody>
+      </p:sp>
+      <p:sp>
+        <p:nvSpPr>
+          <p:cNvPr id="5" name="Rectangle 4"/>
           <p:cNvSpPr/>
           <p:nvPr/>
         </p:nvSpPr>
         <p:spPr>
           <a:xfrm>
-            <a:off x="4038600" y="3124200"/>
+            <a:off x="152400" y="644525"/>
             <a:ext cx="2133600" cy="609600"/>
           </a:xfrm>
           <a:prstGeom prst="rect">
@@ -3195,10 +3702,18 @@
           </a:fontRef>
         </p:style>
         <p:txBody>
-          <a:bodyPr rtlCol="0" anchor="ctr"/>
+          <a:bodyPr anchor="ctr"/>
           <a:lstStyle/>
           <a:p>
-            <a:pPr algn="ctr"/>
+            <a:pPr algn="ctr" fontAlgn="auto">
+              <a:spcBef>
+                <a:spcPts val="0"/>
+              </a:spcBef>
+              <a:spcAft>
+                <a:spcPts val="0"/>
+              </a:spcAft>
+              <a:defRPr/>
+            </a:pPr>
             <a:endParaRPr lang="en-US"/>
           </a:p>
         </p:txBody>
@@ -3211,7 +3726,7 @@
         </p:nvSpPr>
         <p:spPr>
           <a:xfrm>
-            <a:off x="5562600" y="4343400"/>
+            <a:off x="4284663" y="3652838"/>
             <a:ext cx="2133600" cy="609600"/>
           </a:xfrm>
           <a:prstGeom prst="rect">
@@ -3243,10 +3758,18 @@
           </a:fontRef>
         </p:style>
         <p:txBody>
-          <a:bodyPr rtlCol="0" anchor="ctr"/>
+          <a:bodyPr anchor="ctr"/>
           <a:lstStyle/>
           <a:p>
-            <a:pPr algn="ctr"/>
+            <a:pPr algn="ctr" fontAlgn="auto">
+              <a:spcBef>
+                <a:spcPts val="0"/>
+              </a:spcBef>
+              <a:spcAft>
+                <a:spcPts val="0"/>
+              </a:spcAft>
+              <a:defRPr/>
+            </a:pPr>
             <a:endParaRPr lang="en-US"/>
           </a:p>
         </p:txBody>
@@ -3262,7 +3785,7 @@
         </p:nvCxnSpPr>
         <p:spPr>
           <a:xfrm rot="16200000" flipH="1">
-            <a:off x="1905000" y="1524000"/>
+            <a:off x="990600" y="1482725"/>
             <a:ext cx="914400" cy="457200"/>
           </a:xfrm>
           <a:prstGeom prst="bentConnector2">
@@ -3294,79 +3817,74 @@
         <p:nvCxnSpPr>
           <p:cNvPr id="19" name="Shape 18"/>
           <p:cNvCxnSpPr>
+            <a:cxnSpLocks noChangeShapeType="1"/>
             <a:stCxn id="4" idx="2"/>
-            <a:endCxn id="6" idx="1"/>
           </p:cNvCxnSpPr>
           <p:nvPr/>
         </p:nvCxnSpPr>
-        <p:spPr>
+        <p:spPr bwMode="auto">
           <a:xfrm rot="16200000" flipH="1">
-            <a:off x="3390900" y="2781300"/>
-            <a:ext cx="914400" cy="381000"/>
+            <a:off x="2096293" y="3120232"/>
+            <a:ext cx="1674813" cy="381000"/>
           </a:xfrm>
           <a:prstGeom prst="bentConnector2">
             <a:avLst/>
           </a:prstGeom>
-          <a:ln>
+          <a:noFill/>
+          <a:ln w="25400" algn="ctr">
             <a:solidFill>
               <a:schemeClr val="tx1"/>
             </a:solidFill>
-            <a:tailEnd type="arrow"/>
+            <a:miter lim="800000"/>
+            <a:headEnd/>
+            <a:tailEnd type="arrow" w="med" len="med"/>
           </a:ln>
-        </p:spPr>
-        <p:style>
-          <a:lnRef idx="2">
-            <a:schemeClr val="accent1"/>
-          </a:lnRef>
-          <a:fillRef idx="0">
-            <a:schemeClr val="accent1"/>
-          </a:fillRef>
-          <a:effectRef idx="1">
-            <a:schemeClr val="accent1"/>
-          </a:effectRef>
-          <a:fontRef idx="minor">
-            <a:schemeClr val="tx1"/>
-          </a:fontRef>
-        </p:style>
+          <a:effectLst>
+            <a:outerShdw dist="20000" dir="5400000" rotWithShape="0">
+              <a:srgbClr val="000000">
+                <a:alpha val="37999"/>
+              </a:srgbClr>
+            </a:outerShdw>
+          </a:effectLst>
+        </p:spPr>
       </p:cxnSp>
       <p:cxnSp>
         <p:nvCxnSpPr>
           <p:cNvPr id="22" name="Shape 21"/>
           <p:cNvCxnSpPr>
-            <a:stCxn id="6" idx="2"/>
+            <a:cxnSpLocks noChangeShapeType="1"/>
+            <a:stCxn id="0" idx="3"/>
             <a:endCxn id="7" idx="1"/>
           </p:cNvCxnSpPr>
           <p:nvPr/>
         </p:nvCxnSpPr>
-        <p:spPr>
-          <a:xfrm rot="16200000" flipH="1">
-            <a:off x="4876800" y="3962400"/>
-            <a:ext cx="914400" cy="457200"/>
-          </a:xfrm>
-          <a:prstGeom prst="bentConnector2">
-            <a:avLst/>
+        <p:spPr bwMode="auto">
+          <a:xfrm flipV="1">
+            <a:off x="3733800" y="3957638"/>
+            <a:ext cx="550863" cy="1587"/>
+          </a:xfrm>
+          <a:prstGeom prst="bentConnector3">
+            <a:avLst>
+              <a:gd name="adj1" fmla="val 49856"/>
+            </a:avLst>
           </a:prstGeom>
-          <a:ln>
+          <a:noFill/>
+          <a:ln w="25400" algn="ctr">
             <a:solidFill>
               <a:schemeClr val="tx1"/>
             </a:solidFill>
-            <a:tailEnd type="arrow"/>
+            <a:miter lim="800000"/>
+            <a:headEnd/>
+            <a:tailEnd type="arrow" w="med" len="med"/>
           </a:ln>
-        </p:spPr>
-        <p:style>
-          <a:lnRef idx="2">
-            <a:schemeClr val="accent1"/>
-          </a:lnRef>
-          <a:fillRef idx="0">
-            <a:schemeClr val="accent1"/>
-          </a:fillRef>
-          <a:effectRef idx="1">
-            <a:schemeClr val="accent1"/>
-          </a:effectRef>
-          <a:fontRef idx="minor">
-            <a:schemeClr val="tx1"/>
-          </a:fontRef>
-        </p:style>
+          <a:effectLst>
+            <a:outerShdw dist="20000" dir="5400000" rotWithShape="0">
+              <a:srgbClr val="000000">
+                <a:alpha val="37999"/>
+              </a:srgbClr>
+            </a:outerShdw>
+          </a:effectLst>
+        </p:spPr>
       </p:cxnSp>
       <p:sp>
         <p:nvSpPr>
@@ -3376,7 +3894,7 @@
         </p:nvSpPr>
         <p:spPr>
           <a:xfrm>
-            <a:off x="5562600" y="5410200"/>
+            <a:off x="5562600" y="6346825"/>
             <a:ext cx="2133600" cy="609600"/>
           </a:xfrm>
           <a:prstGeom prst="rect">
@@ -3402,327 +3920,1422 @@
           </a:fontRef>
         </p:style>
         <p:txBody>
-          <a:bodyPr rtlCol="0" anchor="ctr"/>
+          <a:bodyPr anchor="ctr"/>
           <a:lstStyle/>
           <a:p>
-            <a:pPr algn="ctr"/>
-            <a:endParaRPr lang="en-US"/>
-          </a:p>
-        </p:txBody>
-      </p:sp>
-      <p:cxnSp>
-        <p:nvCxnSpPr>
-          <p:cNvPr id="29" name="Shape 28"/>
-          <p:cNvCxnSpPr>
-            <a:stCxn id="6" idx="2"/>
-            <a:endCxn id="27" idx="1"/>
-          </p:cNvCxnSpPr>
+            <a:pPr algn="ctr" fontAlgn="auto">
+              <a:spcBef>
+                <a:spcPts val="0"/>
+              </a:spcBef>
+              <a:spcAft>
+                <a:spcPts val="0"/>
+              </a:spcAft>
+              <a:defRPr/>
+            </a:pPr>
+            <a:endParaRPr lang="en-US"/>
+          </a:p>
+        </p:txBody>
+      </p:sp>
+      <p:sp>
+        <p:nvSpPr>
+          <p:cNvPr id="13322" name="TextBox 29"/>
+          <p:cNvSpPr txBox="1">
+            <a:spLocks noChangeArrowheads="1"/>
+          </p:cNvSpPr>
           <p:nvPr/>
-        </p:nvCxnSpPr>
-        <p:spPr>
-          <a:xfrm rot="16200000" flipH="1">
-            <a:off x="4343400" y="4495800"/>
-            <a:ext cx="1981200" cy="457200"/>
-          </a:xfrm>
-          <a:prstGeom prst="bentConnector2">
+        </p:nvSpPr>
+        <p:spPr bwMode="auto">
+          <a:xfrm>
+            <a:off x="6969125" y="3730625"/>
+            <a:ext cx="563563" cy="457200"/>
+          </a:xfrm>
+          <a:prstGeom prst="rect">
             <a:avLst/>
           </a:prstGeom>
+          <a:noFill/>
+          <a:ln w="9525">
+            <a:noFill/>
+            <a:miter lim="800000"/>
+            <a:headEnd/>
+            <a:tailEnd/>
+          </a:ln>
+        </p:spPr>
+        <p:txBody>
+          <a:bodyPr wrap="none">
+            <a:spAutoFit/>
+          </a:bodyPr>
+          <a:lstStyle/>
+          <a:p>
+            <a:r>
+              <a:rPr lang="en-US" sz="2400" b="1">
+                <a:latin typeface="Calibri" pitchFamily="34" charset="0"/>
+              </a:rPr>
+              <a:t>…..</a:t>
+            </a:r>
+          </a:p>
+        </p:txBody>
+      </p:sp>
+      <p:sp>
+        <p:nvSpPr>
+          <p:cNvPr id="13323" name="TextBox 30"/>
+          <p:cNvSpPr txBox="1">
+            <a:spLocks noChangeArrowheads="1"/>
+          </p:cNvSpPr>
+          <p:nvPr/>
+        </p:nvSpPr>
+        <p:spPr bwMode="auto">
+          <a:xfrm>
+            <a:off x="152400" y="322263"/>
+            <a:ext cx="941388" cy="366712"/>
+          </a:xfrm>
+          <a:prstGeom prst="rect">
+            <a:avLst/>
+          </a:prstGeom>
+          <a:noFill/>
+          <a:ln w="9525">
+            <a:noFill/>
+            <a:miter lim="800000"/>
+            <a:headEnd/>
+            <a:tailEnd/>
+          </a:ln>
+        </p:spPr>
+        <p:txBody>
+          <a:bodyPr wrap="none">
+            <a:spAutoFit/>
+          </a:bodyPr>
+          <a:lstStyle/>
+          <a:p>
+            <a:r>
+              <a:rPr lang="en-US">
+                <a:latin typeface="Calibri" pitchFamily="34" charset="0"/>
+              </a:rPr>
+              <a:t>HashSet</a:t>
+            </a:r>
+          </a:p>
+        </p:txBody>
+      </p:sp>
+      <p:sp>
+        <p:nvSpPr>
+          <p:cNvPr id="13324" name="TextBox 31"/>
+          <p:cNvSpPr txBox="1">
+            <a:spLocks noChangeArrowheads="1"/>
+          </p:cNvSpPr>
+          <p:nvPr/>
+        </p:nvSpPr>
+        <p:spPr bwMode="auto">
+          <a:xfrm>
+            <a:off x="1671638" y="1495425"/>
+            <a:ext cx="1071562" cy="366713"/>
+          </a:xfrm>
+          <a:prstGeom prst="rect">
+            <a:avLst/>
+          </a:prstGeom>
+          <a:noFill/>
+          <a:ln w="9525">
+            <a:noFill/>
+            <a:miter lim="800000"/>
+            <a:headEnd/>
+            <a:tailEnd/>
+          </a:ln>
+        </p:spPr>
+        <p:txBody>
+          <a:bodyPr wrap="none">
+            <a:spAutoFit/>
+          </a:bodyPr>
+          <a:lstStyle/>
+          <a:p>
+            <a:r>
+              <a:rPr lang="en-US">
+                <a:latin typeface="Calibri" pitchFamily="34" charset="0"/>
+              </a:rPr>
+              <a:t>HashMap</a:t>
+            </a:r>
+          </a:p>
+        </p:txBody>
+      </p:sp>
+      <p:sp>
+        <p:nvSpPr>
+          <p:cNvPr id="13325" name="TextBox 32"/>
+          <p:cNvSpPr txBox="1">
+            <a:spLocks noChangeArrowheads="1"/>
+          </p:cNvSpPr>
+          <p:nvPr/>
+        </p:nvSpPr>
+        <p:spPr bwMode="auto">
+          <a:xfrm>
+            <a:off x="3068638" y="2808288"/>
+            <a:ext cx="665162" cy="366712"/>
+          </a:xfrm>
+          <a:prstGeom prst="rect">
+            <a:avLst/>
+          </a:prstGeom>
+          <a:noFill/>
+          <a:ln w="9525">
+            <a:noFill/>
+            <a:miter lim="800000"/>
+            <a:headEnd/>
+            <a:tailEnd/>
+          </a:ln>
+        </p:spPr>
+        <p:txBody>
+          <a:bodyPr wrap="none">
+            <a:spAutoFit/>
+          </a:bodyPr>
+          <a:lstStyle/>
+          <a:p>
+            <a:r>
+              <a:rPr lang="en-US">
+                <a:latin typeface="Calibri" pitchFamily="34" charset="0"/>
+              </a:rPr>
+              <a:t>array</a:t>
+            </a:r>
+          </a:p>
+        </p:txBody>
+      </p:sp>
+      <p:sp>
+        <p:nvSpPr>
+          <p:cNvPr id="13326" name="TextBox 33"/>
+          <p:cNvSpPr txBox="1">
+            <a:spLocks noChangeArrowheads="1"/>
+          </p:cNvSpPr>
+          <p:nvPr/>
+        </p:nvSpPr>
+        <p:spPr bwMode="auto">
+          <a:xfrm>
+            <a:off x="4308475" y="3219450"/>
+            <a:ext cx="1677988" cy="366713"/>
+          </a:xfrm>
+          <a:prstGeom prst="rect">
+            <a:avLst/>
+          </a:prstGeom>
+          <a:noFill/>
+          <a:ln w="9525">
+            <a:noFill/>
+            <a:miter lim="800000"/>
+            <a:headEnd/>
+            <a:tailEnd/>
+          </a:ln>
+        </p:spPr>
+        <p:txBody>
+          <a:bodyPr wrap="none">
+            <a:spAutoFit/>
+          </a:bodyPr>
+          <a:lstStyle/>
+          <a:p>
+            <a:r>
+              <a:rPr lang="en-US">
+                <a:latin typeface="Calibri" pitchFamily="34" charset="0"/>
+              </a:rPr>
+              <a:t>HashMap$Entry</a:t>
+            </a:r>
+          </a:p>
+        </p:txBody>
+      </p:sp>
+      <p:sp>
+        <p:nvSpPr>
+          <p:cNvPr id="13327" name="Rectangle 34"/>
+          <p:cNvSpPr>
+            <a:spLocks noChangeArrowheads="1"/>
+          </p:cNvSpPr>
+          <p:nvPr/>
+        </p:nvSpPr>
+        <p:spPr bwMode="auto">
+          <a:xfrm>
+            <a:off x="2286000" y="277813"/>
+            <a:ext cx="4572000" cy="366712"/>
+          </a:xfrm>
+          <a:prstGeom prst="rect">
+            <a:avLst/>
+          </a:prstGeom>
+          <a:noFill/>
+          <a:ln w="9525">
+            <a:noFill/>
+            <a:miter lim="800000"/>
+            <a:headEnd/>
+            <a:tailEnd/>
+          </a:ln>
+        </p:spPr>
+        <p:txBody>
+          <a:bodyPr>
+            <a:spAutoFit/>
+          </a:bodyPr>
+          <a:lstStyle/>
+          <a:p>
+            <a:r>
+              <a:rPr lang="en-US" i="1">
+                <a:latin typeface="Calibri" pitchFamily="34" charset="0"/>
+              </a:rPr>
+              <a:t> Wrapper object: 16 bytes</a:t>
+            </a:r>
+          </a:p>
+        </p:txBody>
+      </p:sp>
+      <p:sp>
+        <p:nvSpPr>
+          <p:cNvPr id="13328" name="Rectangle 35"/>
+          <p:cNvSpPr>
+            <a:spLocks noChangeArrowheads="1"/>
+          </p:cNvSpPr>
+          <p:nvPr/>
+        </p:nvSpPr>
+        <p:spPr bwMode="auto">
+          <a:xfrm>
+            <a:off x="3810000" y="1419225"/>
+            <a:ext cx="3505200" cy="368300"/>
+          </a:xfrm>
+          <a:prstGeom prst="rect">
+            <a:avLst/>
+          </a:prstGeom>
+          <a:noFill/>
+          <a:ln w="9525">
+            <a:noFill/>
+            <a:miter lim="800000"/>
+            <a:headEnd/>
+            <a:tailEnd/>
+          </a:ln>
+        </p:spPr>
+        <p:txBody>
+          <a:bodyPr>
+            <a:spAutoFit/>
+          </a:bodyPr>
+          <a:lstStyle/>
+          <a:p>
+            <a:r>
+              <a:rPr lang="en-US" i="1">
+                <a:latin typeface="Calibri" pitchFamily="34" charset="0"/>
+              </a:rPr>
+              <a:t>Wrapper object: 40 bytes</a:t>
+            </a:r>
+          </a:p>
+        </p:txBody>
+      </p:sp>
+      <p:sp>
+        <p:nvSpPr>
+          <p:cNvPr id="13329" name="Rectangle 37"/>
+          <p:cNvSpPr>
+            <a:spLocks noChangeArrowheads="1"/>
+          </p:cNvSpPr>
+          <p:nvPr/>
+        </p:nvSpPr>
+        <p:spPr bwMode="auto">
+          <a:xfrm>
+            <a:off x="3816350" y="2806700"/>
+            <a:ext cx="3352800" cy="366713"/>
+          </a:xfrm>
+          <a:prstGeom prst="rect">
+            <a:avLst/>
+          </a:prstGeom>
+          <a:noFill/>
+          <a:ln w="9525">
+            <a:noFill/>
+            <a:miter lim="800000"/>
+            <a:headEnd/>
+            <a:tailEnd/>
+          </a:ln>
+        </p:spPr>
+        <p:txBody>
+          <a:bodyPr>
+            <a:spAutoFit/>
+          </a:bodyPr>
+          <a:lstStyle/>
+          <a:p>
+            <a:r>
+              <a:rPr lang="en-US" i="1">
+                <a:latin typeface="Calibri" pitchFamily="34" charset="0"/>
+              </a:rPr>
+              <a:t>default 16 slots: 80 bytes</a:t>
+            </a:r>
+          </a:p>
+        </p:txBody>
+      </p:sp>
+      <p:sp>
+        <p:nvSpPr>
+          <p:cNvPr id="13330" name="Rectangle 19"/>
+          <p:cNvSpPr>
+            <a:spLocks noChangeArrowheads="1"/>
+          </p:cNvSpPr>
+          <p:nvPr/>
+        </p:nvSpPr>
+        <p:spPr bwMode="auto">
+          <a:xfrm>
+            <a:off x="7092950" y="3221038"/>
+            <a:ext cx="1855788" cy="368300"/>
+          </a:xfrm>
+          <a:prstGeom prst="rect">
+            <a:avLst/>
+          </a:prstGeom>
+          <a:noFill/>
+          <a:ln w="9525">
+            <a:noFill/>
+            <a:miter lim="800000"/>
+            <a:headEnd/>
+            <a:tailEnd/>
+          </a:ln>
+        </p:spPr>
+        <p:txBody>
+          <a:bodyPr>
+            <a:spAutoFit/>
+          </a:bodyPr>
+          <a:lstStyle/>
+          <a:p>
+            <a:r>
+              <a:rPr lang="en-US" i="1">
+                <a:latin typeface="Calibri" pitchFamily="34" charset="0"/>
+              </a:rPr>
+              <a:t>24 bytes per entry</a:t>
+            </a:r>
+          </a:p>
+        </p:txBody>
+      </p:sp>
+      <p:sp>
+        <p:nvSpPr>
+          <p:cNvPr id="2" name="Rectangle 5"/>
+          <p:cNvSpPr/>
+          <p:nvPr/>
+        </p:nvSpPr>
+        <p:spPr>
+          <a:xfrm>
+            <a:off x="3121025" y="3867150"/>
+            <a:ext cx="612775" cy="182563"/>
+          </a:xfrm>
+          <a:prstGeom prst="rect">
+            <a:avLst/>
+          </a:prstGeom>
+          <a:solidFill>
+            <a:schemeClr val="bg1">
+              <a:lumMod val="85000"/>
+            </a:schemeClr>
+          </a:solidFill>
           <a:ln>
             <a:solidFill>
               <a:schemeClr val="tx1"/>
             </a:solidFill>
-            <a:tailEnd type="arrow"/>
           </a:ln>
         </p:spPr>
         <p:style>
-          <a:lnRef idx="2">
+          <a:lnRef idx="1">
             <a:schemeClr val="accent1"/>
           </a:lnRef>
-          <a:fillRef idx="0">
+          <a:fillRef idx="3">
             <a:schemeClr val="accent1"/>
           </a:fillRef>
-          <a:effectRef idx="1">
+          <a:effectRef idx="2">
             <a:schemeClr val="accent1"/>
           </a:effectRef>
           <a:fontRef idx="minor">
-            <a:schemeClr val="tx1"/>
+            <a:schemeClr val="lt1"/>
           </a:fontRef>
         </p:style>
-      </p:cxnSp>
-      <p:sp>
-        <p:nvSpPr>
-          <p:cNvPr id="30" name="TextBox 29"/>
-          <p:cNvSpPr txBox="1"/>
+        <p:txBody>
+          <a:bodyPr anchor="ctr"/>
+          <a:lstStyle/>
+          <a:p>
+            <a:pPr algn="ctr" fontAlgn="auto">
+              <a:spcBef>
+                <a:spcPts val="0"/>
+              </a:spcBef>
+              <a:spcAft>
+                <a:spcPts val="0"/>
+              </a:spcAft>
+              <a:defRPr/>
+            </a:pPr>
+            <a:endParaRPr lang="en-US"/>
+          </a:p>
+        </p:txBody>
+      </p:sp>
+      <p:sp>
+        <p:nvSpPr>
+          <p:cNvPr id="3" name="Rectangle 5"/>
+          <p:cNvSpPr/>
           <p:nvPr/>
         </p:nvSpPr>
         <p:spPr>
           <a:xfrm>
-            <a:off x="5888183" y="5299501"/>
-            <a:ext cx="568034" cy="461665"/>
+            <a:off x="3121025" y="4048125"/>
+            <a:ext cx="612775" cy="182563"/>
+          </a:xfrm>
+          <a:prstGeom prst="rect">
+            <a:avLst/>
+          </a:prstGeom>
+          <a:solidFill>
+            <a:schemeClr val="bg1">
+              <a:lumMod val="85000"/>
+            </a:schemeClr>
+          </a:solidFill>
+          <a:ln>
+            <a:solidFill>
+              <a:schemeClr val="tx1"/>
+            </a:solidFill>
+          </a:ln>
+        </p:spPr>
+        <p:style>
+          <a:lnRef idx="1">
+            <a:schemeClr val="accent1"/>
+          </a:lnRef>
+          <a:fillRef idx="3">
+            <a:schemeClr val="accent1"/>
+          </a:fillRef>
+          <a:effectRef idx="2">
+            <a:schemeClr val="accent1"/>
+          </a:effectRef>
+          <a:fontRef idx="minor">
+            <a:schemeClr val="lt1"/>
+          </a:fontRef>
+        </p:style>
+        <p:txBody>
+          <a:bodyPr anchor="ctr"/>
+          <a:lstStyle/>
+          <a:p>
+            <a:pPr algn="ctr" fontAlgn="auto">
+              <a:spcBef>
+                <a:spcPts val="0"/>
+              </a:spcBef>
+              <a:spcAft>
+                <a:spcPts val="0"/>
+              </a:spcAft>
+              <a:defRPr/>
+            </a:pPr>
+            <a:endParaRPr lang="en-US"/>
+          </a:p>
+        </p:txBody>
+      </p:sp>
+      <p:sp>
+        <p:nvSpPr>
+          <p:cNvPr id="8" name="Rectangle 5"/>
+          <p:cNvSpPr/>
+          <p:nvPr/>
+        </p:nvSpPr>
+        <p:spPr>
+          <a:xfrm>
+            <a:off x="3121025" y="4230688"/>
+            <a:ext cx="612775" cy="182562"/>
+          </a:xfrm>
+          <a:prstGeom prst="rect">
+            <a:avLst/>
+          </a:prstGeom>
+          <a:solidFill>
+            <a:schemeClr val="bg1">
+              <a:lumMod val="85000"/>
+            </a:schemeClr>
+          </a:solidFill>
+          <a:ln>
+            <a:solidFill>
+              <a:schemeClr val="tx1"/>
+            </a:solidFill>
+          </a:ln>
+        </p:spPr>
+        <p:style>
+          <a:lnRef idx="1">
+            <a:schemeClr val="accent1"/>
+          </a:lnRef>
+          <a:fillRef idx="3">
+            <a:schemeClr val="accent1"/>
+          </a:fillRef>
+          <a:effectRef idx="2">
+            <a:schemeClr val="accent1"/>
+          </a:effectRef>
+          <a:fontRef idx="minor">
+            <a:schemeClr val="lt1"/>
+          </a:fontRef>
+        </p:style>
+        <p:txBody>
+          <a:bodyPr anchor="ctr"/>
+          <a:lstStyle/>
+          <a:p>
+            <a:pPr algn="ctr" fontAlgn="auto">
+              <a:spcBef>
+                <a:spcPts val="0"/>
+              </a:spcBef>
+              <a:spcAft>
+                <a:spcPts val="0"/>
+              </a:spcAft>
+              <a:defRPr/>
+            </a:pPr>
+            <a:endParaRPr lang="en-US"/>
+          </a:p>
+        </p:txBody>
+      </p:sp>
+      <p:sp>
+        <p:nvSpPr>
+          <p:cNvPr id="9" name="Rectangle 5"/>
+          <p:cNvSpPr/>
+          <p:nvPr/>
+        </p:nvSpPr>
+        <p:spPr>
+          <a:xfrm>
+            <a:off x="3121025" y="4411663"/>
+            <a:ext cx="612775" cy="182562"/>
+          </a:xfrm>
+          <a:prstGeom prst="rect">
+            <a:avLst/>
+          </a:prstGeom>
+          <a:solidFill>
+            <a:schemeClr val="bg1">
+              <a:lumMod val="85000"/>
+            </a:schemeClr>
+          </a:solidFill>
+          <a:ln>
+            <a:solidFill>
+              <a:schemeClr val="tx1"/>
+            </a:solidFill>
+          </a:ln>
+        </p:spPr>
+        <p:style>
+          <a:lnRef idx="1">
+            <a:schemeClr val="accent1"/>
+          </a:lnRef>
+          <a:fillRef idx="3">
+            <a:schemeClr val="accent1"/>
+          </a:fillRef>
+          <a:effectRef idx="2">
+            <a:schemeClr val="accent1"/>
+          </a:effectRef>
+          <a:fontRef idx="minor">
+            <a:schemeClr val="lt1"/>
+          </a:fontRef>
+        </p:style>
+        <p:txBody>
+          <a:bodyPr anchor="ctr"/>
+          <a:lstStyle/>
+          <a:p>
+            <a:pPr algn="ctr" fontAlgn="auto">
+              <a:spcBef>
+                <a:spcPts val="0"/>
+              </a:spcBef>
+              <a:spcAft>
+                <a:spcPts val="0"/>
+              </a:spcAft>
+              <a:defRPr/>
+            </a:pPr>
+            <a:endParaRPr lang="en-US"/>
+          </a:p>
+        </p:txBody>
+      </p:sp>
+      <p:sp>
+        <p:nvSpPr>
+          <p:cNvPr id="10" name="Rectangle 5"/>
+          <p:cNvSpPr/>
+          <p:nvPr/>
+        </p:nvSpPr>
+        <p:spPr>
+          <a:xfrm>
+            <a:off x="3121025" y="4578350"/>
+            <a:ext cx="612775" cy="182563"/>
+          </a:xfrm>
+          <a:prstGeom prst="rect">
+            <a:avLst/>
+          </a:prstGeom>
+          <a:solidFill>
+            <a:schemeClr val="bg1">
+              <a:lumMod val="85000"/>
+            </a:schemeClr>
+          </a:solidFill>
+          <a:ln>
+            <a:solidFill>
+              <a:schemeClr val="tx1"/>
+            </a:solidFill>
+          </a:ln>
+        </p:spPr>
+        <p:style>
+          <a:lnRef idx="1">
+            <a:schemeClr val="accent1"/>
+          </a:lnRef>
+          <a:fillRef idx="3">
+            <a:schemeClr val="accent1"/>
+          </a:fillRef>
+          <a:effectRef idx="2">
+            <a:schemeClr val="accent1"/>
+          </a:effectRef>
+          <a:fontRef idx="minor">
+            <a:schemeClr val="lt1"/>
+          </a:fontRef>
+        </p:style>
+        <p:txBody>
+          <a:bodyPr anchor="ctr"/>
+          <a:lstStyle/>
+          <a:p>
+            <a:pPr algn="ctr" fontAlgn="auto">
+              <a:spcBef>
+                <a:spcPts val="0"/>
+              </a:spcBef>
+              <a:spcAft>
+                <a:spcPts val="0"/>
+              </a:spcAft>
+              <a:defRPr/>
+            </a:pPr>
+            <a:endParaRPr lang="en-US"/>
+          </a:p>
+        </p:txBody>
+      </p:sp>
+      <p:sp>
+        <p:nvSpPr>
+          <p:cNvPr id="11" name="Rectangle 5"/>
+          <p:cNvSpPr/>
+          <p:nvPr/>
+        </p:nvSpPr>
+        <p:spPr>
+          <a:xfrm>
+            <a:off x="3121025" y="4764088"/>
+            <a:ext cx="612775" cy="182562"/>
+          </a:xfrm>
+          <a:prstGeom prst="rect">
+            <a:avLst/>
+          </a:prstGeom>
+          <a:solidFill>
+            <a:schemeClr val="bg1">
+              <a:lumMod val="85000"/>
+            </a:schemeClr>
+          </a:solidFill>
+          <a:ln>
+            <a:solidFill>
+              <a:schemeClr val="tx1"/>
+            </a:solidFill>
+          </a:ln>
+        </p:spPr>
+        <p:style>
+          <a:lnRef idx="1">
+            <a:schemeClr val="accent1"/>
+          </a:lnRef>
+          <a:fillRef idx="3">
+            <a:schemeClr val="accent1"/>
+          </a:fillRef>
+          <a:effectRef idx="2">
+            <a:schemeClr val="accent1"/>
+          </a:effectRef>
+          <a:fontRef idx="minor">
+            <a:schemeClr val="lt1"/>
+          </a:fontRef>
+        </p:style>
+        <p:txBody>
+          <a:bodyPr anchor="ctr"/>
+          <a:lstStyle/>
+          <a:p>
+            <a:pPr algn="ctr" fontAlgn="auto">
+              <a:spcBef>
+                <a:spcPts val="0"/>
+              </a:spcBef>
+              <a:spcAft>
+                <a:spcPts val="0"/>
+              </a:spcAft>
+              <a:defRPr/>
+            </a:pPr>
+            <a:endParaRPr lang="en-US"/>
+          </a:p>
+        </p:txBody>
+      </p:sp>
+      <p:sp>
+        <p:nvSpPr>
+          <p:cNvPr id="12" name="Rectangle 5"/>
+          <p:cNvSpPr/>
+          <p:nvPr/>
+        </p:nvSpPr>
+        <p:spPr>
+          <a:xfrm>
+            <a:off x="3121025" y="4953000"/>
+            <a:ext cx="612775" cy="182563"/>
+          </a:xfrm>
+          <a:prstGeom prst="rect">
+            <a:avLst/>
+          </a:prstGeom>
+          <a:solidFill>
+            <a:schemeClr val="bg1">
+              <a:lumMod val="85000"/>
+            </a:schemeClr>
+          </a:solidFill>
+          <a:ln>
+            <a:solidFill>
+              <a:schemeClr val="tx1"/>
+            </a:solidFill>
+          </a:ln>
+        </p:spPr>
+        <p:style>
+          <a:lnRef idx="1">
+            <a:schemeClr val="accent1"/>
+          </a:lnRef>
+          <a:fillRef idx="3">
+            <a:schemeClr val="accent1"/>
+          </a:fillRef>
+          <a:effectRef idx="2">
+            <a:schemeClr val="accent1"/>
+          </a:effectRef>
+          <a:fontRef idx="minor">
+            <a:schemeClr val="lt1"/>
+          </a:fontRef>
+        </p:style>
+        <p:txBody>
+          <a:bodyPr anchor="ctr"/>
+          <a:lstStyle/>
+          <a:p>
+            <a:pPr algn="ctr" fontAlgn="auto">
+              <a:spcBef>
+                <a:spcPts val="0"/>
+              </a:spcBef>
+              <a:spcAft>
+                <a:spcPts val="0"/>
+              </a:spcAft>
+              <a:defRPr/>
+            </a:pPr>
+            <a:endParaRPr lang="en-US"/>
+          </a:p>
+        </p:txBody>
+      </p:sp>
+      <p:sp>
+        <p:nvSpPr>
+          <p:cNvPr id="13" name="Rectangle 5"/>
+          <p:cNvSpPr/>
+          <p:nvPr/>
+        </p:nvSpPr>
+        <p:spPr>
+          <a:xfrm>
+            <a:off x="3121025" y="5127625"/>
+            <a:ext cx="612775" cy="182563"/>
+          </a:xfrm>
+          <a:prstGeom prst="rect">
+            <a:avLst/>
+          </a:prstGeom>
+          <a:solidFill>
+            <a:schemeClr val="bg1">
+              <a:lumMod val="85000"/>
+            </a:schemeClr>
+          </a:solidFill>
+          <a:ln>
+            <a:solidFill>
+              <a:schemeClr val="tx1"/>
+            </a:solidFill>
+          </a:ln>
+        </p:spPr>
+        <p:style>
+          <a:lnRef idx="1">
+            <a:schemeClr val="accent1"/>
+          </a:lnRef>
+          <a:fillRef idx="3">
+            <a:schemeClr val="accent1"/>
+          </a:fillRef>
+          <a:effectRef idx="2">
+            <a:schemeClr val="accent1"/>
+          </a:effectRef>
+          <a:fontRef idx="minor">
+            <a:schemeClr val="lt1"/>
+          </a:fontRef>
+        </p:style>
+        <p:txBody>
+          <a:bodyPr anchor="ctr"/>
+          <a:lstStyle/>
+          <a:p>
+            <a:pPr algn="ctr" fontAlgn="auto">
+              <a:spcBef>
+                <a:spcPts val="0"/>
+              </a:spcBef>
+              <a:spcAft>
+                <a:spcPts val="0"/>
+              </a:spcAft>
+              <a:defRPr/>
+            </a:pPr>
+            <a:endParaRPr lang="en-US"/>
+          </a:p>
+        </p:txBody>
+      </p:sp>
+      <p:sp>
+        <p:nvSpPr>
+          <p:cNvPr id="14" name="Rectangle 5"/>
+          <p:cNvSpPr/>
+          <p:nvPr/>
+        </p:nvSpPr>
+        <p:spPr>
+          <a:xfrm>
+            <a:off x="3121025" y="5300663"/>
+            <a:ext cx="612775" cy="182562"/>
+          </a:xfrm>
+          <a:prstGeom prst="rect">
+            <a:avLst/>
+          </a:prstGeom>
+          <a:solidFill>
+            <a:schemeClr val="bg1">
+              <a:lumMod val="85000"/>
+            </a:schemeClr>
+          </a:solidFill>
+          <a:ln>
+            <a:solidFill>
+              <a:schemeClr val="tx1"/>
+            </a:solidFill>
+          </a:ln>
+        </p:spPr>
+        <p:style>
+          <a:lnRef idx="1">
+            <a:schemeClr val="accent1"/>
+          </a:lnRef>
+          <a:fillRef idx="3">
+            <a:schemeClr val="accent1"/>
+          </a:fillRef>
+          <a:effectRef idx="2">
+            <a:schemeClr val="accent1"/>
+          </a:effectRef>
+          <a:fontRef idx="minor">
+            <a:schemeClr val="lt1"/>
+          </a:fontRef>
+        </p:style>
+        <p:txBody>
+          <a:bodyPr anchor="ctr"/>
+          <a:lstStyle/>
+          <a:p>
+            <a:pPr algn="ctr" fontAlgn="auto">
+              <a:spcBef>
+                <a:spcPts val="0"/>
+              </a:spcBef>
+              <a:spcAft>
+                <a:spcPts val="0"/>
+              </a:spcAft>
+              <a:defRPr/>
+            </a:pPr>
+            <a:endParaRPr lang="en-US"/>
+          </a:p>
+        </p:txBody>
+      </p:sp>
+      <p:sp>
+        <p:nvSpPr>
+          <p:cNvPr id="15" name="Rectangle 5"/>
+          <p:cNvSpPr/>
+          <p:nvPr/>
+        </p:nvSpPr>
+        <p:spPr>
+          <a:xfrm>
+            <a:off x="3121025" y="5467350"/>
+            <a:ext cx="612775" cy="182563"/>
+          </a:xfrm>
+          <a:prstGeom prst="rect">
+            <a:avLst/>
+          </a:prstGeom>
+          <a:solidFill>
+            <a:schemeClr val="bg1">
+              <a:lumMod val="85000"/>
+            </a:schemeClr>
+          </a:solidFill>
+          <a:ln>
+            <a:solidFill>
+              <a:schemeClr val="tx1"/>
+            </a:solidFill>
+          </a:ln>
+        </p:spPr>
+        <p:style>
+          <a:lnRef idx="1">
+            <a:schemeClr val="accent1"/>
+          </a:lnRef>
+          <a:fillRef idx="3">
+            <a:schemeClr val="accent1"/>
+          </a:fillRef>
+          <a:effectRef idx="2">
+            <a:schemeClr val="accent1"/>
+          </a:effectRef>
+          <a:fontRef idx="minor">
+            <a:schemeClr val="lt1"/>
+          </a:fontRef>
+        </p:style>
+        <p:txBody>
+          <a:bodyPr anchor="ctr"/>
+          <a:lstStyle/>
+          <a:p>
+            <a:pPr algn="ctr" fontAlgn="auto">
+              <a:spcBef>
+                <a:spcPts val="0"/>
+              </a:spcBef>
+              <a:spcAft>
+                <a:spcPts val="0"/>
+              </a:spcAft>
+              <a:defRPr/>
+            </a:pPr>
+            <a:endParaRPr lang="en-US"/>
+          </a:p>
+        </p:txBody>
+      </p:sp>
+      <p:sp>
+        <p:nvSpPr>
+          <p:cNvPr id="16" name="Rectangle 5"/>
+          <p:cNvSpPr/>
+          <p:nvPr/>
+        </p:nvSpPr>
+        <p:spPr>
+          <a:xfrm>
+            <a:off x="3121025" y="5637213"/>
+            <a:ext cx="612775" cy="182562"/>
+          </a:xfrm>
+          <a:prstGeom prst="rect">
+            <a:avLst/>
+          </a:prstGeom>
+          <a:solidFill>
+            <a:schemeClr val="bg1">
+              <a:lumMod val="85000"/>
+            </a:schemeClr>
+          </a:solidFill>
+          <a:ln>
+            <a:solidFill>
+              <a:schemeClr val="tx1"/>
+            </a:solidFill>
+          </a:ln>
+        </p:spPr>
+        <p:style>
+          <a:lnRef idx="1">
+            <a:schemeClr val="accent1"/>
+          </a:lnRef>
+          <a:fillRef idx="3">
+            <a:schemeClr val="accent1"/>
+          </a:fillRef>
+          <a:effectRef idx="2">
+            <a:schemeClr val="accent1"/>
+          </a:effectRef>
+          <a:fontRef idx="minor">
+            <a:schemeClr val="lt1"/>
+          </a:fontRef>
+        </p:style>
+        <p:txBody>
+          <a:bodyPr anchor="ctr"/>
+          <a:lstStyle/>
+          <a:p>
+            <a:pPr algn="ctr" fontAlgn="auto">
+              <a:spcBef>
+                <a:spcPts val="0"/>
+              </a:spcBef>
+              <a:spcAft>
+                <a:spcPts val="0"/>
+              </a:spcAft>
+              <a:defRPr/>
+            </a:pPr>
+            <a:endParaRPr lang="en-US"/>
+          </a:p>
+        </p:txBody>
+      </p:sp>
+      <p:sp>
+        <p:nvSpPr>
+          <p:cNvPr id="18" name="Rectangle 5"/>
+          <p:cNvSpPr/>
+          <p:nvPr/>
+        </p:nvSpPr>
+        <p:spPr>
+          <a:xfrm>
+            <a:off x="3121025" y="5826125"/>
+            <a:ext cx="612775" cy="182563"/>
+          </a:xfrm>
+          <a:prstGeom prst="rect">
+            <a:avLst/>
+          </a:prstGeom>
+          <a:solidFill>
+            <a:schemeClr val="bg1">
+              <a:lumMod val="85000"/>
+            </a:schemeClr>
+          </a:solidFill>
+          <a:ln>
+            <a:solidFill>
+              <a:schemeClr val="tx1"/>
+            </a:solidFill>
+          </a:ln>
+        </p:spPr>
+        <p:style>
+          <a:lnRef idx="1">
+            <a:schemeClr val="accent1"/>
+          </a:lnRef>
+          <a:fillRef idx="3">
+            <a:schemeClr val="accent1"/>
+          </a:fillRef>
+          <a:effectRef idx="2">
+            <a:schemeClr val="accent1"/>
+          </a:effectRef>
+          <a:fontRef idx="minor">
+            <a:schemeClr val="lt1"/>
+          </a:fontRef>
+        </p:style>
+        <p:txBody>
+          <a:bodyPr anchor="ctr"/>
+          <a:lstStyle/>
+          <a:p>
+            <a:pPr algn="ctr" fontAlgn="auto">
+              <a:spcBef>
+                <a:spcPts val="0"/>
+              </a:spcBef>
+              <a:spcAft>
+                <a:spcPts val="0"/>
+              </a:spcAft>
+              <a:defRPr/>
+            </a:pPr>
+            <a:endParaRPr lang="en-US"/>
+          </a:p>
+        </p:txBody>
+      </p:sp>
+      <p:sp>
+        <p:nvSpPr>
+          <p:cNvPr id="20" name="Rectangle 5"/>
+          <p:cNvSpPr/>
+          <p:nvPr/>
+        </p:nvSpPr>
+        <p:spPr>
+          <a:xfrm>
+            <a:off x="3121025" y="6008688"/>
+            <a:ext cx="612775" cy="182562"/>
+          </a:xfrm>
+          <a:prstGeom prst="rect">
+            <a:avLst/>
+          </a:prstGeom>
+          <a:solidFill>
+            <a:schemeClr val="bg1">
+              <a:lumMod val="85000"/>
+            </a:schemeClr>
+          </a:solidFill>
+          <a:ln>
+            <a:solidFill>
+              <a:schemeClr val="tx1"/>
+            </a:solidFill>
+          </a:ln>
+        </p:spPr>
+        <p:style>
+          <a:lnRef idx="1">
+            <a:schemeClr val="accent1"/>
+          </a:lnRef>
+          <a:fillRef idx="3">
+            <a:schemeClr val="accent1"/>
+          </a:fillRef>
+          <a:effectRef idx="2">
+            <a:schemeClr val="accent1"/>
+          </a:effectRef>
+          <a:fontRef idx="minor">
+            <a:schemeClr val="lt1"/>
+          </a:fontRef>
+        </p:style>
+        <p:txBody>
+          <a:bodyPr anchor="ctr"/>
+          <a:lstStyle/>
+          <a:p>
+            <a:pPr algn="ctr" fontAlgn="auto">
+              <a:spcBef>
+                <a:spcPts val="0"/>
+              </a:spcBef>
+              <a:spcAft>
+                <a:spcPts val="0"/>
+              </a:spcAft>
+              <a:defRPr/>
+            </a:pPr>
+            <a:endParaRPr lang="en-US"/>
+          </a:p>
+        </p:txBody>
+      </p:sp>
+      <p:sp>
+        <p:nvSpPr>
+          <p:cNvPr id="21" name="Rectangle 5"/>
+          <p:cNvSpPr/>
+          <p:nvPr/>
+        </p:nvSpPr>
+        <p:spPr>
+          <a:xfrm>
+            <a:off x="3121025" y="6189663"/>
+            <a:ext cx="612775" cy="182562"/>
+          </a:xfrm>
+          <a:prstGeom prst="rect">
+            <a:avLst/>
+          </a:prstGeom>
+          <a:solidFill>
+            <a:schemeClr val="bg1">
+              <a:lumMod val="85000"/>
+            </a:schemeClr>
+          </a:solidFill>
+          <a:ln>
+            <a:solidFill>
+              <a:schemeClr val="tx1"/>
+            </a:solidFill>
+          </a:ln>
+        </p:spPr>
+        <p:style>
+          <a:lnRef idx="1">
+            <a:schemeClr val="accent1"/>
+          </a:lnRef>
+          <a:fillRef idx="3">
+            <a:schemeClr val="accent1"/>
+          </a:fillRef>
+          <a:effectRef idx="2">
+            <a:schemeClr val="accent1"/>
+          </a:effectRef>
+          <a:fontRef idx="minor">
+            <a:schemeClr val="lt1"/>
+          </a:fontRef>
+        </p:style>
+        <p:txBody>
+          <a:bodyPr anchor="ctr"/>
+          <a:lstStyle/>
+          <a:p>
+            <a:pPr algn="ctr" fontAlgn="auto">
+              <a:spcBef>
+                <a:spcPts val="0"/>
+              </a:spcBef>
+              <a:spcAft>
+                <a:spcPts val="0"/>
+              </a:spcAft>
+              <a:defRPr/>
+            </a:pPr>
+            <a:endParaRPr lang="en-US"/>
+          </a:p>
+        </p:txBody>
+      </p:sp>
+      <p:sp>
+        <p:nvSpPr>
+          <p:cNvPr id="23" name="Rectangle 5"/>
+          <p:cNvSpPr/>
+          <p:nvPr/>
+        </p:nvSpPr>
+        <p:spPr>
+          <a:xfrm>
+            <a:off x="3121025" y="6372225"/>
+            <a:ext cx="612775" cy="182563"/>
+          </a:xfrm>
+          <a:prstGeom prst="rect">
+            <a:avLst/>
+          </a:prstGeom>
+          <a:solidFill>
+            <a:schemeClr val="bg1">
+              <a:lumMod val="85000"/>
+            </a:schemeClr>
+          </a:solidFill>
+          <a:ln>
+            <a:solidFill>
+              <a:schemeClr val="tx1"/>
+            </a:solidFill>
+          </a:ln>
+        </p:spPr>
+        <p:style>
+          <a:lnRef idx="1">
+            <a:schemeClr val="accent1"/>
+          </a:lnRef>
+          <a:fillRef idx="3">
+            <a:schemeClr val="accent1"/>
+          </a:fillRef>
+          <a:effectRef idx="2">
+            <a:schemeClr val="accent1"/>
+          </a:effectRef>
+          <a:fontRef idx="minor">
+            <a:schemeClr val="lt1"/>
+          </a:fontRef>
+        </p:style>
+        <p:txBody>
+          <a:bodyPr anchor="ctr"/>
+          <a:lstStyle/>
+          <a:p>
+            <a:pPr algn="ctr" fontAlgn="auto">
+              <a:spcBef>
+                <a:spcPts val="0"/>
+              </a:spcBef>
+              <a:spcAft>
+                <a:spcPts val="0"/>
+              </a:spcAft>
+              <a:defRPr/>
+            </a:pPr>
+            <a:endParaRPr lang="en-US"/>
+          </a:p>
+        </p:txBody>
+      </p:sp>
+      <p:sp>
+        <p:nvSpPr>
+          <p:cNvPr id="24" name="Rectangle 5"/>
+          <p:cNvSpPr/>
+          <p:nvPr/>
+        </p:nvSpPr>
+        <p:spPr>
+          <a:xfrm>
+            <a:off x="3121025" y="6554788"/>
+            <a:ext cx="612775" cy="182562"/>
+          </a:xfrm>
+          <a:prstGeom prst="rect">
+            <a:avLst/>
+          </a:prstGeom>
+          <a:solidFill>
+            <a:schemeClr val="bg1">
+              <a:lumMod val="85000"/>
+            </a:schemeClr>
+          </a:solidFill>
+          <a:ln>
+            <a:solidFill>
+              <a:schemeClr val="tx1"/>
+            </a:solidFill>
+          </a:ln>
+        </p:spPr>
+        <p:style>
+          <a:lnRef idx="1">
+            <a:schemeClr val="accent1"/>
+          </a:lnRef>
+          <a:fillRef idx="3">
+            <a:schemeClr val="accent1"/>
+          </a:fillRef>
+          <a:effectRef idx="2">
+            <a:schemeClr val="accent1"/>
+          </a:effectRef>
+          <a:fontRef idx="minor">
+            <a:schemeClr val="lt1"/>
+          </a:fontRef>
+        </p:style>
+        <p:txBody>
+          <a:bodyPr anchor="ctr"/>
+          <a:lstStyle/>
+          <a:p>
+            <a:pPr algn="ctr" fontAlgn="auto">
+              <a:spcBef>
+                <a:spcPts val="0"/>
+              </a:spcBef>
+              <a:spcAft>
+                <a:spcPts val="0"/>
+              </a:spcAft>
+              <a:defRPr/>
+            </a:pPr>
+            <a:endParaRPr lang="en-US"/>
+          </a:p>
+        </p:txBody>
+      </p:sp>
+      <p:cxnSp>
+        <p:nvCxnSpPr>
+          <p:cNvPr id="25" name="Shape 21"/>
+          <p:cNvCxnSpPr>
+            <a:cxnSpLocks noChangeShapeType="1"/>
+            <a:stCxn id="7" idx="2"/>
+            <a:endCxn id="13396" idx="0"/>
+          </p:cNvCxnSpPr>
+          <p:nvPr/>
+        </p:nvCxnSpPr>
+        <p:spPr bwMode="auto">
+          <a:xfrm>
+            <a:off x="6418263" y="3957638"/>
+            <a:ext cx="550862" cy="1587"/>
+          </a:xfrm>
+          <a:prstGeom prst="bentConnector3">
+            <a:avLst>
+              <a:gd name="adj1" fmla="val 49856"/>
+            </a:avLst>
+          </a:prstGeom>
+          <a:noFill/>
+          <a:ln w="25400" algn="ctr">
+            <a:solidFill>
+              <a:schemeClr val="tx1"/>
+            </a:solidFill>
+            <a:miter lim="800000"/>
+            <a:headEnd/>
+            <a:tailEnd type="arrow" w="med" len="med"/>
+          </a:ln>
+          <a:effectLst>
+            <a:outerShdw dist="20000" dir="5400000" rotWithShape="0">
+              <a:srgbClr val="000000">
+                <a:alpha val="37999"/>
+              </a:srgbClr>
+            </a:outerShdw>
+          </a:effectLst>
+        </p:spPr>
+      </p:cxnSp>
+      <p:cxnSp>
+        <p:nvCxnSpPr>
+          <p:cNvPr id="26" name="Shape 21"/>
+          <p:cNvCxnSpPr>
+            <a:cxnSpLocks noChangeShapeType="1"/>
+            <a:stCxn id="7" idx="2"/>
+            <a:endCxn id="13396" idx="0"/>
+          </p:cNvCxnSpPr>
+          <p:nvPr/>
+        </p:nvCxnSpPr>
+        <p:spPr bwMode="auto">
+          <a:xfrm flipV="1">
+            <a:off x="3733800" y="6459538"/>
+            <a:ext cx="560388" cy="4762"/>
+          </a:xfrm>
+          <a:prstGeom prst="bentConnector3">
+            <a:avLst>
+              <a:gd name="adj1" fmla="val 49856"/>
+            </a:avLst>
+          </a:prstGeom>
+          <a:noFill/>
+          <a:ln w="25400" algn="ctr">
+            <a:solidFill>
+              <a:schemeClr val="tx1"/>
+            </a:solidFill>
+            <a:miter lim="800000"/>
+            <a:headEnd/>
+            <a:tailEnd type="arrow" w="med" len="med"/>
+          </a:ln>
+          <a:effectLst>
+            <a:outerShdw dist="20000" dir="5400000" rotWithShape="0">
+              <a:srgbClr val="000000">
+                <a:alpha val="37999"/>
+              </a:srgbClr>
+            </a:outerShdw>
+          </a:effectLst>
+        </p:spPr>
+      </p:cxnSp>
+      <p:sp>
+        <p:nvSpPr>
+          <p:cNvPr id="13396" name="TextBox 32"/>
+          <p:cNvSpPr txBox="1">
+            <a:spLocks noChangeArrowheads="1"/>
+          </p:cNvSpPr>
+          <p:nvPr/>
+        </p:nvSpPr>
+        <p:spPr bwMode="auto">
+          <a:xfrm>
+            <a:off x="4818063" y="4427538"/>
+            <a:ext cx="1055687" cy="366712"/>
           </a:xfrm>
           <a:prstGeom prst="rect">
             <a:avLst/>
           </a:prstGeom>
           <a:noFill/>
-        </p:spPr>
-        <p:txBody>
-          <a:bodyPr wrap="none" rtlCol="0">
+          <a:ln w="9525">
+            <a:noFill/>
+            <a:miter lim="800000"/>
+            <a:headEnd/>
+            <a:tailEnd/>
+          </a:ln>
+        </p:spPr>
+        <p:txBody>
+          <a:bodyPr wrap="none">
             <a:spAutoFit/>
           </a:bodyPr>
           <a:lstStyle/>
           <a:p>
             <a:r>
-              <a:rPr lang="en-US" sz="2400" b="1" dirty="0" smtClean="0"/>
-              <a:t>…..</a:t>
-            </a:r>
-            <a:endParaRPr lang="en-US" sz="2400" b="1" dirty="0"/>
-          </a:p>
-        </p:txBody>
-      </p:sp>
-      <p:sp>
-        <p:nvSpPr>
-          <p:cNvPr id="31" name="TextBox 30"/>
-          <p:cNvSpPr txBox="1"/>
+              <a:rPr lang="en-US">
+                <a:latin typeface="Calibri" pitchFamily="34" charset="0"/>
+              </a:rPr>
+              <a:t>user data</a:t>
+            </a:r>
+          </a:p>
+        </p:txBody>
+      </p:sp>
+      <p:cxnSp>
+        <p:nvCxnSpPr>
+          <p:cNvPr id="28" name="Shape 21"/>
+          <p:cNvCxnSpPr>
+            <a:cxnSpLocks noChangeShapeType="1"/>
+            <a:stCxn id="7" idx="2"/>
+            <a:endCxn id="13396" idx="0"/>
+          </p:cNvCxnSpPr>
           <p:nvPr/>
-        </p:nvSpPr>
-        <p:spPr>
-          <a:xfrm>
-            <a:off x="1066800" y="316468"/>
-            <a:ext cx="947608" cy="369332"/>
-          </a:xfrm>
-          <a:prstGeom prst="rect">
-            <a:avLst/>
+        </p:nvCxnSpPr>
+        <p:spPr bwMode="auto">
+          <a:xfrm rot="5400000">
+            <a:off x="5266532" y="4342606"/>
+            <a:ext cx="165100" cy="4763"/>
+          </a:xfrm>
+          <a:prstGeom prst="bentConnector3">
+            <a:avLst>
+              <a:gd name="adj1" fmla="val 50000"/>
+            </a:avLst>
           </a:prstGeom>
           <a:noFill/>
-        </p:spPr>
-        <p:txBody>
-          <a:bodyPr wrap="none" rtlCol="0">
-            <a:spAutoFit/>
-          </a:bodyPr>
-          <a:lstStyle/>
-          <a:p>
-            <a:r>
-              <a:rPr lang="en-US" dirty="0" err="1" smtClean="0"/>
-              <a:t>HashSet</a:t>
-            </a:r>
-            <a:endParaRPr lang="en-US" dirty="0"/>
-          </a:p>
-        </p:txBody>
-      </p:sp>
-      <p:sp>
-        <p:nvSpPr>
-          <p:cNvPr id="32" name="TextBox 31"/>
-          <p:cNvSpPr txBox="1"/>
-          <p:nvPr/>
-        </p:nvSpPr>
-        <p:spPr>
-          <a:xfrm>
-            <a:off x="2590800" y="1491734"/>
-            <a:ext cx="1079818" cy="369332"/>
-          </a:xfrm>
-          <a:prstGeom prst="rect">
-            <a:avLst/>
-          </a:prstGeom>
-          <a:noFill/>
-        </p:spPr>
-        <p:txBody>
-          <a:bodyPr wrap="none" rtlCol="0">
-            <a:spAutoFit/>
-          </a:bodyPr>
-          <a:lstStyle/>
-          <a:p>
-            <a:r>
-              <a:rPr lang="en-US" dirty="0" err="1" smtClean="0"/>
-              <a:t>HashMap</a:t>
-            </a:r>
-            <a:endParaRPr lang="en-US" dirty="0"/>
-          </a:p>
-        </p:txBody>
-      </p:sp>
-      <p:sp>
-        <p:nvSpPr>
-          <p:cNvPr id="33" name="TextBox 32"/>
-          <p:cNvSpPr txBox="1"/>
-          <p:nvPr/>
-        </p:nvSpPr>
-        <p:spPr>
-          <a:xfrm>
-            <a:off x="4062177" y="2754868"/>
-            <a:ext cx="662223" cy="369332"/>
-          </a:xfrm>
-          <a:prstGeom prst="rect">
-            <a:avLst/>
-          </a:prstGeom>
-          <a:noFill/>
-        </p:spPr>
-        <p:txBody>
-          <a:bodyPr wrap="none" rtlCol="0">
-            <a:spAutoFit/>
-          </a:bodyPr>
-          <a:lstStyle/>
-          <a:p>
-            <a:r>
-              <a:rPr lang="en-US" dirty="0" smtClean="0"/>
-              <a:t>array</a:t>
-            </a:r>
-            <a:endParaRPr lang="en-US" dirty="0"/>
-          </a:p>
-        </p:txBody>
-      </p:sp>
-      <p:sp>
-        <p:nvSpPr>
-          <p:cNvPr id="34" name="TextBox 33"/>
-          <p:cNvSpPr txBox="1"/>
-          <p:nvPr/>
-        </p:nvSpPr>
-        <p:spPr>
-          <a:xfrm>
-            <a:off x="5562600" y="3974068"/>
-            <a:ext cx="1692065" cy="369332"/>
-          </a:xfrm>
-          <a:prstGeom prst="rect">
-            <a:avLst/>
-          </a:prstGeom>
-          <a:noFill/>
-        </p:spPr>
-        <p:txBody>
-          <a:bodyPr wrap="none" rtlCol="0">
-            <a:spAutoFit/>
-          </a:bodyPr>
-          <a:lstStyle/>
-          <a:p>
-            <a:r>
-              <a:rPr lang="en-US" dirty="0" err="1" smtClean="0"/>
-              <a:t>HashMap$Entry</a:t>
-            </a:r>
-            <a:endParaRPr lang="en-US" dirty="0"/>
-          </a:p>
-        </p:txBody>
-      </p:sp>
-      <p:sp>
-        <p:nvSpPr>
-          <p:cNvPr id="35" name="Rectangle 34"/>
-          <p:cNvSpPr/>
-          <p:nvPr/>
-        </p:nvSpPr>
-        <p:spPr>
-          <a:xfrm>
-            <a:off x="3200400" y="568404"/>
-            <a:ext cx="4572000" cy="369332"/>
-          </a:xfrm>
-          <a:prstGeom prst="rect">
-            <a:avLst/>
-          </a:prstGeom>
-        </p:spPr>
-        <p:txBody>
-          <a:bodyPr>
-            <a:spAutoFit/>
-          </a:bodyPr>
-          <a:lstStyle/>
-          <a:p>
-            <a:r>
-              <a:rPr lang="en-US" i="1" dirty="0" smtClean="0"/>
-              <a:t> Wrapper object</a:t>
-            </a:r>
-            <a:r>
-              <a:rPr lang="en-US" i="1" dirty="0" smtClean="0"/>
-              <a:t>: 16 bytes</a:t>
-            </a:r>
-          </a:p>
-        </p:txBody>
-      </p:sp>
-      <p:sp>
-        <p:nvSpPr>
-          <p:cNvPr id="36" name="Rectangle 35"/>
-          <p:cNvSpPr/>
-          <p:nvPr/>
-        </p:nvSpPr>
-        <p:spPr>
-          <a:xfrm>
-            <a:off x="4724400" y="2025134"/>
-            <a:ext cx="3505200" cy="369332"/>
-          </a:xfrm>
-          <a:prstGeom prst="rect">
-            <a:avLst/>
-          </a:prstGeom>
-        </p:spPr>
-        <p:txBody>
-          <a:bodyPr wrap="square">
-            <a:spAutoFit/>
-          </a:bodyPr>
-          <a:lstStyle/>
-          <a:p>
-            <a:r>
-              <a:rPr lang="en-US" i="1" dirty="0" smtClean="0"/>
-              <a:t>Wrapper object: 40 bytes</a:t>
-            </a:r>
-            <a:endParaRPr lang="en-US" i="1" dirty="0" smtClean="0"/>
-          </a:p>
-        </p:txBody>
-      </p:sp>
-      <p:sp>
-        <p:nvSpPr>
-          <p:cNvPr id="38" name="Rectangle 37"/>
-          <p:cNvSpPr/>
-          <p:nvPr/>
-        </p:nvSpPr>
-        <p:spPr>
-          <a:xfrm>
-            <a:off x="6172200" y="3105834"/>
-            <a:ext cx="4572000" cy="646331"/>
-          </a:xfrm>
-          <a:prstGeom prst="rect">
-            <a:avLst/>
-          </a:prstGeom>
-        </p:spPr>
-        <p:txBody>
-          <a:bodyPr>
-            <a:spAutoFit/>
-          </a:bodyPr>
-          <a:lstStyle/>
-          <a:p>
-            <a:r>
-              <a:rPr lang="en-US" i="1" dirty="0" smtClean="0"/>
-              <a:t>16 entries by default:</a:t>
-            </a:r>
-          </a:p>
-          <a:p>
-            <a:r>
-              <a:rPr lang="en-US" i="1" dirty="0" smtClean="0"/>
-              <a:t>80 bytes</a:t>
-            </a:r>
-          </a:p>
-        </p:txBody>
-      </p:sp>
-      <p:sp>
-        <p:nvSpPr>
-          <p:cNvPr id="20" name="Rectangle 19"/>
-          <p:cNvSpPr/>
-          <p:nvPr/>
-        </p:nvSpPr>
-        <p:spPr>
-          <a:xfrm>
-            <a:off x="3200400" y="4463534"/>
-            <a:ext cx="2286000" cy="369332"/>
-          </a:xfrm>
-          <a:prstGeom prst="rect">
-            <a:avLst/>
-          </a:prstGeom>
-        </p:spPr>
-        <p:txBody>
-          <a:bodyPr wrap="square">
-            <a:spAutoFit/>
-          </a:bodyPr>
-          <a:lstStyle/>
-          <a:p>
-            <a:r>
-              <a:rPr lang="en-US" i="1" dirty="0" smtClean="0"/>
-              <a:t>24 bytes per entry</a:t>
-            </a:r>
-            <a:endParaRPr lang="en-US" i="1" dirty="0" smtClean="0"/>
-          </a:p>
-        </p:txBody>
-      </p:sp>
+          <a:ln w="25400" algn="ctr">
+            <a:solidFill>
+              <a:schemeClr val="tx1"/>
+            </a:solidFill>
+            <a:miter lim="800000"/>
+            <a:headEnd/>
+            <a:tailEnd type="arrow" w="med" len="med"/>
+          </a:ln>
+          <a:effectLst>
+            <a:outerShdw dist="20000" dir="5400000" rotWithShape="0">
+              <a:srgbClr val="000000">
+                <a:alpha val="37999"/>
+              </a:srgbClr>
+            </a:outerShdw>
+          </a:effectLst>
+        </p:spPr>
+      </p:cxnSp>
     </p:spTree>
   </p:cSld>
   <p:clrMapOvr>

</xml_diff>

<commit_message>
Relationships: new HashSet figure.
</commit_message>
<xml_diff>
--- a/part1/Figures/collections/inside-hashset.pptx
+++ b/part1/Figures/collections/inside-hashset.pptx
@@ -4,6 +4,9 @@
   <p:sldMasterIdLst>
     <p:sldMasterId id="2147483648" r:id="rId1"/>
   </p:sldMasterIdLst>
+  <p:notesMasterIdLst>
+    <p:notesMasterId r:id="rId3"/>
+  </p:notesMasterIdLst>
   <p:sldIdLst>
     <p:sldId id="256" r:id="rId2"/>
   </p:sldIdLst>
@@ -137,6 +140,440 @@
 </p:presentation>
 </file>
 
+<file path=ppt/notesMasters/notesMaster1.xml><?xml version="1.0" encoding="utf-8"?>
+<p:notesMaster xmlns:a="http://schemas.openxmlformats.org/drawingml/2006/main" xmlns:r="http://schemas.openxmlformats.org/officeDocument/2006/relationships" xmlns:p="http://schemas.openxmlformats.org/presentationml/2006/main">
+  <p:cSld>
+    <p:bg>
+      <p:bgRef idx="1001">
+        <a:schemeClr val="bg1"/>
+      </p:bgRef>
+    </p:bg>
+    <p:spTree>
+      <p:nvGrpSpPr>
+        <p:cNvPr id="1" name=""/>
+        <p:cNvGrpSpPr/>
+        <p:nvPr/>
+      </p:nvGrpSpPr>
+      <p:grpSpPr>
+        <a:xfrm>
+          <a:off x="0" y="0"/>
+          <a:ext cx="0" cy="0"/>
+          <a:chOff x="0" y="0"/>
+          <a:chExt cx="0" cy="0"/>
+        </a:xfrm>
+      </p:grpSpPr>
+      <p:sp>
+        <p:nvSpPr>
+          <p:cNvPr id="2" name="Header Placeholder 1"/>
+          <p:cNvSpPr>
+            <a:spLocks noGrp="1"/>
+          </p:cNvSpPr>
+          <p:nvPr>
+            <p:ph type="hdr" sz="quarter"/>
+          </p:nvPr>
+        </p:nvSpPr>
+        <p:spPr>
+          <a:xfrm>
+            <a:off x="0" y="0"/>
+            <a:ext cx="2971800" cy="457200"/>
+          </a:xfrm>
+          <a:prstGeom prst="rect">
+            <a:avLst/>
+          </a:prstGeom>
+        </p:spPr>
+        <p:txBody>
+          <a:bodyPr vert="horz" lIns="91440" tIns="45720" rIns="91440" bIns="45720" rtlCol="0"/>
+          <a:lstStyle>
+            <a:lvl1pPr algn="l">
+              <a:defRPr sz="1200"/>
+            </a:lvl1pPr>
+          </a:lstStyle>
+          <a:p>
+            <a:endParaRPr lang="en-US" dirty="0"/>
+          </a:p>
+        </p:txBody>
+      </p:sp>
+      <p:sp>
+        <p:nvSpPr>
+          <p:cNvPr id="3" name="Date Placeholder 2"/>
+          <p:cNvSpPr>
+            <a:spLocks noGrp="1"/>
+          </p:cNvSpPr>
+          <p:nvPr>
+            <p:ph type="dt" idx="1"/>
+          </p:nvPr>
+        </p:nvSpPr>
+        <p:spPr>
+          <a:xfrm>
+            <a:off x="3884613" y="0"/>
+            <a:ext cx="2971800" cy="457200"/>
+          </a:xfrm>
+          <a:prstGeom prst="rect">
+            <a:avLst/>
+          </a:prstGeom>
+        </p:spPr>
+        <p:txBody>
+          <a:bodyPr vert="horz" lIns="91440" tIns="45720" rIns="91440" bIns="45720" rtlCol="0"/>
+          <a:lstStyle>
+            <a:lvl1pPr algn="r">
+              <a:defRPr sz="1200"/>
+            </a:lvl1pPr>
+          </a:lstStyle>
+          <a:p>
+            <a:fld id="{63399E6A-A389-3547-948A-FA1167BEF3D4}" type="datetimeFigureOut">
+              <a:rPr lang="en-US" smtClean="0"/>
+              <a:t>7/6/12</a:t>
+            </a:fld>
+            <a:endParaRPr lang="en-US" dirty="0"/>
+          </a:p>
+        </p:txBody>
+      </p:sp>
+      <p:sp>
+        <p:nvSpPr>
+          <p:cNvPr id="4" name="Slide Image Placeholder 3"/>
+          <p:cNvSpPr>
+            <a:spLocks noGrp="1" noRot="1" noChangeAspect="1"/>
+          </p:cNvSpPr>
+          <p:nvPr>
+            <p:ph type="sldImg" idx="2"/>
+          </p:nvPr>
+        </p:nvSpPr>
+        <p:spPr>
+          <a:xfrm>
+            <a:off x="1143000" y="685800"/>
+            <a:ext cx="4572000" cy="3429000"/>
+          </a:xfrm>
+          <a:prstGeom prst="rect">
+            <a:avLst/>
+          </a:prstGeom>
+          <a:noFill/>
+          <a:ln w="12700">
+            <a:solidFill>
+              <a:prstClr val="black"/>
+            </a:solidFill>
+          </a:ln>
+        </p:spPr>
+        <p:txBody>
+          <a:bodyPr vert="horz" lIns="91440" tIns="45720" rIns="91440" bIns="45720" rtlCol="0" anchor="ctr"/>
+          <a:lstStyle/>
+          <a:p>
+            <a:endParaRPr lang="en-US" dirty="0"/>
+          </a:p>
+        </p:txBody>
+      </p:sp>
+      <p:sp>
+        <p:nvSpPr>
+          <p:cNvPr id="5" name="Notes Placeholder 4"/>
+          <p:cNvSpPr>
+            <a:spLocks noGrp="1"/>
+          </p:cNvSpPr>
+          <p:nvPr>
+            <p:ph type="body" sz="quarter" idx="3"/>
+          </p:nvPr>
+        </p:nvSpPr>
+        <p:spPr>
+          <a:xfrm>
+            <a:off x="685800" y="4343400"/>
+            <a:ext cx="5486400" cy="4114800"/>
+          </a:xfrm>
+          <a:prstGeom prst="rect">
+            <a:avLst/>
+          </a:prstGeom>
+        </p:spPr>
+        <p:txBody>
+          <a:bodyPr vert="horz" lIns="91440" tIns="45720" rIns="91440" bIns="45720" rtlCol="0"/>
+          <a:lstStyle/>
+          <a:p>
+            <a:pPr lvl="0"/>
+            <a:r>
+              <a:rPr lang="en-US" smtClean="0"/>
+              <a:t>Click to edit Master text styles</a:t>
+            </a:r>
+          </a:p>
+          <a:p>
+            <a:pPr lvl="1"/>
+            <a:r>
+              <a:rPr lang="en-US" smtClean="0"/>
+              <a:t>Second level</a:t>
+            </a:r>
+          </a:p>
+          <a:p>
+            <a:pPr lvl="2"/>
+            <a:r>
+              <a:rPr lang="en-US" smtClean="0"/>
+              <a:t>Third level</a:t>
+            </a:r>
+          </a:p>
+          <a:p>
+            <a:pPr lvl="3"/>
+            <a:r>
+              <a:rPr lang="en-US" smtClean="0"/>
+              <a:t>Fourth level</a:t>
+            </a:r>
+          </a:p>
+          <a:p>
+            <a:pPr lvl="4"/>
+            <a:r>
+              <a:rPr lang="en-US" smtClean="0"/>
+              <a:t>Fifth level</a:t>
+            </a:r>
+            <a:endParaRPr lang="en-US"/>
+          </a:p>
+        </p:txBody>
+      </p:sp>
+      <p:sp>
+        <p:nvSpPr>
+          <p:cNvPr id="6" name="Footer Placeholder 5"/>
+          <p:cNvSpPr>
+            <a:spLocks noGrp="1"/>
+          </p:cNvSpPr>
+          <p:nvPr>
+            <p:ph type="ftr" sz="quarter" idx="4"/>
+          </p:nvPr>
+        </p:nvSpPr>
+        <p:spPr>
+          <a:xfrm>
+            <a:off x="0" y="8685213"/>
+            <a:ext cx="2971800" cy="457200"/>
+          </a:xfrm>
+          <a:prstGeom prst="rect">
+            <a:avLst/>
+          </a:prstGeom>
+        </p:spPr>
+        <p:txBody>
+          <a:bodyPr vert="horz" lIns="91440" tIns="45720" rIns="91440" bIns="45720" rtlCol="0" anchor="b"/>
+          <a:lstStyle>
+            <a:lvl1pPr algn="l">
+              <a:defRPr sz="1200"/>
+            </a:lvl1pPr>
+          </a:lstStyle>
+          <a:p>
+            <a:endParaRPr lang="en-US" dirty="0"/>
+          </a:p>
+        </p:txBody>
+      </p:sp>
+      <p:sp>
+        <p:nvSpPr>
+          <p:cNvPr id="7" name="Slide Number Placeholder 6"/>
+          <p:cNvSpPr>
+            <a:spLocks noGrp="1"/>
+          </p:cNvSpPr>
+          <p:nvPr>
+            <p:ph type="sldNum" sz="quarter" idx="5"/>
+          </p:nvPr>
+        </p:nvSpPr>
+        <p:spPr>
+          <a:xfrm>
+            <a:off x="3884613" y="8685213"/>
+            <a:ext cx="2971800" cy="457200"/>
+          </a:xfrm>
+          <a:prstGeom prst="rect">
+            <a:avLst/>
+          </a:prstGeom>
+        </p:spPr>
+        <p:txBody>
+          <a:bodyPr vert="horz" lIns="91440" tIns="45720" rIns="91440" bIns="45720" rtlCol="0" anchor="b"/>
+          <a:lstStyle>
+            <a:lvl1pPr algn="r">
+              <a:defRPr sz="1200"/>
+            </a:lvl1pPr>
+          </a:lstStyle>
+          <a:p>
+            <a:fld id="{26E6EE75-3F2A-9041-8B1A-2272835C97F9}" type="slidenum">
+              <a:rPr lang="en-US" smtClean="0"/>
+              <a:t>‹#›</a:t>
+            </a:fld>
+            <a:endParaRPr lang="en-US" dirty="0"/>
+          </a:p>
+        </p:txBody>
+      </p:sp>
+    </p:spTree>
+    <p:extLst>
+      <p:ext uri="{BB962C8B-B14F-4D97-AF65-F5344CB8AC3E}">
+        <p14:creationId xmlns:p14="http://schemas.microsoft.com/office/powerpoint/2010/main" val="1933097513"/>
+      </p:ext>
+    </p:extLst>
+  </p:cSld>
+  <p:clrMap bg1="lt1" tx1="dk1" bg2="lt2" tx2="dk2" accent1="accent1" accent2="accent2" accent3="accent3" accent4="accent4" accent5="accent5" accent6="accent6" hlink="hlink" folHlink="folHlink"/>
+  <p:notesStyle>
+    <a:lvl1pPr marL="0" algn="l" defTabSz="457200" rtl="0" eaLnBrk="1" latinLnBrk="0" hangingPunct="1">
+      <a:defRPr sz="1200" kern="1200">
+        <a:solidFill>
+          <a:schemeClr val="tx1"/>
+        </a:solidFill>
+        <a:latin typeface="+mn-lt"/>
+        <a:ea typeface="+mn-ea"/>
+        <a:cs typeface="+mn-cs"/>
+      </a:defRPr>
+    </a:lvl1pPr>
+    <a:lvl2pPr marL="457200" algn="l" defTabSz="457200" rtl="0" eaLnBrk="1" latinLnBrk="0" hangingPunct="1">
+      <a:defRPr sz="1200" kern="1200">
+        <a:solidFill>
+          <a:schemeClr val="tx1"/>
+        </a:solidFill>
+        <a:latin typeface="+mn-lt"/>
+        <a:ea typeface="+mn-ea"/>
+        <a:cs typeface="+mn-cs"/>
+      </a:defRPr>
+    </a:lvl2pPr>
+    <a:lvl3pPr marL="914400" algn="l" defTabSz="457200" rtl="0" eaLnBrk="1" latinLnBrk="0" hangingPunct="1">
+      <a:defRPr sz="1200" kern="1200">
+        <a:solidFill>
+          <a:schemeClr val="tx1"/>
+        </a:solidFill>
+        <a:latin typeface="+mn-lt"/>
+        <a:ea typeface="+mn-ea"/>
+        <a:cs typeface="+mn-cs"/>
+      </a:defRPr>
+    </a:lvl3pPr>
+    <a:lvl4pPr marL="1371600" algn="l" defTabSz="457200" rtl="0" eaLnBrk="1" latinLnBrk="0" hangingPunct="1">
+      <a:defRPr sz="1200" kern="1200">
+        <a:solidFill>
+          <a:schemeClr val="tx1"/>
+        </a:solidFill>
+        <a:latin typeface="+mn-lt"/>
+        <a:ea typeface="+mn-ea"/>
+        <a:cs typeface="+mn-cs"/>
+      </a:defRPr>
+    </a:lvl4pPr>
+    <a:lvl5pPr marL="1828800" algn="l" defTabSz="457200" rtl="0" eaLnBrk="1" latinLnBrk="0" hangingPunct="1">
+      <a:defRPr sz="1200" kern="1200">
+        <a:solidFill>
+          <a:schemeClr val="tx1"/>
+        </a:solidFill>
+        <a:latin typeface="+mn-lt"/>
+        <a:ea typeface="+mn-ea"/>
+        <a:cs typeface="+mn-cs"/>
+      </a:defRPr>
+    </a:lvl5pPr>
+    <a:lvl6pPr marL="2286000" algn="l" defTabSz="457200" rtl="0" eaLnBrk="1" latinLnBrk="0" hangingPunct="1">
+      <a:defRPr sz="1200" kern="1200">
+        <a:solidFill>
+          <a:schemeClr val="tx1"/>
+        </a:solidFill>
+        <a:latin typeface="+mn-lt"/>
+        <a:ea typeface="+mn-ea"/>
+        <a:cs typeface="+mn-cs"/>
+      </a:defRPr>
+    </a:lvl6pPr>
+    <a:lvl7pPr marL="2743200" algn="l" defTabSz="457200" rtl="0" eaLnBrk="1" latinLnBrk="0" hangingPunct="1">
+      <a:defRPr sz="1200" kern="1200">
+        <a:solidFill>
+          <a:schemeClr val="tx1"/>
+        </a:solidFill>
+        <a:latin typeface="+mn-lt"/>
+        <a:ea typeface="+mn-ea"/>
+        <a:cs typeface="+mn-cs"/>
+      </a:defRPr>
+    </a:lvl7pPr>
+    <a:lvl8pPr marL="3200400" algn="l" defTabSz="457200" rtl="0" eaLnBrk="1" latinLnBrk="0" hangingPunct="1">
+      <a:defRPr sz="1200" kern="1200">
+        <a:solidFill>
+          <a:schemeClr val="tx1"/>
+        </a:solidFill>
+        <a:latin typeface="+mn-lt"/>
+        <a:ea typeface="+mn-ea"/>
+        <a:cs typeface="+mn-cs"/>
+      </a:defRPr>
+    </a:lvl8pPr>
+    <a:lvl9pPr marL="3657600" algn="l" defTabSz="457200" rtl="0" eaLnBrk="1" latinLnBrk="0" hangingPunct="1">
+      <a:defRPr sz="1200" kern="1200">
+        <a:solidFill>
+          <a:schemeClr val="tx1"/>
+        </a:solidFill>
+        <a:latin typeface="+mn-lt"/>
+        <a:ea typeface="+mn-ea"/>
+        <a:cs typeface="+mn-cs"/>
+      </a:defRPr>
+    </a:lvl9pPr>
+  </p:notesStyle>
+</p:notesMaster>
+</file>
+
+<file path=ppt/notesSlides/notesSlide1.xml><?xml version="1.0" encoding="utf-8"?>
+<p:notes xmlns:a="http://schemas.openxmlformats.org/drawingml/2006/main" xmlns:r="http://schemas.openxmlformats.org/officeDocument/2006/relationships" xmlns:p="http://schemas.openxmlformats.org/presentationml/2006/main">
+  <p:cSld>
+    <p:spTree>
+      <p:nvGrpSpPr>
+        <p:cNvPr id="1" name=""/>
+        <p:cNvGrpSpPr/>
+        <p:nvPr/>
+      </p:nvGrpSpPr>
+      <p:grpSpPr>
+        <a:xfrm>
+          <a:off x="0" y="0"/>
+          <a:ext cx="0" cy="0"/>
+          <a:chOff x="0" y="0"/>
+          <a:chExt cx="0" cy="0"/>
+        </a:xfrm>
+      </p:grpSpPr>
+      <p:sp>
+        <p:nvSpPr>
+          <p:cNvPr id="2" name="Slide Image Placeholder 1"/>
+          <p:cNvSpPr>
+            <a:spLocks noGrp="1" noRot="1" noChangeAspect="1"/>
+          </p:cNvSpPr>
+          <p:nvPr>
+            <p:ph type="sldImg"/>
+          </p:nvPr>
+        </p:nvSpPr>
+        <p:spPr/>
+      </p:sp>
+      <p:sp>
+        <p:nvSpPr>
+          <p:cNvPr id="3" name="Notes Placeholder 2"/>
+          <p:cNvSpPr>
+            <a:spLocks noGrp="1"/>
+          </p:cNvSpPr>
+          <p:nvPr>
+            <p:ph type="body" idx="1"/>
+          </p:nvPr>
+        </p:nvSpPr>
+        <p:spPr/>
+        <p:txBody>
+          <a:bodyPr/>
+          <a:lstStyle/>
+          <a:p>
+            <a:endParaRPr lang="en-US" dirty="0"/>
+          </a:p>
+        </p:txBody>
+      </p:sp>
+      <p:sp>
+        <p:nvSpPr>
+          <p:cNvPr id="4" name="Slide Number Placeholder 3"/>
+          <p:cNvSpPr>
+            <a:spLocks noGrp="1"/>
+          </p:cNvSpPr>
+          <p:nvPr>
+            <p:ph type="sldNum" sz="quarter" idx="10"/>
+          </p:nvPr>
+        </p:nvSpPr>
+        <p:spPr/>
+        <p:txBody>
+          <a:bodyPr/>
+          <a:lstStyle/>
+          <a:p>
+            <a:fld id="{26E6EE75-3F2A-9041-8B1A-2272835C97F9}" type="slidenum">
+              <a:rPr lang="en-US" smtClean="0"/>
+              <a:t>1</a:t>
+            </a:fld>
+            <a:endParaRPr lang="en-US" dirty="0"/>
+          </a:p>
+        </p:txBody>
+      </p:sp>
+    </p:spTree>
+    <p:extLst>
+      <p:ext uri="{BB962C8B-B14F-4D97-AF65-F5344CB8AC3E}">
+        <p14:creationId xmlns:p14="http://schemas.microsoft.com/office/powerpoint/2010/main" val="3516954612"/>
+      </p:ext>
+    </p:extLst>
+  </p:cSld>
+  <p:clrMapOvr>
+    <a:masterClrMapping/>
+  </p:clrMapOvr>
+</p:notes>
+</file>
+
 <file path=ppt/slideLayouts/slideLayout1.xml><?xml version="1.0" encoding="utf-8"?>
 <p:sldLayout xmlns:a="http://schemas.openxmlformats.org/drawingml/2006/main" xmlns:r="http://schemas.openxmlformats.org/officeDocument/2006/relationships" xmlns:p="http://schemas.openxmlformats.org/presentationml/2006/main" type="title" preserve="1">
   <p:cSld name="Title Slide">
@@ -328,9 +765,9 @@
               <a:pPr>
                 <a:defRPr/>
               </a:pPr>
-              <a:t>7/5/2012</a:t>
+              <a:t>7/6/12</a:t>
             </a:fld>
-            <a:endParaRPr lang="en-US"/>
+            <a:endParaRPr lang="en-US" dirty="0"/>
           </a:p>
         </p:txBody>
       </p:sp>
@@ -356,7 +793,7 @@
             <a:pPr>
               <a:defRPr/>
             </a:pPr>
-            <a:endParaRPr lang="en-US"/>
+            <a:endParaRPr lang="en-US" dirty="0"/>
           </a:p>
         </p:txBody>
       </p:sp>
@@ -389,7 +826,7 @@
               </a:pPr>
               <a:t>‹#›</a:t>
             </a:fld>
-            <a:endParaRPr lang="en-US"/>
+            <a:endParaRPr lang="en-US" dirty="0"/>
           </a:p>
         </p:txBody>
       </p:sp>
@@ -520,9 +957,9 @@
               <a:pPr>
                 <a:defRPr/>
               </a:pPr>
-              <a:t>7/5/2012</a:t>
+              <a:t>7/6/12</a:t>
             </a:fld>
-            <a:endParaRPr lang="en-US"/>
+            <a:endParaRPr lang="en-US" dirty="0"/>
           </a:p>
         </p:txBody>
       </p:sp>
@@ -548,7 +985,7 @@
             <a:pPr>
               <a:defRPr/>
             </a:pPr>
-            <a:endParaRPr lang="en-US"/>
+            <a:endParaRPr lang="en-US" dirty="0"/>
           </a:p>
         </p:txBody>
       </p:sp>
@@ -581,7 +1018,7 @@
               </a:pPr>
               <a:t>‹#›</a:t>
             </a:fld>
-            <a:endParaRPr lang="en-US"/>
+            <a:endParaRPr lang="en-US" dirty="0"/>
           </a:p>
         </p:txBody>
       </p:sp>
@@ -722,9 +1159,9 @@
               <a:pPr>
                 <a:defRPr/>
               </a:pPr>
-              <a:t>7/5/2012</a:t>
+              <a:t>7/6/12</a:t>
             </a:fld>
-            <a:endParaRPr lang="en-US"/>
+            <a:endParaRPr lang="en-US" dirty="0"/>
           </a:p>
         </p:txBody>
       </p:sp>
@@ -750,7 +1187,7 @@
             <a:pPr>
               <a:defRPr/>
             </a:pPr>
-            <a:endParaRPr lang="en-US"/>
+            <a:endParaRPr lang="en-US" dirty="0"/>
           </a:p>
         </p:txBody>
       </p:sp>
@@ -783,7 +1220,7 @@
               </a:pPr>
               <a:t>‹#›</a:t>
             </a:fld>
-            <a:endParaRPr lang="en-US"/>
+            <a:endParaRPr lang="en-US" dirty="0"/>
           </a:p>
         </p:txBody>
       </p:sp>
@@ -914,9 +1351,9 @@
               <a:pPr>
                 <a:defRPr/>
               </a:pPr>
-              <a:t>7/5/2012</a:t>
+              <a:t>7/6/12</a:t>
             </a:fld>
-            <a:endParaRPr lang="en-US"/>
+            <a:endParaRPr lang="en-US" dirty="0"/>
           </a:p>
         </p:txBody>
       </p:sp>
@@ -942,7 +1379,7 @@
             <a:pPr>
               <a:defRPr/>
             </a:pPr>
-            <a:endParaRPr lang="en-US"/>
+            <a:endParaRPr lang="en-US" dirty="0"/>
           </a:p>
         </p:txBody>
       </p:sp>
@@ -975,7 +1412,7 @@
               </a:pPr>
               <a:t>‹#›</a:t>
             </a:fld>
-            <a:endParaRPr lang="en-US"/>
+            <a:endParaRPr lang="en-US" dirty="0"/>
           </a:p>
         </p:txBody>
       </p:sp>
@@ -1182,9 +1619,9 @@
               <a:pPr>
                 <a:defRPr/>
               </a:pPr>
-              <a:t>7/5/2012</a:t>
+              <a:t>7/6/12</a:t>
             </a:fld>
-            <a:endParaRPr lang="en-US"/>
+            <a:endParaRPr lang="en-US" dirty="0"/>
           </a:p>
         </p:txBody>
       </p:sp>
@@ -1210,7 +1647,7 @@
             <a:pPr>
               <a:defRPr/>
             </a:pPr>
-            <a:endParaRPr lang="en-US"/>
+            <a:endParaRPr lang="en-US" dirty="0"/>
           </a:p>
         </p:txBody>
       </p:sp>
@@ -1243,7 +1680,7 @@
               </a:pPr>
               <a:t>‹#›</a:t>
             </a:fld>
-            <a:endParaRPr lang="en-US"/>
+            <a:endParaRPr lang="en-US" dirty="0"/>
           </a:p>
         </p:txBody>
       </p:sp>
@@ -1492,9 +1929,9 @@
               <a:pPr>
                 <a:defRPr/>
               </a:pPr>
-              <a:t>7/5/2012</a:t>
+              <a:t>7/6/12</a:t>
             </a:fld>
-            <a:endParaRPr lang="en-US"/>
+            <a:endParaRPr lang="en-US" dirty="0"/>
           </a:p>
         </p:txBody>
       </p:sp>
@@ -1520,7 +1957,7 @@
             <a:pPr>
               <a:defRPr/>
             </a:pPr>
-            <a:endParaRPr lang="en-US"/>
+            <a:endParaRPr lang="en-US" dirty="0"/>
           </a:p>
         </p:txBody>
       </p:sp>
@@ -1553,7 +1990,7 @@
               </a:pPr>
               <a:t>‹#›</a:t>
             </a:fld>
-            <a:endParaRPr lang="en-US"/>
+            <a:endParaRPr lang="en-US" dirty="0"/>
           </a:p>
         </p:txBody>
       </p:sp>
@@ -1936,9 +2373,9 @@
               <a:pPr>
                 <a:defRPr/>
               </a:pPr>
-              <a:t>7/5/2012</a:t>
+              <a:t>7/6/12</a:t>
             </a:fld>
-            <a:endParaRPr lang="en-US"/>
+            <a:endParaRPr lang="en-US" dirty="0"/>
           </a:p>
         </p:txBody>
       </p:sp>
@@ -1964,7 +2401,7 @@
             <a:pPr>
               <a:defRPr/>
             </a:pPr>
-            <a:endParaRPr lang="en-US"/>
+            <a:endParaRPr lang="en-US" dirty="0"/>
           </a:p>
         </p:txBody>
       </p:sp>
@@ -1997,7 +2434,7 @@
               </a:pPr>
               <a:t>‹#›</a:t>
             </a:fld>
-            <a:endParaRPr lang="en-US"/>
+            <a:endParaRPr lang="en-US" dirty="0"/>
           </a:p>
         </p:txBody>
       </p:sp>
@@ -2076,9 +2513,9 @@
               <a:pPr>
                 <a:defRPr/>
               </a:pPr>
-              <a:t>7/5/2012</a:t>
+              <a:t>7/6/12</a:t>
             </a:fld>
-            <a:endParaRPr lang="en-US"/>
+            <a:endParaRPr lang="en-US" dirty="0"/>
           </a:p>
         </p:txBody>
       </p:sp>
@@ -2104,7 +2541,7 @@
             <a:pPr>
               <a:defRPr/>
             </a:pPr>
-            <a:endParaRPr lang="en-US"/>
+            <a:endParaRPr lang="en-US" dirty="0"/>
           </a:p>
         </p:txBody>
       </p:sp>
@@ -2137,7 +2574,7 @@
               </a:pPr>
               <a:t>‹#›</a:t>
             </a:fld>
-            <a:endParaRPr lang="en-US"/>
+            <a:endParaRPr lang="en-US" dirty="0"/>
           </a:p>
         </p:txBody>
       </p:sp>
@@ -2193,9 +2630,9 @@
               <a:pPr>
                 <a:defRPr/>
               </a:pPr>
-              <a:t>7/5/2012</a:t>
+              <a:t>7/6/12</a:t>
             </a:fld>
-            <a:endParaRPr lang="en-US"/>
+            <a:endParaRPr lang="en-US" dirty="0"/>
           </a:p>
         </p:txBody>
       </p:sp>
@@ -2221,7 +2658,7 @@
             <a:pPr>
               <a:defRPr/>
             </a:pPr>
-            <a:endParaRPr lang="en-US"/>
+            <a:endParaRPr lang="en-US" dirty="0"/>
           </a:p>
         </p:txBody>
       </p:sp>
@@ -2254,7 +2691,7 @@
               </a:pPr>
               <a:t>‹#›</a:t>
             </a:fld>
-            <a:endParaRPr lang="en-US"/>
+            <a:endParaRPr lang="en-US" dirty="0"/>
           </a:p>
         </p:txBody>
       </p:sp>
@@ -2492,9 +2929,9 @@
               <a:pPr>
                 <a:defRPr/>
               </a:pPr>
-              <a:t>7/5/2012</a:t>
+              <a:t>7/6/12</a:t>
             </a:fld>
-            <a:endParaRPr lang="en-US"/>
+            <a:endParaRPr lang="en-US" dirty="0"/>
           </a:p>
         </p:txBody>
       </p:sp>
@@ -2520,7 +2957,7 @@
             <a:pPr>
               <a:defRPr/>
             </a:pPr>
-            <a:endParaRPr lang="en-US"/>
+            <a:endParaRPr lang="en-US" dirty="0"/>
           </a:p>
         </p:txBody>
       </p:sp>
@@ -2553,7 +2990,7 @@
               </a:pPr>
               <a:t>‹#›</a:t>
             </a:fld>
-            <a:endParaRPr lang="en-US"/>
+            <a:endParaRPr lang="en-US" dirty="0"/>
           </a:p>
         </p:txBody>
       </p:sp>
@@ -2674,7 +3111,7 @@
           </a:lstStyle>
           <a:p>
             <a:pPr lvl="0"/>
-            <a:endParaRPr lang="en-US" noProof="0"/>
+            <a:endParaRPr lang="en-US" noProof="0" dirty="0"/>
           </a:p>
         </p:txBody>
       </p:sp>
@@ -2770,9 +3207,9 @@
               <a:pPr>
                 <a:defRPr/>
               </a:pPr>
-              <a:t>7/5/2012</a:t>
+              <a:t>7/6/12</a:t>
             </a:fld>
-            <a:endParaRPr lang="en-US"/>
+            <a:endParaRPr lang="en-US" dirty="0"/>
           </a:p>
         </p:txBody>
       </p:sp>
@@ -2798,7 +3235,7 @@
             <a:pPr>
               <a:defRPr/>
             </a:pPr>
-            <a:endParaRPr lang="en-US"/>
+            <a:endParaRPr lang="en-US" dirty="0"/>
           </a:p>
         </p:txBody>
       </p:sp>
@@ -2831,7 +3268,7 @@
               </a:pPr>
               <a:t>‹#›</a:t>
             </a:fld>
-            <a:endParaRPr lang="en-US"/>
+            <a:endParaRPr lang="en-US" dirty="0"/>
           </a:p>
         </p:txBody>
       </p:sp>
@@ -3026,9 +3463,9 @@
               <a:pPr>
                 <a:defRPr/>
               </a:pPr>
-              <a:t>7/5/2012</a:t>
+              <a:t>7/6/12</a:t>
             </a:fld>
-            <a:endParaRPr lang="en-US"/>
+            <a:endParaRPr lang="en-US" dirty="0"/>
           </a:p>
         </p:txBody>
       </p:sp>
@@ -3076,7 +3513,7 @@
             <a:pPr>
               <a:defRPr/>
             </a:pPr>
-            <a:endParaRPr lang="en-US"/>
+            <a:endParaRPr lang="en-US" dirty="0"/>
           </a:p>
         </p:txBody>
       </p:sp>
@@ -3131,7 +3568,7 @@
               </a:pPr>
               <a:t>‹#›</a:t>
             </a:fld>
-            <a:endParaRPr lang="en-US"/>
+            <a:endParaRPr lang="en-US" dirty="0"/>
           </a:p>
         </p:txBody>
       </p:sp>
@@ -3552,69 +3989,13 @@
       </p:grpSpPr>
       <p:sp>
         <p:nvSpPr>
-          <p:cNvPr id="6" name="Rectangle 5"/>
-          <p:cNvSpPr/>
-          <p:nvPr/>
-        </p:nvSpPr>
-        <p:spPr>
-          <a:xfrm>
-            <a:off x="3121025" y="3216275"/>
-            <a:ext cx="612775" cy="650875"/>
-          </a:xfrm>
-          <a:prstGeom prst="rect">
-            <a:avLst/>
-          </a:prstGeom>
-          <a:solidFill>
-            <a:schemeClr val="bg1">
-              <a:lumMod val="85000"/>
-            </a:schemeClr>
-          </a:solidFill>
-          <a:ln>
-            <a:solidFill>
-              <a:schemeClr val="tx1"/>
-            </a:solidFill>
-          </a:ln>
-        </p:spPr>
-        <p:style>
-          <a:lnRef idx="1">
-            <a:schemeClr val="accent1"/>
-          </a:lnRef>
-          <a:fillRef idx="3">
-            <a:schemeClr val="accent1"/>
-          </a:fillRef>
-          <a:effectRef idx="2">
-            <a:schemeClr val="accent1"/>
-          </a:effectRef>
-          <a:fontRef idx="minor">
-            <a:schemeClr val="lt1"/>
-          </a:fontRef>
-        </p:style>
-        <p:txBody>
-          <a:bodyPr anchor="ctr"/>
-          <a:lstStyle/>
-          <a:p>
-            <a:pPr algn="ctr" fontAlgn="auto">
-              <a:spcBef>
-                <a:spcPts val="0"/>
-              </a:spcBef>
-              <a:spcAft>
-                <a:spcPts val="0"/>
-              </a:spcAft>
-              <a:defRPr/>
-            </a:pPr>
-            <a:endParaRPr lang="en-US"/>
-          </a:p>
-        </p:txBody>
-      </p:sp>
-      <p:sp>
-        <p:nvSpPr>
           <p:cNvPr id="4" name="Rectangle 3"/>
           <p:cNvSpPr/>
           <p:nvPr/>
         </p:nvSpPr>
         <p:spPr>
           <a:xfrm>
-            <a:off x="1676400" y="1863725"/>
+            <a:off x="838200" y="1816101"/>
             <a:ext cx="2133600" cy="609600"/>
           </a:xfrm>
           <a:prstGeom prst="rect">
@@ -3670,8 +4051,8 @@
         </p:nvSpPr>
         <p:spPr>
           <a:xfrm>
-            <a:off x="152400" y="644525"/>
-            <a:ext cx="2133600" cy="609600"/>
+            <a:off x="152400" y="764659"/>
+            <a:ext cx="2133600" cy="612648"/>
           </a:xfrm>
           <a:prstGeom prst="rect">
             <a:avLst/>
@@ -3702,7 +4083,9 @@
           </a:fontRef>
         </p:style>
         <p:txBody>
-          <a:bodyPr anchor="ctr"/>
+          <a:bodyPr anchor="ctr">
+            <a:spAutoFit/>
+          </a:bodyPr>
           <a:lstStyle/>
           <a:p>
             <a:pPr algn="ctr" fontAlgn="auto">
@@ -3714,20 +4097,497 @@
               </a:spcAft>
               <a:defRPr/>
             </a:pPr>
-            <a:endParaRPr lang="en-US"/>
-          </a:p>
-        </p:txBody>
-      </p:sp>
-      <p:sp>
-        <p:nvSpPr>
-          <p:cNvPr id="7" name="Rectangle 6"/>
+            <a:endParaRPr lang="en-US" dirty="0"/>
+          </a:p>
+        </p:txBody>
+      </p:sp>
+      <p:cxnSp>
+        <p:nvCxnSpPr>
+          <p:cNvPr id="17" name="Shape 16"/>
+          <p:cNvCxnSpPr>
+            <a:endCxn id="4" idx="1"/>
+          </p:cNvCxnSpPr>
+          <p:nvPr/>
+        </p:nvCxnSpPr>
+        <p:spPr>
+          <a:xfrm rot="16200000" flipH="1">
+            <a:off x="348480" y="1631180"/>
+            <a:ext cx="751371" cy="228069"/>
+          </a:xfrm>
+          <a:prstGeom prst="bentConnector2">
+            <a:avLst/>
+          </a:prstGeom>
+          <a:ln>
+            <a:solidFill>
+              <a:schemeClr val="tx1"/>
+            </a:solidFill>
+            <a:tailEnd type="arrow"/>
+          </a:ln>
+        </p:spPr>
+        <p:style>
+          <a:lnRef idx="2">
+            <a:schemeClr val="accent1"/>
+          </a:lnRef>
+          <a:fillRef idx="0">
+            <a:schemeClr val="accent1"/>
+          </a:fillRef>
+          <a:effectRef idx="1">
+            <a:schemeClr val="accent1"/>
+          </a:effectRef>
+          <a:fontRef idx="minor">
+            <a:schemeClr val="tx1"/>
+          </a:fontRef>
+        </p:style>
+      </p:cxnSp>
+      <p:cxnSp>
+        <p:nvCxnSpPr>
+          <p:cNvPr id="22" name="Shape 21"/>
+          <p:cNvCxnSpPr>
+            <a:cxnSpLocks noChangeShapeType="1"/>
+            <a:stCxn id="80" idx="3"/>
+            <a:endCxn id="7" idx="1"/>
+          </p:cNvCxnSpPr>
+          <p:nvPr/>
+        </p:nvCxnSpPr>
+        <p:spPr bwMode="auto">
+          <a:xfrm>
+            <a:off x="2133600" y="4035329"/>
+            <a:ext cx="457200" cy="15"/>
+          </a:xfrm>
+          <a:prstGeom prst="bentConnector3">
+            <a:avLst>
+              <a:gd name="adj1" fmla="val 50000"/>
+            </a:avLst>
+          </a:prstGeom>
+          <a:noFill/>
+          <a:ln w="25400" algn="ctr">
+            <a:solidFill>
+              <a:schemeClr val="tx1"/>
+            </a:solidFill>
+            <a:miter lim="800000"/>
+            <a:headEnd/>
+            <a:tailEnd type="arrow" w="med" len="med"/>
+          </a:ln>
+          <a:effectLst>
+            <a:outerShdw dist="20000" dir="5400000" rotWithShape="0">
+              <a:srgbClr val="000000">
+                <a:alpha val="37999"/>
+              </a:srgbClr>
+            </a:outerShdw>
+          </a:effectLst>
+        </p:spPr>
+      </p:cxnSp>
+      <p:sp>
+        <p:nvSpPr>
+          <p:cNvPr id="27" name="Rectangle 26"/>
           <p:cNvSpPr/>
           <p:nvPr/>
         </p:nvSpPr>
         <p:spPr>
           <a:xfrm>
-            <a:off x="4284663" y="3652838"/>
+            <a:off x="5562600" y="6346825"/>
             <a:ext cx="2133600" cy="609600"/>
+          </a:xfrm>
+          <a:prstGeom prst="rect">
+            <a:avLst/>
+          </a:prstGeom>
+          <a:noFill/>
+          <a:ln>
+            <a:noFill/>
+          </a:ln>
+        </p:spPr>
+        <p:style>
+          <a:lnRef idx="1">
+            <a:schemeClr val="accent1"/>
+          </a:lnRef>
+          <a:fillRef idx="3">
+            <a:schemeClr val="accent1"/>
+          </a:fillRef>
+          <a:effectRef idx="2">
+            <a:schemeClr val="accent1"/>
+          </a:effectRef>
+          <a:fontRef idx="minor">
+            <a:schemeClr val="lt1"/>
+          </a:fontRef>
+        </p:style>
+        <p:txBody>
+          <a:bodyPr anchor="ctr"/>
+          <a:lstStyle/>
+          <a:p>
+            <a:pPr algn="ctr" fontAlgn="auto">
+              <a:spcBef>
+                <a:spcPts val="0"/>
+              </a:spcBef>
+              <a:spcAft>
+                <a:spcPts val="0"/>
+              </a:spcAft>
+              <a:defRPr/>
+            </a:pPr>
+            <a:endParaRPr lang="en-US" dirty="0"/>
+          </a:p>
+        </p:txBody>
+      </p:sp>
+      <p:sp>
+        <p:nvSpPr>
+          <p:cNvPr id="13322" name="TextBox 29"/>
+          <p:cNvSpPr txBox="1">
+            <a:spLocks noChangeArrowheads="1"/>
+          </p:cNvSpPr>
+          <p:nvPr/>
+        </p:nvSpPr>
+        <p:spPr bwMode="auto">
+          <a:xfrm>
+            <a:off x="7936744" y="3806825"/>
+            <a:ext cx="563563" cy="457200"/>
+          </a:xfrm>
+          <a:prstGeom prst="rect">
+            <a:avLst/>
+          </a:prstGeom>
+          <a:noFill/>
+          <a:ln w="9525">
+            <a:noFill/>
+            <a:miter lim="800000"/>
+            <a:headEnd/>
+            <a:tailEnd/>
+          </a:ln>
+        </p:spPr>
+        <p:txBody>
+          <a:bodyPr wrap="none">
+            <a:spAutoFit/>
+          </a:bodyPr>
+          <a:lstStyle/>
+          <a:p>
+            <a:r>
+              <a:rPr lang="en-US" sz="2400" b="1" dirty="0">
+                <a:latin typeface="Calibri" pitchFamily="34" charset="0"/>
+              </a:rPr>
+              <a:t>…..</a:t>
+            </a:r>
+          </a:p>
+        </p:txBody>
+      </p:sp>
+      <p:sp>
+        <p:nvSpPr>
+          <p:cNvPr id="13323" name="TextBox 30"/>
+          <p:cNvSpPr txBox="1">
+            <a:spLocks noChangeArrowheads="1"/>
+          </p:cNvSpPr>
+          <p:nvPr/>
+        </p:nvSpPr>
+        <p:spPr bwMode="auto">
+          <a:xfrm>
+            <a:off x="152400" y="400243"/>
+            <a:ext cx="941388" cy="366712"/>
+          </a:xfrm>
+          <a:prstGeom prst="rect">
+            <a:avLst/>
+          </a:prstGeom>
+          <a:noFill/>
+          <a:ln w="9525">
+            <a:noFill/>
+            <a:miter lim="800000"/>
+            <a:headEnd/>
+            <a:tailEnd/>
+          </a:ln>
+        </p:spPr>
+        <p:txBody>
+          <a:bodyPr wrap="none">
+            <a:spAutoFit/>
+          </a:bodyPr>
+          <a:lstStyle/>
+          <a:p>
+            <a:r>
+              <a:rPr lang="en-US" dirty="0">
+                <a:latin typeface="Calibri" pitchFamily="34" charset="0"/>
+              </a:rPr>
+              <a:t>HashSet</a:t>
+            </a:r>
+          </a:p>
+        </p:txBody>
+      </p:sp>
+      <p:sp>
+        <p:nvSpPr>
+          <p:cNvPr id="13324" name="TextBox 31"/>
+          <p:cNvSpPr txBox="1">
+            <a:spLocks noChangeArrowheads="1"/>
+          </p:cNvSpPr>
+          <p:nvPr/>
+        </p:nvSpPr>
+        <p:spPr bwMode="auto">
+          <a:xfrm>
+            <a:off x="891768" y="1447800"/>
+            <a:ext cx="1071562" cy="366713"/>
+          </a:xfrm>
+          <a:prstGeom prst="rect">
+            <a:avLst/>
+          </a:prstGeom>
+          <a:noFill/>
+          <a:ln w="9525">
+            <a:noFill/>
+            <a:miter lim="800000"/>
+            <a:headEnd/>
+            <a:tailEnd/>
+          </a:ln>
+        </p:spPr>
+        <p:txBody>
+          <a:bodyPr wrap="none">
+            <a:spAutoFit/>
+          </a:bodyPr>
+          <a:lstStyle/>
+          <a:p>
+            <a:r>
+              <a:rPr lang="en-US" dirty="0">
+                <a:latin typeface="Calibri" pitchFamily="34" charset="0"/>
+              </a:rPr>
+              <a:t>HashMap</a:t>
+            </a:r>
+          </a:p>
+        </p:txBody>
+      </p:sp>
+      <p:sp>
+        <p:nvSpPr>
+          <p:cNvPr id="13325" name="TextBox 32"/>
+          <p:cNvSpPr txBox="1">
+            <a:spLocks noChangeArrowheads="1"/>
+          </p:cNvSpPr>
+          <p:nvPr/>
+        </p:nvSpPr>
+        <p:spPr bwMode="auto">
+          <a:xfrm>
+            <a:off x="1544638" y="2590976"/>
+            <a:ext cx="665162" cy="366712"/>
+          </a:xfrm>
+          <a:prstGeom prst="rect">
+            <a:avLst/>
+          </a:prstGeom>
+          <a:noFill/>
+          <a:ln w="9525">
+            <a:noFill/>
+            <a:miter lim="800000"/>
+            <a:headEnd/>
+            <a:tailEnd/>
+          </a:ln>
+        </p:spPr>
+        <p:txBody>
+          <a:bodyPr wrap="none">
+            <a:spAutoFit/>
+          </a:bodyPr>
+          <a:lstStyle/>
+          <a:p>
+            <a:r>
+              <a:rPr lang="en-US" dirty="0" smtClean="0">
+                <a:latin typeface="Calibri" pitchFamily="34" charset="0"/>
+              </a:rPr>
+              <a:t>array</a:t>
+            </a:r>
+            <a:endParaRPr lang="en-US" dirty="0">
+              <a:latin typeface="Calibri" pitchFamily="34" charset="0"/>
+            </a:endParaRPr>
+          </a:p>
+        </p:txBody>
+      </p:sp>
+      <p:sp>
+        <p:nvSpPr>
+          <p:cNvPr id="13327" name="Rectangle 34"/>
+          <p:cNvSpPr>
+            <a:spLocks noChangeArrowheads="1"/>
+          </p:cNvSpPr>
+          <p:nvPr/>
+        </p:nvSpPr>
+        <p:spPr bwMode="auto">
+          <a:xfrm>
+            <a:off x="2295408" y="577785"/>
+            <a:ext cx="2590799" cy="369332"/>
+          </a:xfrm>
+          <a:prstGeom prst="rect">
+            <a:avLst/>
+          </a:prstGeom>
+          <a:noFill/>
+          <a:ln w="9525">
+            <a:noFill/>
+            <a:miter lim="800000"/>
+            <a:headEnd/>
+            <a:tailEnd/>
+          </a:ln>
+        </p:spPr>
+        <p:txBody>
+          <a:bodyPr wrap="square">
+            <a:noAutofit/>
+          </a:bodyPr>
+          <a:lstStyle/>
+          <a:p>
+            <a:r>
+              <a:rPr lang="en-US" i="1" dirty="0">
+                <a:latin typeface="Calibri" pitchFamily="34" charset="0"/>
+              </a:rPr>
+              <a:t> </a:t>
+            </a:r>
+            <a:r>
+              <a:rPr lang="en-US" i="1" dirty="0" smtClean="0">
+                <a:latin typeface="Calibri" pitchFamily="34" charset="0"/>
+              </a:rPr>
+              <a:t>wrapper </a:t>
+            </a:r>
+            <a:r>
+              <a:rPr lang="en-US" i="1" dirty="0">
+                <a:latin typeface="Calibri" pitchFamily="34" charset="0"/>
+              </a:rPr>
+              <a:t>object: 16 bytes</a:t>
+            </a:r>
+          </a:p>
+        </p:txBody>
+      </p:sp>
+      <p:sp>
+        <p:nvSpPr>
+          <p:cNvPr id="13328" name="Rectangle 35"/>
+          <p:cNvSpPr>
+            <a:spLocks noChangeArrowheads="1"/>
+          </p:cNvSpPr>
+          <p:nvPr/>
+        </p:nvSpPr>
+        <p:spPr bwMode="auto">
+          <a:xfrm>
+            <a:off x="2971800" y="1626509"/>
+            <a:ext cx="2608263" cy="368300"/>
+          </a:xfrm>
+          <a:prstGeom prst="rect">
+            <a:avLst/>
+          </a:prstGeom>
+          <a:noFill/>
+          <a:ln w="9525">
+            <a:noFill/>
+            <a:miter lim="800000"/>
+            <a:headEnd/>
+            <a:tailEnd/>
+          </a:ln>
+        </p:spPr>
+        <p:txBody>
+          <a:bodyPr wrap="square">
+            <a:noAutofit/>
+          </a:bodyPr>
+          <a:lstStyle/>
+          <a:p>
+            <a:r>
+              <a:rPr lang="en-US" i="1" dirty="0">
+                <a:latin typeface="Calibri" pitchFamily="34" charset="0"/>
+              </a:rPr>
+              <a:t>w</a:t>
+            </a:r>
+            <a:r>
+              <a:rPr lang="en-US" i="1" dirty="0" smtClean="0">
+                <a:latin typeface="Calibri" pitchFamily="34" charset="0"/>
+              </a:rPr>
+              <a:t>rapper </a:t>
+            </a:r>
+            <a:r>
+              <a:rPr lang="en-US" i="1" dirty="0">
+                <a:latin typeface="Calibri" pitchFamily="34" charset="0"/>
+              </a:rPr>
+              <a:t>object: 40 bytes</a:t>
+            </a:r>
+          </a:p>
+        </p:txBody>
+      </p:sp>
+      <p:sp>
+        <p:nvSpPr>
+          <p:cNvPr id="13329" name="Rectangle 37"/>
+          <p:cNvSpPr>
+            <a:spLocks noChangeArrowheads="1"/>
+          </p:cNvSpPr>
+          <p:nvPr/>
+        </p:nvSpPr>
+        <p:spPr bwMode="auto">
+          <a:xfrm>
+            <a:off x="2142317" y="2780764"/>
+            <a:ext cx="2916187" cy="369332"/>
+          </a:xfrm>
+          <a:prstGeom prst="rect">
+            <a:avLst/>
+          </a:prstGeom>
+          <a:noFill/>
+          <a:ln w="9525">
+            <a:noFill/>
+            <a:miter lim="800000"/>
+            <a:headEnd/>
+            <a:tailEnd/>
+          </a:ln>
+        </p:spPr>
+        <p:txBody>
+          <a:bodyPr wrap="square">
+            <a:spAutoFit/>
+          </a:bodyPr>
+          <a:lstStyle/>
+          <a:p>
+            <a:r>
+              <a:rPr lang="en-US" i="1" dirty="0">
+                <a:latin typeface="Calibri" pitchFamily="34" charset="0"/>
+              </a:rPr>
+              <a:t>d</a:t>
+            </a:r>
+            <a:r>
+              <a:rPr lang="en-US" i="1" dirty="0" smtClean="0">
+                <a:latin typeface="Calibri" pitchFamily="34" charset="0"/>
+              </a:rPr>
+              <a:t>efault capacity 16: </a:t>
+            </a:r>
+            <a:r>
+              <a:rPr lang="en-US" i="1" dirty="0">
+                <a:latin typeface="Calibri" pitchFamily="34" charset="0"/>
+              </a:rPr>
+              <a:t>80 bytes</a:t>
+            </a:r>
+          </a:p>
+        </p:txBody>
+      </p:sp>
+      <p:sp>
+        <p:nvSpPr>
+          <p:cNvPr id="13330" name="Rectangle 19"/>
+          <p:cNvSpPr>
+            <a:spLocks noChangeArrowheads="1"/>
+          </p:cNvSpPr>
+          <p:nvPr/>
+        </p:nvSpPr>
+        <p:spPr bwMode="auto">
+          <a:xfrm>
+            <a:off x="7326071" y="3549218"/>
+            <a:ext cx="1883774" cy="369332"/>
+          </a:xfrm>
+          <a:prstGeom prst="rect">
+            <a:avLst/>
+          </a:prstGeom>
+          <a:noFill/>
+          <a:ln w="9525">
+            <a:noFill/>
+            <a:miter lim="800000"/>
+            <a:headEnd/>
+            <a:tailEnd/>
+          </a:ln>
+        </p:spPr>
+        <p:txBody>
+          <a:bodyPr wrap="square">
+            <a:spAutoFit/>
+          </a:bodyPr>
+          <a:lstStyle/>
+          <a:p>
+            <a:r>
+              <a:rPr lang="en-US" i="1" dirty="0">
+                <a:latin typeface="Calibri" pitchFamily="34" charset="0"/>
+              </a:rPr>
+              <a:t>24 bytes per entry</a:t>
+            </a:r>
+          </a:p>
+        </p:txBody>
+      </p:sp>
+      <p:sp>
+        <p:nvSpPr>
+          <p:cNvPr id="6" name="Rectangle 5"/>
+          <p:cNvSpPr/>
+          <p:nvPr/>
+        </p:nvSpPr>
+        <p:spPr>
+          <a:xfrm>
+            <a:off x="1524000" y="2955925"/>
+            <a:ext cx="612775" cy="708218"/>
           </a:xfrm>
           <a:prstGeom prst="rect">
             <a:avLst/>
@@ -3770,533 +4630,20 @@
               </a:spcAft>
               <a:defRPr/>
             </a:pPr>
-            <a:endParaRPr lang="en-US"/>
-          </a:p>
-        </p:txBody>
-      </p:sp>
-      <p:cxnSp>
-        <p:nvCxnSpPr>
-          <p:cNvPr id="17" name="Shape 16"/>
-          <p:cNvCxnSpPr>
-            <a:stCxn id="5" idx="2"/>
-            <a:endCxn id="4" idx="1"/>
-          </p:cNvCxnSpPr>
-          <p:nvPr/>
-        </p:nvCxnSpPr>
-        <p:spPr>
-          <a:xfrm rot="16200000" flipH="1">
-            <a:off x="990600" y="1482725"/>
-            <a:ext cx="914400" cy="457200"/>
-          </a:xfrm>
-          <a:prstGeom prst="bentConnector2">
-            <a:avLst/>
-          </a:prstGeom>
-          <a:ln>
-            <a:solidFill>
-              <a:schemeClr val="tx1"/>
-            </a:solidFill>
-            <a:tailEnd type="arrow"/>
-          </a:ln>
-        </p:spPr>
-        <p:style>
-          <a:lnRef idx="2">
-            <a:schemeClr val="accent1"/>
-          </a:lnRef>
-          <a:fillRef idx="0">
-            <a:schemeClr val="accent1"/>
-          </a:fillRef>
-          <a:effectRef idx="1">
-            <a:schemeClr val="accent1"/>
-          </a:effectRef>
-          <a:fontRef idx="minor">
-            <a:schemeClr val="tx1"/>
-          </a:fontRef>
-        </p:style>
-      </p:cxnSp>
-      <p:cxnSp>
-        <p:nvCxnSpPr>
-          <p:cNvPr id="19" name="Shape 18"/>
-          <p:cNvCxnSpPr>
-            <a:cxnSpLocks noChangeShapeType="1"/>
-            <a:stCxn id="4" idx="2"/>
-          </p:cNvCxnSpPr>
-          <p:nvPr/>
-        </p:nvCxnSpPr>
-        <p:spPr bwMode="auto">
-          <a:xfrm rot="16200000" flipH="1">
-            <a:off x="2096293" y="3120232"/>
-            <a:ext cx="1674813" cy="381000"/>
-          </a:xfrm>
-          <a:prstGeom prst="bentConnector2">
-            <a:avLst/>
-          </a:prstGeom>
-          <a:noFill/>
-          <a:ln w="25400" algn="ctr">
-            <a:solidFill>
-              <a:schemeClr val="tx1"/>
-            </a:solidFill>
-            <a:miter lim="800000"/>
-            <a:headEnd/>
-            <a:tailEnd type="arrow" w="med" len="med"/>
-          </a:ln>
-          <a:effectLst>
-            <a:outerShdw dist="20000" dir="5400000" rotWithShape="0">
-              <a:srgbClr val="000000">
-                <a:alpha val="37999"/>
-              </a:srgbClr>
-            </a:outerShdw>
-          </a:effectLst>
-        </p:spPr>
-      </p:cxnSp>
-      <p:cxnSp>
-        <p:nvCxnSpPr>
-          <p:cNvPr id="22" name="Shape 21"/>
-          <p:cNvCxnSpPr>
-            <a:cxnSpLocks noChangeShapeType="1"/>
-            <a:stCxn id="0" idx="3"/>
-            <a:endCxn id="7" idx="1"/>
-          </p:cNvCxnSpPr>
-          <p:nvPr/>
-        </p:nvCxnSpPr>
-        <p:spPr bwMode="auto">
-          <a:xfrm flipV="1">
-            <a:off x="3733800" y="3957638"/>
-            <a:ext cx="550863" cy="1587"/>
-          </a:xfrm>
-          <a:prstGeom prst="bentConnector3">
-            <a:avLst>
-              <a:gd name="adj1" fmla="val 49856"/>
-            </a:avLst>
-          </a:prstGeom>
-          <a:noFill/>
-          <a:ln w="25400" algn="ctr">
-            <a:solidFill>
-              <a:schemeClr val="tx1"/>
-            </a:solidFill>
-            <a:miter lim="800000"/>
-            <a:headEnd/>
-            <a:tailEnd type="arrow" w="med" len="med"/>
-          </a:ln>
-          <a:effectLst>
-            <a:outerShdw dist="20000" dir="5400000" rotWithShape="0">
-              <a:srgbClr val="000000">
-                <a:alpha val="37999"/>
-              </a:srgbClr>
-            </a:outerShdw>
-          </a:effectLst>
-        </p:spPr>
-      </p:cxnSp>
-      <p:sp>
-        <p:nvSpPr>
-          <p:cNvPr id="27" name="Rectangle 26"/>
+            <a:endParaRPr lang="en-US" dirty="0"/>
+          </a:p>
+        </p:txBody>
+      </p:sp>
+      <p:sp>
+        <p:nvSpPr>
+          <p:cNvPr id="24" name="Rectangle 5"/>
           <p:cNvSpPr/>
           <p:nvPr/>
         </p:nvSpPr>
         <p:spPr>
           <a:xfrm>
-            <a:off x="5562600" y="6346825"/>
-            <a:ext cx="2133600" cy="609600"/>
-          </a:xfrm>
-          <a:prstGeom prst="rect">
-            <a:avLst/>
-          </a:prstGeom>
-          <a:noFill/>
-          <a:ln>
-            <a:noFill/>
-          </a:ln>
-        </p:spPr>
-        <p:style>
-          <a:lnRef idx="1">
-            <a:schemeClr val="accent1"/>
-          </a:lnRef>
-          <a:fillRef idx="3">
-            <a:schemeClr val="accent1"/>
-          </a:fillRef>
-          <a:effectRef idx="2">
-            <a:schemeClr val="accent1"/>
-          </a:effectRef>
-          <a:fontRef idx="minor">
-            <a:schemeClr val="lt1"/>
-          </a:fontRef>
-        </p:style>
-        <p:txBody>
-          <a:bodyPr anchor="ctr"/>
-          <a:lstStyle/>
-          <a:p>
-            <a:pPr algn="ctr" fontAlgn="auto">
-              <a:spcBef>
-                <a:spcPts val="0"/>
-              </a:spcBef>
-              <a:spcAft>
-                <a:spcPts val="0"/>
-              </a:spcAft>
-              <a:defRPr/>
-            </a:pPr>
-            <a:endParaRPr lang="en-US"/>
-          </a:p>
-        </p:txBody>
-      </p:sp>
-      <p:sp>
-        <p:nvSpPr>
-          <p:cNvPr id="13322" name="TextBox 29"/>
-          <p:cNvSpPr txBox="1">
-            <a:spLocks noChangeArrowheads="1"/>
-          </p:cNvSpPr>
-          <p:nvPr/>
-        </p:nvSpPr>
-        <p:spPr bwMode="auto">
-          <a:xfrm>
-            <a:off x="6969125" y="3730625"/>
-            <a:ext cx="563563" cy="457200"/>
-          </a:xfrm>
-          <a:prstGeom prst="rect">
-            <a:avLst/>
-          </a:prstGeom>
-          <a:noFill/>
-          <a:ln w="9525">
-            <a:noFill/>
-            <a:miter lim="800000"/>
-            <a:headEnd/>
-            <a:tailEnd/>
-          </a:ln>
-        </p:spPr>
-        <p:txBody>
-          <a:bodyPr wrap="none">
-            <a:spAutoFit/>
-          </a:bodyPr>
-          <a:lstStyle/>
-          <a:p>
-            <a:r>
-              <a:rPr lang="en-US" sz="2400" b="1">
-                <a:latin typeface="Calibri" pitchFamily="34" charset="0"/>
-              </a:rPr>
-              <a:t>…..</a:t>
-            </a:r>
-          </a:p>
-        </p:txBody>
-      </p:sp>
-      <p:sp>
-        <p:nvSpPr>
-          <p:cNvPr id="13323" name="TextBox 30"/>
-          <p:cNvSpPr txBox="1">
-            <a:spLocks noChangeArrowheads="1"/>
-          </p:cNvSpPr>
-          <p:nvPr/>
-        </p:nvSpPr>
-        <p:spPr bwMode="auto">
-          <a:xfrm>
-            <a:off x="152400" y="322263"/>
-            <a:ext cx="941388" cy="366712"/>
-          </a:xfrm>
-          <a:prstGeom prst="rect">
-            <a:avLst/>
-          </a:prstGeom>
-          <a:noFill/>
-          <a:ln w="9525">
-            <a:noFill/>
-            <a:miter lim="800000"/>
-            <a:headEnd/>
-            <a:tailEnd/>
-          </a:ln>
-        </p:spPr>
-        <p:txBody>
-          <a:bodyPr wrap="none">
-            <a:spAutoFit/>
-          </a:bodyPr>
-          <a:lstStyle/>
-          <a:p>
-            <a:r>
-              <a:rPr lang="en-US">
-                <a:latin typeface="Calibri" pitchFamily="34" charset="0"/>
-              </a:rPr>
-              <a:t>HashSet</a:t>
-            </a:r>
-          </a:p>
-        </p:txBody>
-      </p:sp>
-      <p:sp>
-        <p:nvSpPr>
-          <p:cNvPr id="13324" name="TextBox 31"/>
-          <p:cNvSpPr txBox="1">
-            <a:spLocks noChangeArrowheads="1"/>
-          </p:cNvSpPr>
-          <p:nvPr/>
-        </p:nvSpPr>
-        <p:spPr bwMode="auto">
-          <a:xfrm>
-            <a:off x="1671638" y="1495425"/>
-            <a:ext cx="1071562" cy="366713"/>
-          </a:xfrm>
-          <a:prstGeom prst="rect">
-            <a:avLst/>
-          </a:prstGeom>
-          <a:noFill/>
-          <a:ln w="9525">
-            <a:noFill/>
-            <a:miter lim="800000"/>
-            <a:headEnd/>
-            <a:tailEnd/>
-          </a:ln>
-        </p:spPr>
-        <p:txBody>
-          <a:bodyPr wrap="none">
-            <a:spAutoFit/>
-          </a:bodyPr>
-          <a:lstStyle/>
-          <a:p>
-            <a:r>
-              <a:rPr lang="en-US">
-                <a:latin typeface="Calibri" pitchFamily="34" charset="0"/>
-              </a:rPr>
-              <a:t>HashMap</a:t>
-            </a:r>
-          </a:p>
-        </p:txBody>
-      </p:sp>
-      <p:sp>
-        <p:nvSpPr>
-          <p:cNvPr id="13325" name="TextBox 32"/>
-          <p:cNvSpPr txBox="1">
-            <a:spLocks noChangeArrowheads="1"/>
-          </p:cNvSpPr>
-          <p:nvPr/>
-        </p:nvSpPr>
-        <p:spPr bwMode="auto">
-          <a:xfrm>
-            <a:off x="3068638" y="2808288"/>
-            <a:ext cx="665162" cy="366712"/>
-          </a:xfrm>
-          <a:prstGeom prst="rect">
-            <a:avLst/>
-          </a:prstGeom>
-          <a:noFill/>
-          <a:ln w="9525">
-            <a:noFill/>
-            <a:miter lim="800000"/>
-            <a:headEnd/>
-            <a:tailEnd/>
-          </a:ln>
-        </p:spPr>
-        <p:txBody>
-          <a:bodyPr wrap="none">
-            <a:spAutoFit/>
-          </a:bodyPr>
-          <a:lstStyle/>
-          <a:p>
-            <a:r>
-              <a:rPr lang="en-US">
-                <a:latin typeface="Calibri" pitchFamily="34" charset="0"/>
-              </a:rPr>
-              <a:t>array</a:t>
-            </a:r>
-          </a:p>
-        </p:txBody>
-      </p:sp>
-      <p:sp>
-        <p:nvSpPr>
-          <p:cNvPr id="13326" name="TextBox 33"/>
-          <p:cNvSpPr txBox="1">
-            <a:spLocks noChangeArrowheads="1"/>
-          </p:cNvSpPr>
-          <p:nvPr/>
-        </p:nvSpPr>
-        <p:spPr bwMode="auto">
-          <a:xfrm>
-            <a:off x="4308475" y="3219450"/>
-            <a:ext cx="1677988" cy="366713"/>
-          </a:xfrm>
-          <a:prstGeom prst="rect">
-            <a:avLst/>
-          </a:prstGeom>
-          <a:noFill/>
-          <a:ln w="9525">
-            <a:noFill/>
-            <a:miter lim="800000"/>
-            <a:headEnd/>
-            <a:tailEnd/>
-          </a:ln>
-        </p:spPr>
-        <p:txBody>
-          <a:bodyPr wrap="none">
-            <a:spAutoFit/>
-          </a:bodyPr>
-          <a:lstStyle/>
-          <a:p>
-            <a:r>
-              <a:rPr lang="en-US">
-                <a:latin typeface="Calibri" pitchFamily="34" charset="0"/>
-              </a:rPr>
-              <a:t>HashMap$Entry</a:t>
-            </a:r>
-          </a:p>
-        </p:txBody>
-      </p:sp>
-      <p:sp>
-        <p:nvSpPr>
-          <p:cNvPr id="13327" name="Rectangle 34"/>
-          <p:cNvSpPr>
-            <a:spLocks noChangeArrowheads="1"/>
-          </p:cNvSpPr>
-          <p:nvPr/>
-        </p:nvSpPr>
-        <p:spPr bwMode="auto">
-          <a:xfrm>
-            <a:off x="2286000" y="277813"/>
-            <a:ext cx="4572000" cy="366712"/>
-          </a:xfrm>
-          <a:prstGeom prst="rect">
-            <a:avLst/>
-          </a:prstGeom>
-          <a:noFill/>
-          <a:ln w="9525">
-            <a:noFill/>
-            <a:miter lim="800000"/>
-            <a:headEnd/>
-            <a:tailEnd/>
-          </a:ln>
-        </p:spPr>
-        <p:txBody>
-          <a:bodyPr>
-            <a:spAutoFit/>
-          </a:bodyPr>
-          <a:lstStyle/>
-          <a:p>
-            <a:r>
-              <a:rPr lang="en-US" i="1">
-                <a:latin typeface="Calibri" pitchFamily="34" charset="0"/>
-              </a:rPr>
-              <a:t> Wrapper object: 16 bytes</a:t>
-            </a:r>
-          </a:p>
-        </p:txBody>
-      </p:sp>
-      <p:sp>
-        <p:nvSpPr>
-          <p:cNvPr id="13328" name="Rectangle 35"/>
-          <p:cNvSpPr>
-            <a:spLocks noChangeArrowheads="1"/>
-          </p:cNvSpPr>
-          <p:nvPr/>
-        </p:nvSpPr>
-        <p:spPr bwMode="auto">
-          <a:xfrm>
-            <a:off x="3810000" y="1419225"/>
-            <a:ext cx="3505200" cy="368300"/>
-          </a:xfrm>
-          <a:prstGeom prst="rect">
-            <a:avLst/>
-          </a:prstGeom>
-          <a:noFill/>
-          <a:ln w="9525">
-            <a:noFill/>
-            <a:miter lim="800000"/>
-            <a:headEnd/>
-            <a:tailEnd/>
-          </a:ln>
-        </p:spPr>
-        <p:txBody>
-          <a:bodyPr>
-            <a:spAutoFit/>
-          </a:bodyPr>
-          <a:lstStyle/>
-          <a:p>
-            <a:r>
-              <a:rPr lang="en-US" i="1">
-                <a:latin typeface="Calibri" pitchFamily="34" charset="0"/>
-              </a:rPr>
-              <a:t>Wrapper object: 40 bytes</a:t>
-            </a:r>
-          </a:p>
-        </p:txBody>
-      </p:sp>
-      <p:sp>
-        <p:nvSpPr>
-          <p:cNvPr id="13329" name="Rectangle 37"/>
-          <p:cNvSpPr>
-            <a:spLocks noChangeArrowheads="1"/>
-          </p:cNvSpPr>
-          <p:nvPr/>
-        </p:nvSpPr>
-        <p:spPr bwMode="auto">
-          <a:xfrm>
-            <a:off x="3816350" y="2806700"/>
-            <a:ext cx="3352800" cy="366713"/>
-          </a:xfrm>
-          <a:prstGeom prst="rect">
-            <a:avLst/>
-          </a:prstGeom>
-          <a:noFill/>
-          <a:ln w="9525">
-            <a:noFill/>
-            <a:miter lim="800000"/>
-            <a:headEnd/>
-            <a:tailEnd/>
-          </a:ln>
-        </p:spPr>
-        <p:txBody>
-          <a:bodyPr>
-            <a:spAutoFit/>
-          </a:bodyPr>
-          <a:lstStyle/>
-          <a:p>
-            <a:r>
-              <a:rPr lang="en-US" i="1">
-                <a:latin typeface="Calibri" pitchFamily="34" charset="0"/>
-              </a:rPr>
-              <a:t>default 16 slots: 80 bytes</a:t>
-            </a:r>
-          </a:p>
-        </p:txBody>
-      </p:sp>
-      <p:sp>
-        <p:nvSpPr>
-          <p:cNvPr id="13330" name="Rectangle 19"/>
-          <p:cNvSpPr>
-            <a:spLocks noChangeArrowheads="1"/>
-          </p:cNvSpPr>
-          <p:nvPr/>
-        </p:nvSpPr>
-        <p:spPr bwMode="auto">
-          <a:xfrm>
-            <a:off x="7092950" y="3221038"/>
-            <a:ext cx="1855788" cy="368300"/>
-          </a:xfrm>
-          <a:prstGeom prst="rect">
-            <a:avLst/>
-          </a:prstGeom>
-          <a:noFill/>
-          <a:ln w="9525">
-            <a:noFill/>
-            <a:miter lim="800000"/>
-            <a:headEnd/>
-            <a:tailEnd/>
-          </a:ln>
-        </p:spPr>
-        <p:txBody>
-          <a:bodyPr>
-            <a:spAutoFit/>
-          </a:bodyPr>
-          <a:lstStyle/>
-          <a:p>
-            <a:r>
-              <a:rPr lang="en-US" i="1">
-                <a:latin typeface="Calibri" pitchFamily="34" charset="0"/>
-              </a:rPr>
-              <a:t>24 bytes per entry</a:t>
-            </a:r>
-          </a:p>
-        </p:txBody>
-      </p:sp>
-      <p:sp>
-        <p:nvSpPr>
-          <p:cNvPr id="2" name="Rectangle 5"/>
-          <p:cNvSpPr/>
-          <p:nvPr/>
-        </p:nvSpPr>
-        <p:spPr>
-          <a:xfrm>
-            <a:off x="3121025" y="3867150"/>
-            <a:ext cx="612775" cy="182563"/>
+            <a:off x="1524001" y="3664143"/>
+            <a:ext cx="612775" cy="145857"/>
           </a:xfrm>
           <a:prstGeom prst="rect">
             <a:avLst/>
@@ -4339,20 +4686,248 @@
               </a:spcAft>
               <a:defRPr/>
             </a:pPr>
-            <a:endParaRPr lang="en-US"/>
-          </a:p>
-        </p:txBody>
-      </p:sp>
-      <p:sp>
-        <p:nvSpPr>
-          <p:cNvPr id="3" name="Rectangle 5"/>
+            <a:endParaRPr lang="en-US" dirty="0"/>
+          </a:p>
+        </p:txBody>
+      </p:sp>
+      <p:grpSp>
+        <p:nvGrpSpPr>
+          <p:cNvPr id="13399" name="Group 13398"/>
+          <p:cNvGrpSpPr/>
+          <p:nvPr/>
+        </p:nvGrpSpPr>
+        <p:grpSpPr>
+          <a:xfrm>
+            <a:off x="2590800" y="3349544"/>
+            <a:ext cx="2133600" cy="1580366"/>
+            <a:chOff x="2590800" y="3349544"/>
+            <a:chExt cx="2133600" cy="1580366"/>
+          </a:xfrm>
+        </p:grpSpPr>
+        <p:sp>
+          <p:nvSpPr>
+            <p:cNvPr id="7" name="Rectangle 6"/>
+            <p:cNvSpPr/>
+            <p:nvPr/>
+          </p:nvSpPr>
+          <p:spPr>
+            <a:xfrm>
+              <a:off x="2590800" y="3730544"/>
+              <a:ext cx="2133600" cy="609600"/>
+            </a:xfrm>
+            <a:prstGeom prst="rect">
+              <a:avLst/>
+            </a:prstGeom>
+            <a:solidFill>
+              <a:schemeClr val="bg1">
+                <a:lumMod val="85000"/>
+              </a:schemeClr>
+            </a:solidFill>
+            <a:ln>
+              <a:solidFill>
+                <a:schemeClr val="tx1"/>
+              </a:solidFill>
+            </a:ln>
+          </p:spPr>
+          <p:style>
+            <a:lnRef idx="1">
+              <a:schemeClr val="accent1"/>
+            </a:lnRef>
+            <a:fillRef idx="3">
+              <a:schemeClr val="accent1"/>
+            </a:fillRef>
+            <a:effectRef idx="2">
+              <a:schemeClr val="accent1"/>
+            </a:effectRef>
+            <a:fontRef idx="minor">
+              <a:schemeClr val="lt1"/>
+            </a:fontRef>
+          </p:style>
+          <p:txBody>
+            <a:bodyPr anchor="ctr"/>
+            <a:lstStyle/>
+            <a:p>
+              <a:pPr algn="ctr" fontAlgn="auto">
+                <a:spcBef>
+                  <a:spcPts val="0"/>
+                </a:spcBef>
+                <a:spcAft>
+                  <a:spcPts val="0"/>
+                </a:spcAft>
+                <a:defRPr/>
+              </a:pPr>
+              <a:endParaRPr lang="en-US" dirty="0"/>
+            </a:p>
+          </p:txBody>
+        </p:sp>
+        <p:sp>
+          <p:nvSpPr>
+            <p:cNvPr id="13326" name="TextBox 33"/>
+            <p:cNvSpPr txBox="1">
+              <a:spLocks noChangeArrowheads="1"/>
+            </p:cNvSpPr>
+            <p:nvPr/>
+          </p:nvSpPr>
+          <p:spPr bwMode="auto">
+            <a:xfrm>
+              <a:off x="2590800" y="3349544"/>
+              <a:ext cx="1677988" cy="366713"/>
+            </a:xfrm>
+            <a:prstGeom prst="rect">
+              <a:avLst/>
+            </a:prstGeom>
+            <a:noFill/>
+            <a:ln w="9525">
+              <a:noFill/>
+              <a:miter lim="800000"/>
+              <a:headEnd/>
+              <a:tailEnd/>
+            </a:ln>
+          </p:spPr>
+          <p:txBody>
+            <a:bodyPr wrap="none">
+              <a:spAutoFit/>
+            </a:bodyPr>
+            <a:lstStyle/>
+            <a:p>
+              <a:r>
+                <a:rPr lang="en-US" noProof="1" smtClean="0">
+                  <a:latin typeface="Calibri" pitchFamily="34" charset="0"/>
+                </a:rPr>
+                <a:t>HashMap$Entry</a:t>
+              </a:r>
+              <a:endParaRPr lang="en-US" noProof="1">
+                <a:latin typeface="Calibri" pitchFamily="34" charset="0"/>
+              </a:endParaRPr>
+            </a:p>
+          </p:txBody>
+        </p:sp>
+        <p:cxnSp>
+          <p:nvCxnSpPr>
+            <p:cNvPr id="25" name="Shape 21"/>
+            <p:cNvCxnSpPr>
+              <a:cxnSpLocks noChangeShapeType="1"/>
+              <a:stCxn id="7" idx="2"/>
+              <a:endCxn id="13396" idx="0"/>
+            </p:cNvCxnSpPr>
+            <p:nvPr/>
+          </p:nvCxnSpPr>
+          <p:spPr bwMode="auto">
+            <a:xfrm rot="5400000">
+              <a:off x="3546068" y="4451666"/>
+              <a:ext cx="223054" cy="10"/>
+            </a:xfrm>
+            <a:prstGeom prst="bentConnector3">
+              <a:avLst>
+                <a:gd name="adj1" fmla="val 50000"/>
+              </a:avLst>
+            </a:prstGeom>
+            <a:noFill/>
+            <a:ln w="25400" algn="ctr">
+              <a:solidFill>
+                <a:schemeClr val="tx1"/>
+              </a:solidFill>
+              <a:miter lim="800000"/>
+              <a:headEnd/>
+              <a:tailEnd type="arrow" w="med" len="med"/>
+            </a:ln>
+            <a:effectLst>
+              <a:outerShdw dist="20000" dir="5400000" rotWithShape="0">
+                <a:srgbClr val="000000">
+                  <a:alpha val="37999"/>
+                </a:srgbClr>
+              </a:outerShdw>
+            </a:effectLst>
+          </p:spPr>
+        </p:cxnSp>
+        <p:sp>
+          <p:nvSpPr>
+            <p:cNvPr id="13396" name="TextBox 32"/>
+            <p:cNvSpPr txBox="1">
+              <a:spLocks noChangeArrowheads="1"/>
+            </p:cNvSpPr>
+            <p:nvPr/>
+          </p:nvSpPr>
+          <p:spPr bwMode="auto">
+            <a:xfrm>
+              <a:off x="3129746" y="4563198"/>
+              <a:ext cx="1055687" cy="366712"/>
+            </a:xfrm>
+            <a:prstGeom prst="rect">
+              <a:avLst/>
+            </a:prstGeom>
+            <a:noFill/>
+            <a:ln w="9525">
+              <a:noFill/>
+              <a:miter lim="800000"/>
+              <a:headEnd/>
+              <a:tailEnd/>
+            </a:ln>
+          </p:spPr>
+          <p:txBody>
+            <a:bodyPr wrap="none">
+              <a:spAutoFit/>
+            </a:bodyPr>
+            <a:lstStyle/>
+            <a:p>
+              <a:r>
+                <a:rPr lang="en-US" dirty="0">
+                  <a:latin typeface="Calibri" pitchFamily="34" charset="0"/>
+                </a:rPr>
+                <a:t>user data</a:t>
+              </a:r>
+            </a:p>
+          </p:txBody>
+        </p:sp>
+      </p:grpSp>
+      <p:cxnSp>
+        <p:nvCxnSpPr>
+          <p:cNvPr id="66" name="Shape 16"/>
+          <p:cNvCxnSpPr>
+            <a:endCxn id="6" idx="1"/>
+          </p:cNvCxnSpPr>
+          <p:nvPr/>
+        </p:nvCxnSpPr>
+        <p:spPr>
+          <a:xfrm rot="16200000" flipH="1">
+            <a:off x="974148" y="2760182"/>
+            <a:ext cx="871634" cy="228069"/>
+          </a:xfrm>
+          <a:prstGeom prst="bentConnector2">
+            <a:avLst/>
+          </a:prstGeom>
+          <a:ln>
+            <a:solidFill>
+              <a:schemeClr val="tx1"/>
+            </a:solidFill>
+            <a:tailEnd type="arrow"/>
+          </a:ln>
+        </p:spPr>
+        <p:style>
+          <a:lnRef idx="2">
+            <a:schemeClr val="accent1"/>
+          </a:lnRef>
+          <a:fillRef idx="0">
+            <a:schemeClr val="accent1"/>
+          </a:fillRef>
+          <a:effectRef idx="1">
+            <a:schemeClr val="accent1"/>
+          </a:effectRef>
+          <a:fontRef idx="minor">
+            <a:schemeClr val="tx1"/>
+          </a:fontRef>
+        </p:style>
+      </p:cxnSp>
+      <p:sp>
+        <p:nvSpPr>
+          <p:cNvPr id="79" name="Rectangle 5"/>
           <p:cNvSpPr/>
           <p:nvPr/>
         </p:nvSpPr>
         <p:spPr>
           <a:xfrm>
-            <a:off x="3121025" y="4048125"/>
-            <a:ext cx="612775" cy="182563"/>
+            <a:off x="1520825" y="3816543"/>
+            <a:ext cx="612775" cy="145857"/>
           </a:xfrm>
           <a:prstGeom prst="rect">
             <a:avLst/>
@@ -4395,20 +4970,20 @@
               </a:spcAft>
               <a:defRPr/>
             </a:pPr>
-            <a:endParaRPr lang="en-US"/>
-          </a:p>
-        </p:txBody>
-      </p:sp>
-      <p:sp>
-        <p:nvSpPr>
-          <p:cNvPr id="8" name="Rectangle 5"/>
+            <a:endParaRPr lang="en-US" dirty="0"/>
+          </a:p>
+        </p:txBody>
+      </p:sp>
+      <p:sp>
+        <p:nvSpPr>
+          <p:cNvPr id="80" name="Rectangle 5"/>
           <p:cNvSpPr/>
           <p:nvPr/>
         </p:nvSpPr>
         <p:spPr>
           <a:xfrm>
-            <a:off x="3121025" y="4230688"/>
-            <a:ext cx="612775" cy="182562"/>
+            <a:off x="1520825" y="3962400"/>
+            <a:ext cx="612775" cy="145857"/>
           </a:xfrm>
           <a:prstGeom prst="rect">
             <a:avLst/>
@@ -4451,20 +5026,20 @@
               </a:spcAft>
               <a:defRPr/>
             </a:pPr>
-            <a:endParaRPr lang="en-US"/>
-          </a:p>
-        </p:txBody>
-      </p:sp>
-      <p:sp>
-        <p:nvSpPr>
-          <p:cNvPr id="9" name="Rectangle 5"/>
+            <a:endParaRPr lang="en-US" dirty="0"/>
+          </a:p>
+        </p:txBody>
+      </p:sp>
+      <p:sp>
+        <p:nvSpPr>
+          <p:cNvPr id="81" name="Rectangle 5"/>
           <p:cNvSpPr/>
           <p:nvPr/>
         </p:nvSpPr>
         <p:spPr>
           <a:xfrm>
-            <a:off x="3121025" y="4411663"/>
-            <a:ext cx="612775" cy="182562"/>
+            <a:off x="1524000" y="4116543"/>
+            <a:ext cx="612775" cy="145857"/>
           </a:xfrm>
           <a:prstGeom prst="rect">
             <a:avLst/>
@@ -4507,20 +5082,20 @@
               </a:spcAft>
               <a:defRPr/>
             </a:pPr>
-            <a:endParaRPr lang="en-US"/>
-          </a:p>
-        </p:txBody>
-      </p:sp>
-      <p:sp>
-        <p:nvSpPr>
-          <p:cNvPr id="10" name="Rectangle 5"/>
+            <a:endParaRPr lang="en-US" dirty="0"/>
+          </a:p>
+        </p:txBody>
+      </p:sp>
+      <p:sp>
+        <p:nvSpPr>
+          <p:cNvPr id="83" name="Rectangle 5"/>
           <p:cNvSpPr/>
           <p:nvPr/>
         </p:nvSpPr>
         <p:spPr>
           <a:xfrm>
-            <a:off x="3121025" y="4578350"/>
-            <a:ext cx="612775" cy="182563"/>
+            <a:off x="1524001" y="4267200"/>
+            <a:ext cx="612775" cy="145857"/>
           </a:xfrm>
           <a:prstGeom prst="rect">
             <a:avLst/>
@@ -4563,20 +5138,20 @@
               </a:spcAft>
               <a:defRPr/>
             </a:pPr>
-            <a:endParaRPr lang="en-US"/>
-          </a:p>
-        </p:txBody>
-      </p:sp>
-      <p:sp>
-        <p:nvSpPr>
-          <p:cNvPr id="11" name="Rectangle 5"/>
+            <a:endParaRPr lang="en-US" dirty="0"/>
+          </a:p>
+        </p:txBody>
+      </p:sp>
+      <p:sp>
+        <p:nvSpPr>
+          <p:cNvPr id="84" name="Rectangle 5"/>
           <p:cNvSpPr/>
           <p:nvPr/>
         </p:nvSpPr>
         <p:spPr>
           <a:xfrm>
-            <a:off x="3121025" y="4764088"/>
-            <a:ext cx="612775" cy="182562"/>
+            <a:off x="1524000" y="4413057"/>
+            <a:ext cx="612775" cy="145857"/>
           </a:xfrm>
           <a:prstGeom prst="rect">
             <a:avLst/>
@@ -4619,20 +5194,20 @@
               </a:spcAft>
               <a:defRPr/>
             </a:pPr>
-            <a:endParaRPr lang="en-US"/>
-          </a:p>
-        </p:txBody>
-      </p:sp>
-      <p:sp>
-        <p:nvSpPr>
-          <p:cNvPr id="12" name="Rectangle 5"/>
+            <a:endParaRPr lang="en-US" dirty="0"/>
+          </a:p>
+        </p:txBody>
+      </p:sp>
+      <p:sp>
+        <p:nvSpPr>
+          <p:cNvPr id="85" name="Rectangle 5"/>
           <p:cNvSpPr/>
           <p:nvPr/>
         </p:nvSpPr>
         <p:spPr>
           <a:xfrm>
-            <a:off x="3121025" y="4953000"/>
-            <a:ext cx="612775" cy="182563"/>
+            <a:off x="1524000" y="4558914"/>
+            <a:ext cx="612775" cy="145857"/>
           </a:xfrm>
           <a:prstGeom prst="rect">
             <a:avLst/>
@@ -4675,20 +5250,20 @@
               </a:spcAft>
               <a:defRPr/>
             </a:pPr>
-            <a:endParaRPr lang="en-US"/>
-          </a:p>
-        </p:txBody>
-      </p:sp>
-      <p:sp>
-        <p:nvSpPr>
-          <p:cNvPr id="13" name="Rectangle 5"/>
+            <a:endParaRPr lang="en-US" dirty="0"/>
+          </a:p>
+        </p:txBody>
+      </p:sp>
+      <p:sp>
+        <p:nvSpPr>
+          <p:cNvPr id="86" name="Rectangle 5"/>
           <p:cNvSpPr/>
           <p:nvPr/>
         </p:nvSpPr>
         <p:spPr>
           <a:xfrm>
-            <a:off x="3121025" y="5127625"/>
-            <a:ext cx="612775" cy="182563"/>
+            <a:off x="1520825" y="4704771"/>
+            <a:ext cx="612775" cy="145857"/>
           </a:xfrm>
           <a:prstGeom prst="rect">
             <a:avLst/>
@@ -4731,20 +5306,20 @@
               </a:spcAft>
               <a:defRPr/>
             </a:pPr>
-            <a:endParaRPr lang="en-US"/>
-          </a:p>
-        </p:txBody>
-      </p:sp>
-      <p:sp>
-        <p:nvSpPr>
-          <p:cNvPr id="14" name="Rectangle 5"/>
+            <a:endParaRPr lang="en-US" dirty="0"/>
+          </a:p>
+        </p:txBody>
+      </p:sp>
+      <p:sp>
+        <p:nvSpPr>
+          <p:cNvPr id="87" name="Rectangle 5"/>
           <p:cNvSpPr/>
           <p:nvPr/>
         </p:nvSpPr>
         <p:spPr>
           <a:xfrm>
-            <a:off x="3121025" y="5300663"/>
-            <a:ext cx="612775" cy="182562"/>
+            <a:off x="1520825" y="4850628"/>
+            <a:ext cx="612775" cy="145857"/>
           </a:xfrm>
           <a:prstGeom prst="rect">
             <a:avLst/>
@@ -4787,20 +5362,20 @@
               </a:spcAft>
               <a:defRPr/>
             </a:pPr>
-            <a:endParaRPr lang="en-US"/>
-          </a:p>
-        </p:txBody>
-      </p:sp>
-      <p:sp>
-        <p:nvSpPr>
-          <p:cNvPr id="15" name="Rectangle 5"/>
+            <a:endParaRPr lang="en-US" dirty="0"/>
+          </a:p>
+        </p:txBody>
+      </p:sp>
+      <p:sp>
+        <p:nvSpPr>
+          <p:cNvPr id="88" name="Rectangle 5"/>
           <p:cNvSpPr/>
           <p:nvPr/>
         </p:nvSpPr>
         <p:spPr>
           <a:xfrm>
-            <a:off x="3121025" y="5467350"/>
-            <a:ext cx="612775" cy="182563"/>
+            <a:off x="1520825" y="4996485"/>
+            <a:ext cx="612775" cy="145857"/>
           </a:xfrm>
           <a:prstGeom prst="rect">
             <a:avLst/>
@@ -4843,20 +5418,20 @@
               </a:spcAft>
               <a:defRPr/>
             </a:pPr>
-            <a:endParaRPr lang="en-US"/>
-          </a:p>
-        </p:txBody>
-      </p:sp>
-      <p:sp>
-        <p:nvSpPr>
-          <p:cNvPr id="16" name="Rectangle 5"/>
+            <a:endParaRPr lang="en-US" dirty="0"/>
+          </a:p>
+        </p:txBody>
+      </p:sp>
+      <p:sp>
+        <p:nvSpPr>
+          <p:cNvPr id="90" name="Rectangle 5"/>
           <p:cNvSpPr/>
           <p:nvPr/>
         </p:nvSpPr>
         <p:spPr>
           <a:xfrm>
-            <a:off x="3121025" y="5637213"/>
-            <a:ext cx="612775" cy="182562"/>
+            <a:off x="1520825" y="5151307"/>
+            <a:ext cx="612775" cy="145857"/>
           </a:xfrm>
           <a:prstGeom prst="rect">
             <a:avLst/>
@@ -4899,20 +5474,20 @@
               </a:spcAft>
               <a:defRPr/>
             </a:pPr>
-            <a:endParaRPr lang="en-US"/>
-          </a:p>
-        </p:txBody>
-      </p:sp>
-      <p:sp>
-        <p:nvSpPr>
-          <p:cNvPr id="18" name="Rectangle 5"/>
+            <a:endParaRPr lang="en-US" dirty="0"/>
+          </a:p>
+        </p:txBody>
+      </p:sp>
+      <p:sp>
+        <p:nvSpPr>
+          <p:cNvPr id="91" name="Rectangle 5"/>
           <p:cNvSpPr/>
           <p:nvPr/>
         </p:nvSpPr>
         <p:spPr>
           <a:xfrm>
-            <a:off x="3121025" y="5826125"/>
-            <a:ext cx="612775" cy="182563"/>
+            <a:off x="1520825" y="5297164"/>
+            <a:ext cx="612775" cy="145857"/>
           </a:xfrm>
           <a:prstGeom prst="rect">
             <a:avLst/>
@@ -4955,20 +5530,20 @@
               </a:spcAft>
               <a:defRPr/>
             </a:pPr>
-            <a:endParaRPr lang="en-US"/>
-          </a:p>
-        </p:txBody>
-      </p:sp>
-      <p:sp>
-        <p:nvSpPr>
-          <p:cNvPr id="20" name="Rectangle 5"/>
+            <a:endParaRPr lang="en-US" dirty="0"/>
+          </a:p>
+        </p:txBody>
+      </p:sp>
+      <p:sp>
+        <p:nvSpPr>
+          <p:cNvPr id="92" name="Rectangle 5"/>
           <p:cNvSpPr/>
           <p:nvPr/>
         </p:nvSpPr>
         <p:spPr>
           <a:xfrm>
-            <a:off x="3121025" y="6008688"/>
-            <a:ext cx="612775" cy="182562"/>
+            <a:off x="1520825" y="5443021"/>
+            <a:ext cx="612775" cy="145857"/>
           </a:xfrm>
           <a:prstGeom prst="rect">
             <a:avLst/>
@@ -5011,20 +5586,20 @@
               </a:spcAft>
               <a:defRPr/>
             </a:pPr>
-            <a:endParaRPr lang="en-US"/>
-          </a:p>
-        </p:txBody>
-      </p:sp>
-      <p:sp>
-        <p:nvSpPr>
-          <p:cNvPr id="21" name="Rectangle 5"/>
+            <a:endParaRPr lang="en-US" dirty="0"/>
+          </a:p>
+        </p:txBody>
+      </p:sp>
+      <p:sp>
+        <p:nvSpPr>
+          <p:cNvPr id="93" name="Rectangle 5"/>
           <p:cNvSpPr/>
           <p:nvPr/>
         </p:nvSpPr>
         <p:spPr>
           <a:xfrm>
-            <a:off x="3121025" y="6189663"/>
-            <a:ext cx="612775" cy="182562"/>
+            <a:off x="1520825" y="5588878"/>
+            <a:ext cx="612775" cy="145857"/>
           </a:xfrm>
           <a:prstGeom prst="rect">
             <a:avLst/>
@@ -5067,20 +5642,20 @@
               </a:spcAft>
               <a:defRPr/>
             </a:pPr>
-            <a:endParaRPr lang="en-US"/>
-          </a:p>
-        </p:txBody>
-      </p:sp>
-      <p:sp>
-        <p:nvSpPr>
-          <p:cNvPr id="23" name="Rectangle 5"/>
+            <a:endParaRPr lang="en-US" dirty="0"/>
+          </a:p>
+        </p:txBody>
+      </p:sp>
+      <p:sp>
+        <p:nvSpPr>
+          <p:cNvPr id="94" name="Rectangle 5"/>
           <p:cNvSpPr/>
           <p:nvPr/>
         </p:nvSpPr>
         <p:spPr>
           <a:xfrm>
-            <a:off x="3121025" y="6372225"/>
-            <a:ext cx="612775" cy="182563"/>
+            <a:off x="1520825" y="5734735"/>
+            <a:ext cx="612775" cy="145857"/>
           </a:xfrm>
           <a:prstGeom prst="rect">
             <a:avLst/>
@@ -5123,20 +5698,20 @@
               </a:spcAft>
               <a:defRPr/>
             </a:pPr>
-            <a:endParaRPr lang="en-US"/>
-          </a:p>
-        </p:txBody>
-      </p:sp>
-      <p:sp>
-        <p:nvSpPr>
-          <p:cNvPr id="24" name="Rectangle 5"/>
+            <a:endParaRPr lang="en-US" dirty="0"/>
+          </a:p>
+        </p:txBody>
+      </p:sp>
+      <p:sp>
+        <p:nvSpPr>
+          <p:cNvPr id="95" name="Rectangle 5"/>
           <p:cNvSpPr/>
           <p:nvPr/>
         </p:nvSpPr>
         <p:spPr>
           <a:xfrm>
-            <a:off x="3121025" y="6554788"/>
-            <a:ext cx="612775" cy="182562"/>
+            <a:off x="1520825" y="5880592"/>
+            <a:ext cx="612775" cy="145857"/>
           </a:xfrm>
           <a:prstGeom prst="rect">
             <a:avLst/>
@@ -5179,28 +5754,218 @@
               </a:spcAft>
               <a:defRPr/>
             </a:pPr>
-            <a:endParaRPr lang="en-US"/>
-          </a:p>
-        </p:txBody>
-      </p:sp>
+            <a:endParaRPr lang="en-US" dirty="0"/>
+          </a:p>
+        </p:txBody>
+      </p:sp>
+      <p:grpSp>
+        <p:nvGrpSpPr>
+          <p:cNvPr id="13397" name="Group 13396"/>
+          <p:cNvGrpSpPr/>
+          <p:nvPr/>
+        </p:nvGrpSpPr>
+        <p:grpSpPr>
+          <a:xfrm>
+            <a:off x="5191523" y="3351258"/>
+            <a:ext cx="2133600" cy="1580366"/>
+            <a:chOff x="5227808" y="4197908"/>
+            <a:chExt cx="2133600" cy="1580366"/>
+          </a:xfrm>
+        </p:grpSpPr>
+        <p:sp>
+          <p:nvSpPr>
+            <p:cNvPr id="104" name="Rectangle 103"/>
+            <p:cNvSpPr/>
+            <p:nvPr/>
+          </p:nvSpPr>
+          <p:spPr>
+            <a:xfrm>
+              <a:off x="5227808" y="4578908"/>
+              <a:ext cx="2133600" cy="609600"/>
+            </a:xfrm>
+            <a:prstGeom prst="rect">
+              <a:avLst/>
+            </a:prstGeom>
+            <a:solidFill>
+              <a:schemeClr val="bg1">
+                <a:lumMod val="85000"/>
+              </a:schemeClr>
+            </a:solidFill>
+            <a:ln>
+              <a:solidFill>
+                <a:schemeClr val="tx1"/>
+              </a:solidFill>
+            </a:ln>
+          </p:spPr>
+          <p:style>
+            <a:lnRef idx="1">
+              <a:schemeClr val="accent1"/>
+            </a:lnRef>
+            <a:fillRef idx="3">
+              <a:schemeClr val="accent1"/>
+            </a:fillRef>
+            <a:effectRef idx="2">
+              <a:schemeClr val="accent1"/>
+            </a:effectRef>
+            <a:fontRef idx="minor">
+              <a:schemeClr val="lt1"/>
+            </a:fontRef>
+          </p:style>
+          <p:txBody>
+            <a:bodyPr anchor="ctr"/>
+            <a:lstStyle/>
+            <a:p>
+              <a:pPr algn="ctr" fontAlgn="auto">
+                <a:spcBef>
+                  <a:spcPts val="0"/>
+                </a:spcBef>
+                <a:spcAft>
+                  <a:spcPts val="0"/>
+                </a:spcAft>
+                <a:defRPr/>
+              </a:pPr>
+              <a:endParaRPr lang="en-US" dirty="0"/>
+            </a:p>
+          </p:txBody>
+        </p:sp>
+        <p:sp>
+          <p:nvSpPr>
+            <p:cNvPr id="105" name="TextBox 33"/>
+            <p:cNvSpPr txBox="1">
+              <a:spLocks noChangeArrowheads="1"/>
+            </p:cNvSpPr>
+            <p:nvPr/>
+          </p:nvSpPr>
+          <p:spPr bwMode="auto">
+            <a:xfrm>
+              <a:off x="5227808" y="4197908"/>
+              <a:ext cx="1677988" cy="366713"/>
+            </a:xfrm>
+            <a:prstGeom prst="rect">
+              <a:avLst/>
+            </a:prstGeom>
+            <a:noFill/>
+            <a:ln w="9525">
+              <a:noFill/>
+              <a:miter lim="800000"/>
+              <a:headEnd/>
+              <a:tailEnd/>
+            </a:ln>
+          </p:spPr>
+          <p:txBody>
+            <a:bodyPr wrap="none">
+              <a:spAutoFit/>
+            </a:bodyPr>
+            <a:lstStyle/>
+            <a:p>
+              <a:r>
+                <a:rPr lang="en-US" noProof="1" smtClean="0">
+                  <a:latin typeface="Calibri" pitchFamily="34" charset="0"/>
+                </a:rPr>
+                <a:t>HashMap$Entry</a:t>
+              </a:r>
+              <a:endParaRPr lang="en-US" noProof="1">
+                <a:latin typeface="Calibri" pitchFamily="34" charset="0"/>
+              </a:endParaRPr>
+            </a:p>
+          </p:txBody>
+        </p:sp>
+        <p:cxnSp>
+          <p:nvCxnSpPr>
+            <p:cNvPr id="106" name="Shape 21"/>
+            <p:cNvCxnSpPr>
+              <a:cxnSpLocks noChangeShapeType="1"/>
+              <a:stCxn id="104" idx="2"/>
+              <a:endCxn id="107" idx="0"/>
+            </p:cNvCxnSpPr>
+            <p:nvPr/>
+          </p:nvCxnSpPr>
+          <p:spPr bwMode="auto">
+            <a:xfrm rot="5400000">
+              <a:off x="6183076" y="5300030"/>
+              <a:ext cx="223054" cy="10"/>
+            </a:xfrm>
+            <a:prstGeom prst="bentConnector3">
+              <a:avLst>
+                <a:gd name="adj1" fmla="val 50000"/>
+              </a:avLst>
+            </a:prstGeom>
+            <a:noFill/>
+            <a:ln w="25400" algn="ctr">
+              <a:solidFill>
+                <a:schemeClr val="tx1"/>
+              </a:solidFill>
+              <a:miter lim="800000"/>
+              <a:headEnd/>
+              <a:tailEnd type="arrow" w="med" len="med"/>
+            </a:ln>
+            <a:effectLst>
+              <a:outerShdw dist="20000" dir="5400000" rotWithShape="0">
+                <a:srgbClr val="000000">
+                  <a:alpha val="37999"/>
+                </a:srgbClr>
+              </a:outerShdw>
+            </a:effectLst>
+          </p:spPr>
+        </p:cxnSp>
+        <p:sp>
+          <p:nvSpPr>
+            <p:cNvPr id="107" name="TextBox 32"/>
+            <p:cNvSpPr txBox="1">
+              <a:spLocks noChangeArrowheads="1"/>
+            </p:cNvSpPr>
+            <p:nvPr/>
+          </p:nvSpPr>
+          <p:spPr bwMode="auto">
+            <a:xfrm>
+              <a:off x="5766754" y="5411562"/>
+              <a:ext cx="1055687" cy="366712"/>
+            </a:xfrm>
+            <a:prstGeom prst="rect">
+              <a:avLst/>
+            </a:prstGeom>
+            <a:noFill/>
+            <a:ln w="9525">
+              <a:noFill/>
+              <a:miter lim="800000"/>
+              <a:headEnd/>
+              <a:tailEnd/>
+            </a:ln>
+          </p:spPr>
+          <p:txBody>
+            <a:bodyPr wrap="none">
+              <a:spAutoFit/>
+            </a:bodyPr>
+            <a:lstStyle/>
+            <a:p>
+              <a:r>
+                <a:rPr lang="en-US" dirty="0">
+                  <a:latin typeface="Calibri" pitchFamily="34" charset="0"/>
+                </a:rPr>
+                <a:t>user data</a:t>
+              </a:r>
+            </a:p>
+          </p:txBody>
+        </p:sp>
+      </p:grpSp>
       <p:cxnSp>
         <p:nvCxnSpPr>
-          <p:cNvPr id="25" name="Shape 21"/>
+          <p:cNvPr id="111" name="Shape 21"/>
           <p:cNvCxnSpPr>
             <a:cxnSpLocks noChangeShapeType="1"/>
-            <a:stCxn id="7" idx="2"/>
-            <a:endCxn id="13396" idx="0"/>
+            <a:stCxn id="7" idx="3"/>
+            <a:endCxn id="104" idx="1"/>
           </p:cNvCxnSpPr>
           <p:nvPr/>
         </p:nvCxnSpPr>
         <p:spPr bwMode="auto">
           <a:xfrm>
-            <a:off x="6418263" y="3957638"/>
-            <a:ext cx="550862" cy="1587"/>
+            <a:off x="4724400" y="4035344"/>
+            <a:ext cx="467123" cy="1714"/>
           </a:xfrm>
           <a:prstGeom prst="bentConnector3">
             <a:avLst>
-              <a:gd name="adj1" fmla="val 49856"/>
+              <a:gd name="adj1" fmla="val 50000"/>
             </a:avLst>
           </a:prstGeom>
           <a:noFill/>
@@ -5223,22 +5988,22 @@
       </p:cxnSp>
       <p:cxnSp>
         <p:nvCxnSpPr>
-          <p:cNvPr id="26" name="Shape 21"/>
+          <p:cNvPr id="114" name="Shape 21"/>
           <p:cNvCxnSpPr>
             <a:cxnSpLocks noChangeShapeType="1"/>
-            <a:stCxn id="7" idx="2"/>
-            <a:endCxn id="13396" idx="0"/>
+            <a:stCxn id="104" idx="3"/>
+            <a:endCxn id="13322" idx="1"/>
           </p:cNvCxnSpPr>
           <p:nvPr/>
         </p:nvCxnSpPr>
         <p:spPr bwMode="auto">
           <a:xfrm flipV="1">
-            <a:off x="3733800" y="6459538"/>
-            <a:ext cx="560388" cy="4762"/>
+            <a:off x="7325123" y="4035425"/>
+            <a:ext cx="611621" cy="1633"/>
           </a:xfrm>
           <a:prstGeom prst="bentConnector3">
             <a:avLst>
-              <a:gd name="adj1" fmla="val 49856"/>
+              <a:gd name="adj1" fmla="val 50000"/>
             </a:avLst>
           </a:prstGeom>
           <a:noFill/>
@@ -5259,59 +6024,210 @@
           </a:effectLst>
         </p:spPr>
       </p:cxnSp>
-      <p:sp>
-        <p:nvSpPr>
-          <p:cNvPr id="13396" name="TextBox 32"/>
-          <p:cNvSpPr txBox="1">
-            <a:spLocks noChangeArrowheads="1"/>
-          </p:cNvSpPr>
+      <p:grpSp>
+        <p:nvGrpSpPr>
+          <p:cNvPr id="118" name="Group 117"/>
+          <p:cNvGrpSpPr/>
           <p:nvPr/>
-        </p:nvSpPr>
-        <p:spPr bwMode="auto">
+        </p:nvGrpSpPr>
+        <p:grpSpPr>
           <a:xfrm>
-            <a:off x="4818063" y="4427538"/>
-            <a:ext cx="1055687" cy="366712"/>
+            <a:off x="2590799" y="5119749"/>
+            <a:ext cx="2133600" cy="1580366"/>
+            <a:chOff x="2590800" y="3349544"/>
+            <a:chExt cx="2133600" cy="1580366"/>
           </a:xfrm>
-          <a:prstGeom prst="rect">
-            <a:avLst/>
-          </a:prstGeom>
-          <a:noFill/>
-          <a:ln w="9525">
+        </p:grpSpPr>
+        <p:sp>
+          <p:nvSpPr>
+            <p:cNvPr id="119" name="Rectangle 118"/>
+            <p:cNvSpPr/>
+            <p:nvPr/>
+          </p:nvSpPr>
+          <p:spPr>
+            <a:xfrm>
+              <a:off x="2590800" y="3730544"/>
+              <a:ext cx="2133600" cy="609600"/>
+            </a:xfrm>
+            <a:prstGeom prst="rect">
+              <a:avLst/>
+            </a:prstGeom>
+            <a:solidFill>
+              <a:schemeClr val="bg1">
+                <a:lumMod val="85000"/>
+              </a:schemeClr>
+            </a:solidFill>
+            <a:ln>
+              <a:solidFill>
+                <a:schemeClr val="tx1"/>
+              </a:solidFill>
+            </a:ln>
+          </p:spPr>
+          <p:style>
+            <a:lnRef idx="1">
+              <a:schemeClr val="accent1"/>
+            </a:lnRef>
+            <a:fillRef idx="3">
+              <a:schemeClr val="accent1"/>
+            </a:fillRef>
+            <a:effectRef idx="2">
+              <a:schemeClr val="accent1"/>
+            </a:effectRef>
+            <a:fontRef idx="minor">
+              <a:schemeClr val="lt1"/>
+            </a:fontRef>
+          </p:style>
+          <p:txBody>
+            <a:bodyPr anchor="ctr"/>
+            <a:lstStyle/>
+            <a:p>
+              <a:pPr algn="ctr" fontAlgn="auto">
+                <a:spcBef>
+                  <a:spcPts val="0"/>
+                </a:spcBef>
+                <a:spcAft>
+                  <a:spcPts val="0"/>
+                </a:spcAft>
+                <a:defRPr/>
+              </a:pPr>
+              <a:endParaRPr lang="en-US" dirty="0"/>
+            </a:p>
+          </p:txBody>
+        </p:sp>
+        <p:sp>
+          <p:nvSpPr>
+            <p:cNvPr id="120" name="TextBox 33"/>
+            <p:cNvSpPr txBox="1">
+              <a:spLocks noChangeArrowheads="1"/>
+            </p:cNvSpPr>
+            <p:nvPr/>
+          </p:nvSpPr>
+          <p:spPr bwMode="auto">
+            <a:xfrm>
+              <a:off x="2590800" y="3349544"/>
+              <a:ext cx="1677988" cy="366713"/>
+            </a:xfrm>
+            <a:prstGeom prst="rect">
+              <a:avLst/>
+            </a:prstGeom>
             <a:noFill/>
-            <a:miter lim="800000"/>
-            <a:headEnd/>
-            <a:tailEnd/>
-          </a:ln>
-        </p:spPr>
-        <p:txBody>
-          <a:bodyPr wrap="none">
-            <a:spAutoFit/>
-          </a:bodyPr>
-          <a:lstStyle/>
-          <a:p>
-            <a:r>
-              <a:rPr lang="en-US">
+            <a:ln w="9525">
+              <a:noFill/>
+              <a:miter lim="800000"/>
+              <a:headEnd/>
+              <a:tailEnd/>
+            </a:ln>
+          </p:spPr>
+          <p:txBody>
+            <a:bodyPr wrap="none">
+              <a:spAutoFit/>
+            </a:bodyPr>
+            <a:lstStyle/>
+            <a:p>
+              <a:r>
+                <a:rPr lang="en-US" noProof="1" smtClean="0">
+                  <a:latin typeface="Calibri" pitchFamily="34" charset="0"/>
+                </a:rPr>
+                <a:t>HashMap$Entry</a:t>
+              </a:r>
+              <a:endParaRPr lang="en-US" noProof="1">
                 <a:latin typeface="Calibri" pitchFamily="34" charset="0"/>
-              </a:rPr>
-              <a:t>user data</a:t>
-            </a:r>
-          </a:p>
-        </p:txBody>
-      </p:sp>
+              </a:endParaRPr>
+            </a:p>
+          </p:txBody>
+        </p:sp>
+        <p:cxnSp>
+          <p:nvCxnSpPr>
+            <p:cNvPr id="121" name="Shape 21"/>
+            <p:cNvCxnSpPr>
+              <a:cxnSpLocks noChangeShapeType="1"/>
+              <a:stCxn id="119" idx="2"/>
+              <a:endCxn id="122" idx="0"/>
+            </p:cNvCxnSpPr>
+            <p:nvPr/>
+          </p:nvCxnSpPr>
+          <p:spPr bwMode="auto">
+            <a:xfrm rot="5400000">
+              <a:off x="3546068" y="4451666"/>
+              <a:ext cx="223054" cy="10"/>
+            </a:xfrm>
+            <a:prstGeom prst="bentConnector3">
+              <a:avLst>
+                <a:gd name="adj1" fmla="val 50000"/>
+              </a:avLst>
+            </a:prstGeom>
+            <a:noFill/>
+            <a:ln w="25400" algn="ctr">
+              <a:solidFill>
+                <a:schemeClr val="tx1"/>
+              </a:solidFill>
+              <a:miter lim="800000"/>
+              <a:headEnd/>
+              <a:tailEnd type="arrow" w="med" len="med"/>
+            </a:ln>
+            <a:effectLst>
+              <a:outerShdw dist="20000" dir="5400000" rotWithShape="0">
+                <a:srgbClr val="000000">
+                  <a:alpha val="37999"/>
+                </a:srgbClr>
+              </a:outerShdw>
+            </a:effectLst>
+          </p:spPr>
+        </p:cxnSp>
+        <p:sp>
+          <p:nvSpPr>
+            <p:cNvPr id="122" name="TextBox 32"/>
+            <p:cNvSpPr txBox="1">
+              <a:spLocks noChangeArrowheads="1"/>
+            </p:cNvSpPr>
+            <p:nvPr/>
+          </p:nvSpPr>
+          <p:spPr bwMode="auto">
+            <a:xfrm>
+              <a:off x="3129746" y="4563198"/>
+              <a:ext cx="1055687" cy="366712"/>
+            </a:xfrm>
+            <a:prstGeom prst="rect">
+              <a:avLst/>
+            </a:prstGeom>
+            <a:noFill/>
+            <a:ln w="9525">
+              <a:noFill/>
+              <a:miter lim="800000"/>
+              <a:headEnd/>
+              <a:tailEnd/>
+            </a:ln>
+          </p:spPr>
+          <p:txBody>
+            <a:bodyPr wrap="none">
+              <a:spAutoFit/>
+            </a:bodyPr>
+            <a:lstStyle/>
+            <a:p>
+              <a:r>
+                <a:rPr lang="en-US" dirty="0">
+                  <a:latin typeface="Calibri" pitchFamily="34" charset="0"/>
+                </a:rPr>
+                <a:t>user data</a:t>
+              </a:r>
+            </a:p>
+          </p:txBody>
+        </p:sp>
+      </p:grpSp>
       <p:cxnSp>
         <p:nvCxnSpPr>
-          <p:cNvPr id="28" name="Shape 21"/>
+          <p:cNvPr id="123" name="Shape 21"/>
           <p:cNvCxnSpPr>
             <a:cxnSpLocks noChangeShapeType="1"/>
-            <a:stCxn id="7" idx="2"/>
-            <a:endCxn id="13396" idx="0"/>
+            <a:stCxn id="94" idx="3"/>
+            <a:endCxn id="119" idx="1"/>
           </p:cNvCxnSpPr>
           <p:nvPr/>
         </p:nvCxnSpPr>
         <p:spPr bwMode="auto">
-          <a:xfrm rot="5400000">
-            <a:off x="5266532" y="4342606"/>
-            <a:ext cx="165100" cy="4763"/>
+          <a:xfrm flipV="1">
+            <a:off x="2133600" y="5805549"/>
+            <a:ext cx="457199" cy="2115"/>
           </a:xfrm>
           <a:prstGeom prst="bentConnector3">
             <a:avLst>
@@ -5660,4 +6576,324 @@
   </a:objectDefaults>
   <a:extraClrSchemeLst/>
 </a:theme>
+</file>
+
+<file path=ppt/theme/theme2.xml><?xml version="1.0" encoding="utf-8"?>
+<a:theme xmlns:a="http://schemas.openxmlformats.org/drawingml/2006/main" name="Office Theme">
+  <a:themeElements>
+    <a:clrScheme name="Office">
+      <a:dk1>
+        <a:sysClr val="windowText" lastClr="000000"/>
+      </a:dk1>
+      <a:lt1>
+        <a:sysClr val="window" lastClr="FFFFFF"/>
+      </a:lt1>
+      <a:dk2>
+        <a:srgbClr val="1F497D"/>
+      </a:dk2>
+      <a:lt2>
+        <a:srgbClr val="EEECE1"/>
+      </a:lt2>
+      <a:accent1>
+        <a:srgbClr val="4F81BD"/>
+      </a:accent1>
+      <a:accent2>
+        <a:srgbClr val="C0504D"/>
+      </a:accent2>
+      <a:accent3>
+        <a:srgbClr val="9BBB59"/>
+      </a:accent3>
+      <a:accent4>
+        <a:srgbClr val="8064A2"/>
+      </a:accent4>
+      <a:accent5>
+        <a:srgbClr val="4BACC6"/>
+      </a:accent5>
+      <a:accent6>
+        <a:srgbClr val="F79646"/>
+      </a:accent6>
+      <a:hlink>
+        <a:srgbClr val="0000FF"/>
+      </a:hlink>
+      <a:folHlink>
+        <a:srgbClr val="800080"/>
+      </a:folHlink>
+    </a:clrScheme>
+    <a:fontScheme name="Office">
+      <a:majorFont>
+        <a:latin typeface="Calibri"/>
+        <a:ea typeface=""/>
+        <a:cs typeface=""/>
+        <a:font script="Jpan" typeface="ＭＳ Ｐゴシック"/>
+        <a:font script="Hang" typeface="맑은 고딕"/>
+        <a:font script="Hans" typeface="宋体"/>
+        <a:font script="Hant" typeface="新細明體"/>
+        <a:font script="Arab" typeface="Times New Roman"/>
+        <a:font script="Hebr" typeface="Times New Roman"/>
+        <a:font script="Thai" typeface="Angsana New"/>
+        <a:font script="Ethi" typeface="Nyala"/>
+        <a:font script="Beng" typeface="Vrinda"/>
+        <a:font script="Gujr" typeface="Shruti"/>
+        <a:font script="Khmr" typeface="MoolBoran"/>
+        <a:font script="Knda" typeface="Tunga"/>
+        <a:font script="Guru" typeface="Raavi"/>
+        <a:font script="Cans" typeface="Euphemia"/>
+        <a:font script="Cher" typeface="Plantagenet Cherokee"/>
+        <a:font script="Yiii" typeface="Microsoft Yi Baiti"/>
+        <a:font script="Tibt" typeface="Microsoft Himalaya"/>
+        <a:font script="Thaa" typeface="MV Boli"/>
+        <a:font script="Deva" typeface="Mangal"/>
+        <a:font script="Telu" typeface="Gautami"/>
+        <a:font script="Taml" typeface="Latha"/>
+        <a:font script="Syrc" typeface="Estrangelo Edessa"/>
+        <a:font script="Orya" typeface="Kalinga"/>
+        <a:font script="Mlym" typeface="Kartika"/>
+        <a:font script="Laoo" typeface="DokChampa"/>
+        <a:font script="Sinh" typeface="Iskoola Pota"/>
+        <a:font script="Mong" typeface="Mongolian Baiti"/>
+        <a:font script="Viet" typeface="Times New Roman"/>
+        <a:font script="Uigh" typeface="Microsoft Uighur"/>
+        <a:font script="Geor" typeface="Sylfaen"/>
+      </a:majorFont>
+      <a:minorFont>
+        <a:latin typeface="Calibri"/>
+        <a:ea typeface=""/>
+        <a:cs typeface=""/>
+        <a:font script="Jpan" typeface="ＭＳ Ｐゴシック"/>
+        <a:font script="Hang" typeface="맑은 고딕"/>
+        <a:font script="Hans" typeface="宋体"/>
+        <a:font script="Hant" typeface="新細明體"/>
+        <a:font script="Arab" typeface="Arial"/>
+        <a:font script="Hebr" typeface="Arial"/>
+        <a:font script="Thai" typeface="Cordia New"/>
+        <a:font script="Ethi" typeface="Nyala"/>
+        <a:font script="Beng" typeface="Vrinda"/>
+        <a:font script="Gujr" typeface="Shruti"/>
+        <a:font script="Khmr" typeface="DaunPenh"/>
+        <a:font script="Knda" typeface="Tunga"/>
+        <a:font script="Guru" typeface="Raavi"/>
+        <a:font script="Cans" typeface="Euphemia"/>
+        <a:font script="Cher" typeface="Plantagenet Cherokee"/>
+        <a:font script="Yiii" typeface="Microsoft Yi Baiti"/>
+        <a:font script="Tibt" typeface="Microsoft Himalaya"/>
+        <a:font script="Thaa" typeface="MV Boli"/>
+        <a:font script="Deva" typeface="Mangal"/>
+        <a:font script="Telu" typeface="Gautami"/>
+        <a:font script="Taml" typeface="Latha"/>
+        <a:font script="Syrc" typeface="Estrangelo Edessa"/>
+        <a:font script="Orya" typeface="Kalinga"/>
+        <a:font script="Mlym" typeface="Kartika"/>
+        <a:font script="Laoo" typeface="DokChampa"/>
+        <a:font script="Sinh" typeface="Iskoola Pota"/>
+        <a:font script="Mong" typeface="Mongolian Baiti"/>
+        <a:font script="Viet" typeface="Arial"/>
+        <a:font script="Uigh" typeface="Microsoft Uighur"/>
+        <a:font script="Geor" typeface="Sylfaen"/>
+      </a:minorFont>
+    </a:fontScheme>
+    <a:fmtScheme name="Office">
+      <a:fillStyleLst>
+        <a:solidFill>
+          <a:schemeClr val="phClr"/>
+        </a:solidFill>
+        <a:gradFill rotWithShape="1">
+          <a:gsLst>
+            <a:gs pos="0">
+              <a:schemeClr val="phClr">
+                <a:tint val="50000"/>
+                <a:satMod val="300000"/>
+              </a:schemeClr>
+            </a:gs>
+            <a:gs pos="35000">
+              <a:schemeClr val="phClr">
+                <a:tint val="37000"/>
+                <a:satMod val="300000"/>
+              </a:schemeClr>
+            </a:gs>
+            <a:gs pos="100000">
+              <a:schemeClr val="phClr">
+                <a:tint val="15000"/>
+                <a:satMod val="350000"/>
+              </a:schemeClr>
+            </a:gs>
+          </a:gsLst>
+          <a:lin ang="16200000" scaled="1"/>
+        </a:gradFill>
+        <a:gradFill rotWithShape="1">
+          <a:gsLst>
+            <a:gs pos="0">
+              <a:schemeClr val="phClr">
+                <a:tint val="100000"/>
+                <a:shade val="100000"/>
+                <a:satMod val="130000"/>
+              </a:schemeClr>
+            </a:gs>
+            <a:gs pos="100000">
+              <a:schemeClr val="phClr">
+                <a:tint val="50000"/>
+                <a:shade val="100000"/>
+                <a:satMod val="350000"/>
+              </a:schemeClr>
+            </a:gs>
+          </a:gsLst>
+          <a:lin ang="16200000" scaled="0"/>
+        </a:gradFill>
+      </a:fillStyleLst>
+      <a:lnStyleLst>
+        <a:ln w="9525" cap="flat" cmpd="sng" algn="ctr">
+          <a:solidFill>
+            <a:schemeClr val="phClr">
+              <a:shade val="95000"/>
+              <a:satMod val="105000"/>
+            </a:schemeClr>
+          </a:solidFill>
+          <a:prstDash val="solid"/>
+        </a:ln>
+        <a:ln w="25400" cap="flat" cmpd="sng" algn="ctr">
+          <a:solidFill>
+            <a:schemeClr val="phClr"/>
+          </a:solidFill>
+          <a:prstDash val="solid"/>
+        </a:ln>
+        <a:ln w="38100" cap="flat" cmpd="sng" algn="ctr">
+          <a:solidFill>
+            <a:schemeClr val="phClr"/>
+          </a:solidFill>
+          <a:prstDash val="solid"/>
+        </a:ln>
+      </a:lnStyleLst>
+      <a:effectStyleLst>
+        <a:effectStyle>
+          <a:effectLst>
+            <a:outerShdw blurRad="40000" dist="20000" dir="5400000" rotWithShape="0">
+              <a:srgbClr val="000000">
+                <a:alpha val="38000"/>
+              </a:srgbClr>
+            </a:outerShdw>
+          </a:effectLst>
+        </a:effectStyle>
+        <a:effectStyle>
+          <a:effectLst>
+            <a:outerShdw blurRad="40000" dist="23000" dir="5400000" rotWithShape="0">
+              <a:srgbClr val="000000">
+                <a:alpha val="35000"/>
+              </a:srgbClr>
+            </a:outerShdw>
+          </a:effectLst>
+        </a:effectStyle>
+        <a:effectStyle>
+          <a:effectLst>
+            <a:outerShdw blurRad="40000" dist="23000" dir="5400000" rotWithShape="0">
+              <a:srgbClr val="000000">
+                <a:alpha val="35000"/>
+              </a:srgbClr>
+            </a:outerShdw>
+          </a:effectLst>
+          <a:scene3d>
+            <a:camera prst="orthographicFront">
+              <a:rot lat="0" lon="0" rev="0"/>
+            </a:camera>
+            <a:lightRig rig="threePt" dir="t">
+              <a:rot lat="0" lon="0" rev="1200000"/>
+            </a:lightRig>
+          </a:scene3d>
+          <a:sp3d>
+            <a:bevelT w="63500" h="25400"/>
+          </a:sp3d>
+        </a:effectStyle>
+      </a:effectStyleLst>
+      <a:bgFillStyleLst>
+        <a:solidFill>
+          <a:schemeClr val="phClr"/>
+        </a:solidFill>
+        <a:gradFill rotWithShape="1">
+          <a:gsLst>
+            <a:gs pos="0">
+              <a:schemeClr val="phClr">
+                <a:tint val="40000"/>
+                <a:satMod val="350000"/>
+              </a:schemeClr>
+            </a:gs>
+            <a:gs pos="40000">
+              <a:schemeClr val="phClr">
+                <a:tint val="45000"/>
+                <a:shade val="99000"/>
+                <a:satMod val="350000"/>
+              </a:schemeClr>
+            </a:gs>
+            <a:gs pos="100000">
+              <a:schemeClr val="phClr">
+                <a:shade val="20000"/>
+                <a:satMod val="255000"/>
+              </a:schemeClr>
+            </a:gs>
+          </a:gsLst>
+          <a:path path="circle">
+            <a:fillToRect l="50000" t="-80000" r="50000" b="180000"/>
+          </a:path>
+        </a:gradFill>
+        <a:gradFill rotWithShape="1">
+          <a:gsLst>
+            <a:gs pos="0">
+              <a:schemeClr val="phClr">
+                <a:tint val="80000"/>
+                <a:satMod val="300000"/>
+              </a:schemeClr>
+            </a:gs>
+            <a:gs pos="100000">
+              <a:schemeClr val="phClr">
+                <a:shade val="30000"/>
+                <a:satMod val="200000"/>
+              </a:schemeClr>
+            </a:gs>
+          </a:gsLst>
+          <a:path path="circle">
+            <a:fillToRect l="50000" t="50000" r="50000" b="50000"/>
+          </a:path>
+        </a:gradFill>
+      </a:bgFillStyleLst>
+    </a:fmtScheme>
+  </a:themeElements>
+  <a:objectDefaults>
+    <a:spDef>
+      <a:spPr/>
+      <a:bodyPr/>
+      <a:lstStyle/>
+      <a:style>
+        <a:lnRef idx="1">
+          <a:schemeClr val="accent1"/>
+        </a:lnRef>
+        <a:fillRef idx="3">
+          <a:schemeClr val="accent1"/>
+        </a:fillRef>
+        <a:effectRef idx="2">
+          <a:schemeClr val="accent1"/>
+        </a:effectRef>
+        <a:fontRef idx="minor">
+          <a:schemeClr val="lt1"/>
+        </a:fontRef>
+      </a:style>
+    </a:spDef>
+    <a:lnDef>
+      <a:spPr/>
+      <a:bodyPr/>
+      <a:lstStyle/>
+      <a:style>
+        <a:lnRef idx="2">
+          <a:schemeClr val="accent1"/>
+        </a:lnRef>
+        <a:fillRef idx="0">
+          <a:schemeClr val="accent1"/>
+        </a:fillRef>
+        <a:effectRef idx="1">
+          <a:schemeClr val="accent1"/>
+        </a:effectRef>
+        <a:fontRef idx="minor">
+          <a:schemeClr val="tx1"/>
+        </a:fontRef>
+      </a:style>
+    </a:lnDef>
+  </a:objectDefaults>
+  <a:extraClrSchemeLst/>
+</a:theme>
 </file>
</xml_diff>

<commit_message>
Relationships: Edits - Empty Collections - Inside HashSet figure
</commit_message>
<xml_diff>
--- a/part1/Figures/collections/inside-hashset.pptx
+++ b/part1/Figures/collections/inside-hashset.pptx
@@ -185,11 +185,14 @@
           <a:bodyPr vert="horz" lIns="91440" tIns="45720" rIns="91440" bIns="45720" rtlCol="0"/>
           <a:lstStyle>
             <a:lvl1pPr algn="l">
-              <a:defRPr sz="1200"/>
+              <a:defRPr sz="1200" dirty="0"/>
             </a:lvl1pPr>
           </a:lstStyle>
           <a:p>
-            <a:endParaRPr lang="en-US" dirty="0"/>
+            <a:pPr>
+              <a:defRPr/>
+            </a:pPr>
+            <a:endParaRPr lang="en-US"/>
           </a:p>
         </p:txBody>
       </p:sp>
@@ -216,13 +219,19 @@
           <a:bodyPr vert="horz" lIns="91440" tIns="45720" rIns="91440" bIns="45720" rtlCol="0"/>
           <a:lstStyle>
             <a:lvl1pPr algn="r">
-              <a:defRPr sz="1200"/>
+              <a:defRPr sz="1200" smtClean="0"/>
             </a:lvl1pPr>
           </a:lstStyle>
           <a:p>
-            <a:fld id="{63399E6A-A389-3547-948A-FA1167BEF3D4}" type="datetimeFigureOut">
-              <a:rPr lang="en-US" smtClean="0"/>
-              <a:t>7/6/12</a:t>
+            <a:pPr>
+              <a:defRPr/>
+            </a:pPr>
+            <a:fld id="{32458A77-B43B-441D-9587-DF61B47CFD72}" type="datetimeFigureOut">
+              <a:rPr lang="en-US"/>
+              <a:pPr>
+                <a:defRPr/>
+              </a:pPr>
+              <a:t>8/10/2012</a:t>
             </a:fld>
             <a:endParaRPr lang="en-US" dirty="0"/>
           </a:p>
@@ -257,7 +266,8 @@
           <a:bodyPr vert="horz" lIns="91440" tIns="45720" rIns="91440" bIns="45720" rtlCol="0" anchor="ctr"/>
           <a:lstStyle/>
           <a:p>
-            <a:endParaRPr lang="en-US" dirty="0"/>
+            <a:pPr lvl="0"/>
+            <a:endParaRPr lang="en-US" noProof="0" dirty="0"/>
           </a:p>
         </p:txBody>
       </p:sp>
@@ -286,38 +296,38 @@
           <a:p>
             <a:pPr lvl="0"/>
             <a:r>
-              <a:rPr lang="en-US" smtClean="0"/>
+              <a:rPr lang="en-US" noProof="0" smtClean="0"/>
               <a:t>Click to edit Master text styles</a:t>
             </a:r>
           </a:p>
           <a:p>
             <a:pPr lvl="1"/>
             <a:r>
-              <a:rPr lang="en-US" smtClean="0"/>
+              <a:rPr lang="en-US" noProof="0" smtClean="0"/>
               <a:t>Second level</a:t>
             </a:r>
           </a:p>
           <a:p>
             <a:pPr lvl="2"/>
             <a:r>
-              <a:rPr lang="en-US" smtClean="0"/>
+              <a:rPr lang="en-US" noProof="0" smtClean="0"/>
               <a:t>Third level</a:t>
             </a:r>
           </a:p>
           <a:p>
             <a:pPr lvl="3"/>
             <a:r>
-              <a:rPr lang="en-US" smtClean="0"/>
+              <a:rPr lang="en-US" noProof="0" smtClean="0"/>
               <a:t>Fourth level</a:t>
             </a:r>
           </a:p>
           <a:p>
             <a:pPr lvl="4"/>
             <a:r>
-              <a:rPr lang="en-US" smtClean="0"/>
+              <a:rPr lang="en-US" noProof="0" smtClean="0"/>
               <a:t>Fifth level</a:t>
             </a:r>
-            <a:endParaRPr lang="en-US"/>
+            <a:endParaRPr lang="en-US" noProof="0"/>
           </a:p>
         </p:txBody>
       </p:sp>
@@ -344,11 +354,14 @@
           <a:bodyPr vert="horz" lIns="91440" tIns="45720" rIns="91440" bIns="45720" rtlCol="0" anchor="b"/>
           <a:lstStyle>
             <a:lvl1pPr algn="l">
-              <a:defRPr sz="1200"/>
+              <a:defRPr sz="1200" dirty="0"/>
             </a:lvl1pPr>
           </a:lstStyle>
           <a:p>
-            <a:endParaRPr lang="en-US" dirty="0"/>
+            <a:pPr>
+              <a:defRPr/>
+            </a:pPr>
+            <a:endParaRPr lang="en-US"/>
           </a:p>
         </p:txBody>
       </p:sp>
@@ -375,12 +388,18 @@
           <a:bodyPr vert="horz" lIns="91440" tIns="45720" rIns="91440" bIns="45720" rtlCol="0" anchor="b"/>
           <a:lstStyle>
             <a:lvl1pPr algn="r">
-              <a:defRPr sz="1200"/>
+              <a:defRPr sz="1200" smtClean="0"/>
             </a:lvl1pPr>
           </a:lstStyle>
           <a:p>
-            <a:fld id="{26E6EE75-3F2A-9041-8B1A-2272835C97F9}" type="slidenum">
-              <a:rPr lang="en-US" smtClean="0"/>
+            <a:pPr>
+              <a:defRPr/>
+            </a:pPr>
+            <a:fld id="{0D3BD40E-06EB-4F24-BEC7-000B209DBF50}" type="slidenum">
+              <a:rPr lang="en-US"/>
+              <a:pPr>
+                <a:defRPr/>
+              </a:pPr>
               <a:t>‹#›</a:t>
             </a:fld>
             <a:endParaRPr lang="en-US" dirty="0"/>
@@ -388,15 +407,16 @@
         </p:txBody>
       </p:sp>
     </p:spTree>
-    <p:extLst>
-      <p:ext uri="{BB962C8B-B14F-4D97-AF65-F5344CB8AC3E}">
-        <p14:creationId xmlns:p14="http://schemas.microsoft.com/office/powerpoint/2010/main" val="1933097513"/>
-      </p:ext>
-    </p:extLst>
   </p:cSld>
   <p:clrMap bg1="lt1" tx1="dk1" bg2="lt2" tx2="dk2" accent1="accent1" accent2="accent2" accent3="accent3" accent4="accent4" accent5="accent5" accent6="accent6" hlink="hlink" folHlink="folHlink"/>
   <p:notesStyle>
-    <a:lvl1pPr marL="0" algn="l" defTabSz="457200" rtl="0" eaLnBrk="1" latinLnBrk="0" hangingPunct="1">
+    <a:lvl1pPr algn="l" defTabSz="457200" rtl="0" fontAlgn="base">
+      <a:spcBef>
+        <a:spcPct val="30000"/>
+      </a:spcBef>
+      <a:spcAft>
+        <a:spcPct val="0"/>
+      </a:spcAft>
       <a:defRPr sz="1200" kern="1200">
         <a:solidFill>
           <a:schemeClr val="tx1"/>
@@ -406,7 +426,13 @@
         <a:cs typeface="+mn-cs"/>
       </a:defRPr>
     </a:lvl1pPr>
-    <a:lvl2pPr marL="457200" algn="l" defTabSz="457200" rtl="0" eaLnBrk="1" latinLnBrk="0" hangingPunct="1">
+    <a:lvl2pPr marL="457200" algn="l" defTabSz="457200" rtl="0" fontAlgn="base">
+      <a:spcBef>
+        <a:spcPct val="30000"/>
+      </a:spcBef>
+      <a:spcAft>
+        <a:spcPct val="0"/>
+      </a:spcAft>
       <a:defRPr sz="1200" kern="1200">
         <a:solidFill>
           <a:schemeClr val="tx1"/>
@@ -416,7 +442,13 @@
         <a:cs typeface="+mn-cs"/>
       </a:defRPr>
     </a:lvl2pPr>
-    <a:lvl3pPr marL="914400" algn="l" defTabSz="457200" rtl="0" eaLnBrk="1" latinLnBrk="0" hangingPunct="1">
+    <a:lvl3pPr marL="914400" algn="l" defTabSz="457200" rtl="0" fontAlgn="base">
+      <a:spcBef>
+        <a:spcPct val="30000"/>
+      </a:spcBef>
+      <a:spcAft>
+        <a:spcPct val="0"/>
+      </a:spcAft>
       <a:defRPr sz="1200" kern="1200">
         <a:solidFill>
           <a:schemeClr val="tx1"/>
@@ -426,7 +458,13 @@
         <a:cs typeface="+mn-cs"/>
       </a:defRPr>
     </a:lvl3pPr>
-    <a:lvl4pPr marL="1371600" algn="l" defTabSz="457200" rtl="0" eaLnBrk="1" latinLnBrk="0" hangingPunct="1">
+    <a:lvl4pPr marL="1371600" algn="l" defTabSz="457200" rtl="0" fontAlgn="base">
+      <a:spcBef>
+        <a:spcPct val="30000"/>
+      </a:spcBef>
+      <a:spcAft>
+        <a:spcPct val="0"/>
+      </a:spcAft>
       <a:defRPr sz="1200" kern="1200">
         <a:solidFill>
           <a:schemeClr val="tx1"/>
@@ -436,7 +474,13 @@
         <a:cs typeface="+mn-cs"/>
       </a:defRPr>
     </a:lvl4pPr>
-    <a:lvl5pPr marL="1828800" algn="l" defTabSz="457200" rtl="0" eaLnBrk="1" latinLnBrk="0" hangingPunct="1">
+    <a:lvl5pPr marL="1828800" algn="l" defTabSz="457200" rtl="0" fontAlgn="base">
+      <a:spcBef>
+        <a:spcPct val="30000"/>
+      </a:spcBef>
+      <a:spcAft>
+        <a:spcPct val="0"/>
+      </a:spcAft>
       <a:defRPr sz="1200" kern="1200">
         <a:solidFill>
           <a:schemeClr val="tx1"/>
@@ -509,7 +553,7 @@
       </p:grpSpPr>
       <p:sp>
         <p:nvSpPr>
-          <p:cNvPr id="2" name="Slide Image Placeholder 1"/>
+          <p:cNvPr id="15361" name="Slide Image Placeholder 1"/>
           <p:cNvSpPr>
             <a:spLocks noGrp="1" noRot="1" noChangeAspect="1"/>
           </p:cNvSpPr>
@@ -517,11 +561,21 @@
             <p:ph type="sldImg"/>
           </p:nvPr>
         </p:nvSpPr>
-        <p:spPr/>
-      </p:sp>
-      <p:sp>
-        <p:nvSpPr>
-          <p:cNvPr id="3" name="Notes Placeholder 2"/>
+        <p:spPr bwMode="auto">
+          <a:noFill/>
+          <a:ln>
+            <a:solidFill>
+              <a:srgbClr val="000000"/>
+            </a:solidFill>
+            <a:miter lim="800000"/>
+            <a:headEnd/>
+            <a:tailEnd/>
+          </a:ln>
+        </p:spPr>
+      </p:sp>
+      <p:sp>
+        <p:nvSpPr>
+          <p:cNvPr id="15362" name="Notes Placeholder 2"/>
           <p:cNvSpPr>
             <a:spLocks noGrp="1"/>
           </p:cNvSpPr>
@@ -529,44 +583,62 @@
             <p:ph type="body" idx="1"/>
           </p:nvPr>
         </p:nvSpPr>
-        <p:spPr/>
-        <p:txBody>
-          <a:bodyPr/>
+        <p:spPr bwMode="auto">
+          <a:noFill/>
+        </p:spPr>
+        <p:txBody>
+          <a:bodyPr wrap="square" numCol="1" anchor="t" anchorCtr="0" compatLnSpc="1">
+            <a:prstTxWarp prst="textNoShape">
+              <a:avLst/>
+            </a:prstTxWarp>
+          </a:bodyPr>
           <a:lstStyle/>
           <a:p>
-            <a:endParaRPr lang="en-US" dirty="0"/>
-          </a:p>
-        </p:txBody>
-      </p:sp>
-      <p:sp>
-        <p:nvSpPr>
-          <p:cNvPr id="4" name="Slide Number Placeholder 3"/>
-          <p:cNvSpPr>
-            <a:spLocks noGrp="1"/>
-          </p:cNvSpPr>
-          <p:nvPr>
-            <p:ph type="sldNum" sz="quarter" idx="10"/>
-          </p:nvPr>
-        </p:nvSpPr>
-        <p:spPr/>
-        <p:txBody>
-          <a:bodyPr/>
+            <a:pPr>
+              <a:spcBef>
+                <a:spcPct val="0"/>
+              </a:spcBef>
+            </a:pPr>
+            <a:endParaRPr lang="en-US" smtClean="0"/>
+          </a:p>
+        </p:txBody>
+      </p:sp>
+      <p:sp>
+        <p:nvSpPr>
+          <p:cNvPr id="15363" name="Slide Number Placeholder 3"/>
+          <p:cNvSpPr>
+            <a:spLocks noGrp="1"/>
+          </p:cNvSpPr>
+          <p:nvPr>
+            <p:ph type="sldNum" sz="quarter" idx="5"/>
+          </p:nvPr>
+        </p:nvSpPr>
+        <p:spPr bwMode="auto">
+          <a:noFill/>
+          <a:ln>
+            <a:miter lim="800000"/>
+            <a:headEnd/>
+            <a:tailEnd/>
+          </a:ln>
+        </p:spPr>
+        <p:txBody>
+          <a:bodyPr wrap="square" numCol="1" anchorCtr="0" compatLnSpc="1">
+            <a:prstTxWarp prst="textNoShape">
+              <a:avLst/>
+            </a:prstTxWarp>
+          </a:bodyPr>
           <a:lstStyle/>
           <a:p>
-            <a:fld id="{26E6EE75-3F2A-9041-8B1A-2272835C97F9}" type="slidenum">
-              <a:rPr lang="en-US" smtClean="0"/>
+            <a:fld id="{FAFA326C-F296-4D74-939B-9D8DD58CEDDF}" type="slidenum">
+              <a:rPr lang="en-US"/>
+              <a:pPr/>
               <a:t>1</a:t>
             </a:fld>
-            <a:endParaRPr lang="en-US" dirty="0"/>
+            <a:endParaRPr lang="en-US"/>
           </a:p>
         </p:txBody>
       </p:sp>
     </p:spTree>
-    <p:extLst>
-      <p:ext uri="{BB962C8B-B14F-4D97-AF65-F5344CB8AC3E}">
-        <p14:creationId xmlns:p14="http://schemas.microsoft.com/office/powerpoint/2010/main" val="3516954612"/>
-      </p:ext>
-    </p:extLst>
   </p:cSld>
   <p:clrMapOvr>
     <a:masterClrMapping/>
@@ -760,12 +832,12 @@
             <a:pPr>
               <a:defRPr/>
             </a:pPr>
-            <a:fld id="{EA869C11-907D-4A7F-9EA7-EFD46A12E100}" type="datetimeFigureOut">
+            <a:fld id="{CBB82D7D-009D-4B0C-8C90-4415540A2864}" type="datetimeFigureOut">
               <a:rPr lang="en-US"/>
               <a:pPr>
                 <a:defRPr/>
               </a:pPr>
-              <a:t>7/6/12</a:t>
+              <a:t>8/10/2012</a:t>
             </a:fld>
             <a:endParaRPr lang="en-US" dirty="0"/>
           </a:p>
@@ -793,7 +865,7 @@
             <a:pPr>
               <a:defRPr/>
             </a:pPr>
-            <a:endParaRPr lang="en-US" dirty="0"/>
+            <a:endParaRPr lang="en-US"/>
           </a:p>
         </p:txBody>
       </p:sp>
@@ -819,7 +891,7 @@
             <a:pPr>
               <a:defRPr/>
             </a:pPr>
-            <a:fld id="{C80855D0-533B-4B6F-AF0D-03BF56607AB1}" type="slidenum">
+            <a:fld id="{2FBAE8EF-7CC6-4E55-A3BE-8EDCE5D5071B}" type="slidenum">
               <a:rPr lang="en-US"/>
               <a:pPr>
                 <a:defRPr/>
@@ -952,12 +1024,12 @@
             <a:pPr>
               <a:defRPr/>
             </a:pPr>
-            <a:fld id="{0467ED37-AAA3-4EAD-A830-705697ADDE64}" type="datetimeFigureOut">
+            <a:fld id="{261623A6-712F-4980-96F7-1067976E5666}" type="datetimeFigureOut">
               <a:rPr lang="en-US"/>
               <a:pPr>
                 <a:defRPr/>
               </a:pPr>
-              <a:t>7/6/12</a:t>
+              <a:t>8/10/2012</a:t>
             </a:fld>
             <a:endParaRPr lang="en-US" dirty="0"/>
           </a:p>
@@ -985,7 +1057,7 @@
             <a:pPr>
               <a:defRPr/>
             </a:pPr>
-            <a:endParaRPr lang="en-US" dirty="0"/>
+            <a:endParaRPr lang="en-US"/>
           </a:p>
         </p:txBody>
       </p:sp>
@@ -1011,7 +1083,7 @@
             <a:pPr>
               <a:defRPr/>
             </a:pPr>
-            <a:fld id="{191A86E2-A51C-42C9-AEA2-FEBB4B52279B}" type="slidenum">
+            <a:fld id="{8BCC6CE6-CB86-43CE-B5B4-A02930744E0F}" type="slidenum">
               <a:rPr lang="en-US"/>
               <a:pPr>
                 <a:defRPr/>
@@ -1154,12 +1226,12 @@
             <a:pPr>
               <a:defRPr/>
             </a:pPr>
-            <a:fld id="{24F69AC6-04E4-4F60-B85D-479D1FB806BE}" type="datetimeFigureOut">
+            <a:fld id="{75743DE2-7C4D-48FB-97DD-A3F73937145B}" type="datetimeFigureOut">
               <a:rPr lang="en-US"/>
               <a:pPr>
                 <a:defRPr/>
               </a:pPr>
-              <a:t>7/6/12</a:t>
+              <a:t>8/10/2012</a:t>
             </a:fld>
             <a:endParaRPr lang="en-US" dirty="0"/>
           </a:p>
@@ -1187,7 +1259,7 @@
             <a:pPr>
               <a:defRPr/>
             </a:pPr>
-            <a:endParaRPr lang="en-US" dirty="0"/>
+            <a:endParaRPr lang="en-US"/>
           </a:p>
         </p:txBody>
       </p:sp>
@@ -1213,7 +1285,7 @@
             <a:pPr>
               <a:defRPr/>
             </a:pPr>
-            <a:fld id="{607962A7-0C62-4D1F-95BE-035BE58672D9}" type="slidenum">
+            <a:fld id="{84980D8A-EEFF-493A-B999-C41A0849D600}" type="slidenum">
               <a:rPr lang="en-US"/>
               <a:pPr>
                 <a:defRPr/>
@@ -1346,12 +1418,12 @@
             <a:pPr>
               <a:defRPr/>
             </a:pPr>
-            <a:fld id="{C44A5AF7-AB9C-430F-ACB2-70583A16FFF2}" type="datetimeFigureOut">
+            <a:fld id="{99595D63-C891-4FD4-9F01-F774A16FD40A}" type="datetimeFigureOut">
               <a:rPr lang="en-US"/>
               <a:pPr>
                 <a:defRPr/>
               </a:pPr>
-              <a:t>7/6/12</a:t>
+              <a:t>8/10/2012</a:t>
             </a:fld>
             <a:endParaRPr lang="en-US" dirty="0"/>
           </a:p>
@@ -1379,7 +1451,7 @@
             <a:pPr>
               <a:defRPr/>
             </a:pPr>
-            <a:endParaRPr lang="en-US" dirty="0"/>
+            <a:endParaRPr lang="en-US"/>
           </a:p>
         </p:txBody>
       </p:sp>
@@ -1405,7 +1477,7 @@
             <a:pPr>
               <a:defRPr/>
             </a:pPr>
-            <a:fld id="{57736D0B-2229-4661-AA7E-7FFAED76AF03}" type="slidenum">
+            <a:fld id="{1ED41858-91D6-47C1-8655-F8D34C24E93D}" type="slidenum">
               <a:rPr lang="en-US"/>
               <a:pPr>
                 <a:defRPr/>
@@ -1614,12 +1686,12 @@
             <a:pPr>
               <a:defRPr/>
             </a:pPr>
-            <a:fld id="{201E5E0F-B8C0-4ABA-9C6F-CD47FF03D444}" type="datetimeFigureOut">
+            <a:fld id="{D05055D5-F4FF-401B-8A50-D100609CC871}" type="datetimeFigureOut">
               <a:rPr lang="en-US"/>
               <a:pPr>
                 <a:defRPr/>
               </a:pPr>
-              <a:t>7/6/12</a:t>
+              <a:t>8/10/2012</a:t>
             </a:fld>
             <a:endParaRPr lang="en-US" dirty="0"/>
           </a:p>
@@ -1647,7 +1719,7 @@
             <a:pPr>
               <a:defRPr/>
             </a:pPr>
-            <a:endParaRPr lang="en-US" dirty="0"/>
+            <a:endParaRPr lang="en-US"/>
           </a:p>
         </p:txBody>
       </p:sp>
@@ -1673,7 +1745,7 @@
             <a:pPr>
               <a:defRPr/>
             </a:pPr>
-            <a:fld id="{3D1619AF-B268-45A6-AA9D-F07579FEC687}" type="slidenum">
+            <a:fld id="{17FC3F7F-4711-46D0-B6B0-DDCA69A0A902}" type="slidenum">
               <a:rPr lang="en-US"/>
               <a:pPr>
                 <a:defRPr/>
@@ -1924,12 +1996,12 @@
             <a:pPr>
               <a:defRPr/>
             </a:pPr>
-            <a:fld id="{EBF747BF-6E29-4437-AC11-2005B4CB9278}" type="datetimeFigureOut">
+            <a:fld id="{812685D1-4DE8-4579-81E6-B2601EC3125D}" type="datetimeFigureOut">
               <a:rPr lang="en-US"/>
               <a:pPr>
                 <a:defRPr/>
               </a:pPr>
-              <a:t>7/6/12</a:t>
+              <a:t>8/10/2012</a:t>
             </a:fld>
             <a:endParaRPr lang="en-US" dirty="0"/>
           </a:p>
@@ -1957,7 +2029,7 @@
             <a:pPr>
               <a:defRPr/>
             </a:pPr>
-            <a:endParaRPr lang="en-US" dirty="0"/>
+            <a:endParaRPr lang="en-US"/>
           </a:p>
         </p:txBody>
       </p:sp>
@@ -1983,7 +2055,7 @@
             <a:pPr>
               <a:defRPr/>
             </a:pPr>
-            <a:fld id="{DFF1E6BD-0AED-4CA9-9911-18A254D86A0B}" type="slidenum">
+            <a:fld id="{44513FCC-0AD9-4738-ABD2-B3FF177D08A5}" type="slidenum">
               <a:rPr lang="en-US"/>
               <a:pPr>
                 <a:defRPr/>
@@ -2368,12 +2440,12 @@
             <a:pPr>
               <a:defRPr/>
             </a:pPr>
-            <a:fld id="{B33299F7-6BA2-4DC5-800A-D39A11919286}" type="datetimeFigureOut">
+            <a:fld id="{CA009844-1624-4EF2-8734-C569A7318E87}" type="datetimeFigureOut">
               <a:rPr lang="en-US"/>
               <a:pPr>
                 <a:defRPr/>
               </a:pPr>
-              <a:t>7/6/12</a:t>
+              <a:t>8/10/2012</a:t>
             </a:fld>
             <a:endParaRPr lang="en-US" dirty="0"/>
           </a:p>
@@ -2401,7 +2473,7 @@
             <a:pPr>
               <a:defRPr/>
             </a:pPr>
-            <a:endParaRPr lang="en-US" dirty="0"/>
+            <a:endParaRPr lang="en-US"/>
           </a:p>
         </p:txBody>
       </p:sp>
@@ -2427,7 +2499,7 @@
             <a:pPr>
               <a:defRPr/>
             </a:pPr>
-            <a:fld id="{AA45CA4C-7773-4BB3-92F9-3B1E2FCC57F3}" type="slidenum">
+            <a:fld id="{EFD00729-4988-4E71-B88A-7AF13519C720}" type="slidenum">
               <a:rPr lang="en-US"/>
               <a:pPr>
                 <a:defRPr/>
@@ -2508,12 +2580,12 @@
             <a:pPr>
               <a:defRPr/>
             </a:pPr>
-            <a:fld id="{25C03C68-02DE-4C4E-941A-96ECF28F7C67}" type="datetimeFigureOut">
+            <a:fld id="{ADFB9024-30D5-40DD-A986-C18FB42A6BF7}" type="datetimeFigureOut">
               <a:rPr lang="en-US"/>
               <a:pPr>
                 <a:defRPr/>
               </a:pPr>
-              <a:t>7/6/12</a:t>
+              <a:t>8/10/2012</a:t>
             </a:fld>
             <a:endParaRPr lang="en-US" dirty="0"/>
           </a:p>
@@ -2541,7 +2613,7 @@
             <a:pPr>
               <a:defRPr/>
             </a:pPr>
-            <a:endParaRPr lang="en-US" dirty="0"/>
+            <a:endParaRPr lang="en-US"/>
           </a:p>
         </p:txBody>
       </p:sp>
@@ -2567,7 +2639,7 @@
             <a:pPr>
               <a:defRPr/>
             </a:pPr>
-            <a:fld id="{7F04C4E5-A64F-4658-BAC7-979F6381C29E}" type="slidenum">
+            <a:fld id="{4B70FB67-6420-495C-B958-0BAEA07C71DB}" type="slidenum">
               <a:rPr lang="en-US"/>
               <a:pPr>
                 <a:defRPr/>
@@ -2625,12 +2697,12 @@
             <a:pPr>
               <a:defRPr/>
             </a:pPr>
-            <a:fld id="{D9A589FA-27C3-4FD1-B7A7-82FFAEF89949}" type="datetimeFigureOut">
+            <a:fld id="{1C2A5149-0EAB-4F41-9958-16467BBB1B02}" type="datetimeFigureOut">
               <a:rPr lang="en-US"/>
               <a:pPr>
                 <a:defRPr/>
               </a:pPr>
-              <a:t>7/6/12</a:t>
+              <a:t>8/10/2012</a:t>
             </a:fld>
             <a:endParaRPr lang="en-US" dirty="0"/>
           </a:p>
@@ -2658,7 +2730,7 @@
             <a:pPr>
               <a:defRPr/>
             </a:pPr>
-            <a:endParaRPr lang="en-US" dirty="0"/>
+            <a:endParaRPr lang="en-US"/>
           </a:p>
         </p:txBody>
       </p:sp>
@@ -2684,7 +2756,7 @@
             <a:pPr>
               <a:defRPr/>
             </a:pPr>
-            <a:fld id="{AD2585F0-FCA0-4BA4-80AD-C2DC395DB445}" type="slidenum">
+            <a:fld id="{2FBBB3DD-E9B2-4695-A091-403720393F74}" type="slidenum">
               <a:rPr lang="en-US"/>
               <a:pPr>
                 <a:defRPr/>
@@ -2924,12 +2996,12 @@
             <a:pPr>
               <a:defRPr/>
             </a:pPr>
-            <a:fld id="{7B5ADE40-7230-43BF-9A60-976B754BB36D}" type="datetimeFigureOut">
+            <a:fld id="{1F68DC3E-528F-40C0-950E-2B6CDFD8A151}" type="datetimeFigureOut">
               <a:rPr lang="en-US"/>
               <a:pPr>
                 <a:defRPr/>
               </a:pPr>
-              <a:t>7/6/12</a:t>
+              <a:t>8/10/2012</a:t>
             </a:fld>
             <a:endParaRPr lang="en-US" dirty="0"/>
           </a:p>
@@ -2957,7 +3029,7 @@
             <a:pPr>
               <a:defRPr/>
             </a:pPr>
-            <a:endParaRPr lang="en-US" dirty="0"/>
+            <a:endParaRPr lang="en-US"/>
           </a:p>
         </p:txBody>
       </p:sp>
@@ -2983,7 +3055,7 @@
             <a:pPr>
               <a:defRPr/>
             </a:pPr>
-            <a:fld id="{26D76953-EE80-4FAF-B5CF-0E397D49EF9B}" type="slidenum">
+            <a:fld id="{0C312764-3207-4EDD-B575-86DDF4666DE3}" type="slidenum">
               <a:rPr lang="en-US"/>
               <a:pPr>
                 <a:defRPr/>
@@ -3202,12 +3274,12 @@
             <a:pPr>
               <a:defRPr/>
             </a:pPr>
-            <a:fld id="{FEFFC9D6-420E-4A04-BCC6-71D068D97AFE}" type="datetimeFigureOut">
+            <a:fld id="{EE1F2C36-3EB7-4075-B9CB-BD67150859DD}" type="datetimeFigureOut">
               <a:rPr lang="en-US"/>
               <a:pPr>
                 <a:defRPr/>
               </a:pPr>
-              <a:t>7/6/12</a:t>
+              <a:t>8/10/2012</a:t>
             </a:fld>
             <a:endParaRPr lang="en-US" dirty="0"/>
           </a:p>
@@ -3235,7 +3307,7 @@
             <a:pPr>
               <a:defRPr/>
             </a:pPr>
-            <a:endParaRPr lang="en-US" dirty="0"/>
+            <a:endParaRPr lang="en-US"/>
           </a:p>
         </p:txBody>
       </p:sp>
@@ -3261,7 +3333,7 @@
             <a:pPr>
               <a:defRPr/>
             </a:pPr>
-            <a:fld id="{5E817595-02ED-404B-B6B7-34656E1A59B0}" type="slidenum">
+            <a:fld id="{B38E1077-86E9-4E06-B315-B0C0A5DAD571}" type="slidenum">
               <a:rPr lang="en-US"/>
               <a:pPr>
                 <a:defRPr/>
@@ -3443,7 +3515,7 @@
               <a:spcAft>
                 <a:spcPts val="0"/>
               </a:spcAft>
-              <a:defRPr sz="1200" smtClean="0">
+              <a:defRPr sz="1200">
                 <a:solidFill>
                   <a:schemeClr val="tx1">
                     <a:tint val="75000"/>
@@ -3458,12 +3530,12 @@
             <a:pPr>
               <a:defRPr/>
             </a:pPr>
-            <a:fld id="{53920EE2-9CA1-4F3F-9FD5-0673D5D0DB53}" type="datetimeFigureOut">
+            <a:fld id="{90BD7FDE-451D-4FC8-B9A5-5462B562D16F}" type="datetimeFigureOut">
               <a:rPr lang="en-US"/>
               <a:pPr>
                 <a:defRPr/>
               </a:pPr>
-              <a:t>7/6/12</a:t>
+              <a:t>8/10/2012</a:t>
             </a:fld>
             <a:endParaRPr lang="en-US" dirty="0"/>
           </a:p>
@@ -3492,6 +3564,54 @@
           <a:bodyPr vert="horz" lIns="91440" tIns="45720" rIns="91440" bIns="45720" rtlCol="0" anchor="ctr"/>
           <a:lstStyle>
             <a:lvl1pPr algn="ctr" fontAlgn="auto">
+              <a:spcBef>
+                <a:spcPts val="0"/>
+              </a:spcBef>
+              <a:spcAft>
+                <a:spcPts val="0"/>
+              </a:spcAft>
+              <a:defRPr sz="1200" dirty="0">
+                <a:solidFill>
+                  <a:schemeClr val="tx1">
+                    <a:tint val="75000"/>
+                  </a:schemeClr>
+                </a:solidFill>
+                <a:latin typeface="+mn-lt"/>
+                <a:cs typeface="+mn-cs"/>
+              </a:defRPr>
+            </a:lvl1pPr>
+          </a:lstStyle>
+          <a:p>
+            <a:pPr>
+              <a:defRPr/>
+            </a:pPr>
+            <a:endParaRPr lang="en-US"/>
+          </a:p>
+        </p:txBody>
+      </p:sp>
+      <p:sp>
+        <p:nvSpPr>
+          <p:cNvPr id="6" name="Slide Number Placeholder 5"/>
+          <p:cNvSpPr>
+            <a:spLocks noGrp="1"/>
+          </p:cNvSpPr>
+          <p:nvPr>
+            <p:ph type="sldNum" sz="quarter" idx="4"/>
+          </p:nvPr>
+        </p:nvSpPr>
+        <p:spPr>
+          <a:xfrm>
+            <a:off x="6553200" y="6356350"/>
+            <a:ext cx="2133600" cy="365125"/>
+          </a:xfrm>
+          <a:prstGeom prst="rect">
+            <a:avLst/>
+          </a:prstGeom>
+        </p:spPr>
+        <p:txBody>
+          <a:bodyPr vert="horz" lIns="91440" tIns="45720" rIns="91440" bIns="45720" rtlCol="0" anchor="ctr"/>
+          <a:lstStyle>
+            <a:lvl1pPr algn="r" fontAlgn="auto">
               <a:spcBef>
                 <a:spcPts val="0"/>
               </a:spcBef>
@@ -3513,55 +3633,7 @@
             <a:pPr>
               <a:defRPr/>
             </a:pPr>
-            <a:endParaRPr lang="en-US" dirty="0"/>
-          </a:p>
-        </p:txBody>
-      </p:sp>
-      <p:sp>
-        <p:nvSpPr>
-          <p:cNvPr id="6" name="Slide Number Placeholder 5"/>
-          <p:cNvSpPr>
-            <a:spLocks noGrp="1"/>
-          </p:cNvSpPr>
-          <p:nvPr>
-            <p:ph type="sldNum" sz="quarter" idx="4"/>
-          </p:nvPr>
-        </p:nvSpPr>
-        <p:spPr>
-          <a:xfrm>
-            <a:off x="6553200" y="6356350"/>
-            <a:ext cx="2133600" cy="365125"/>
-          </a:xfrm>
-          <a:prstGeom prst="rect">
-            <a:avLst/>
-          </a:prstGeom>
-        </p:spPr>
-        <p:txBody>
-          <a:bodyPr vert="horz" lIns="91440" tIns="45720" rIns="91440" bIns="45720" rtlCol="0" anchor="ctr"/>
-          <a:lstStyle>
-            <a:lvl1pPr algn="r" fontAlgn="auto">
-              <a:spcBef>
-                <a:spcPts val="0"/>
-              </a:spcBef>
-              <a:spcAft>
-                <a:spcPts val="0"/>
-              </a:spcAft>
-              <a:defRPr sz="1200" smtClean="0">
-                <a:solidFill>
-                  <a:schemeClr val="tx1">
-                    <a:tint val="75000"/>
-                  </a:schemeClr>
-                </a:solidFill>
-                <a:latin typeface="+mn-lt"/>
-                <a:cs typeface="+mn-cs"/>
-              </a:defRPr>
-            </a:lvl1pPr>
-          </a:lstStyle>
-          <a:p>
-            <a:pPr>
-              <a:defRPr/>
-            </a:pPr>
-            <a:fld id="{ABFE99C4-9921-4EC1-B89D-4BB7C5D58CB9}" type="slidenum">
+            <a:fld id="{A0AE6A59-1CDF-4BFC-94BC-0E07C09BA8AB}" type="slidenum">
               <a:rPr lang="en-US"/>
               <a:pPr>
                 <a:defRPr/>
@@ -3590,7 +3662,7 @@
   </p:sldLayoutIdLst>
   <p:txStyles>
     <p:titleStyle>
-      <a:lvl1pPr algn="ctr" defTabSz="457200" rtl="0" fontAlgn="base">
+      <a:lvl1pPr algn="ctr" defTabSz="457200" rtl="0" eaLnBrk="0" fontAlgn="base" hangingPunct="0">
         <a:spcBef>
           <a:spcPct val="0"/>
         </a:spcBef>
@@ -3606,7 +3678,7 @@
           <a:cs typeface="+mj-cs"/>
         </a:defRPr>
       </a:lvl1pPr>
-      <a:lvl2pPr algn="ctr" defTabSz="457200" rtl="0" fontAlgn="base">
+      <a:lvl2pPr algn="ctr" defTabSz="457200" rtl="0" eaLnBrk="0" fontAlgn="base" hangingPunct="0">
         <a:spcBef>
           <a:spcPct val="0"/>
         </a:spcBef>
@@ -3620,7 +3692,7 @@
           <a:latin typeface="Calibri" pitchFamily="34" charset="0"/>
         </a:defRPr>
       </a:lvl2pPr>
-      <a:lvl3pPr algn="ctr" defTabSz="457200" rtl="0" fontAlgn="base">
+      <a:lvl3pPr algn="ctr" defTabSz="457200" rtl="0" eaLnBrk="0" fontAlgn="base" hangingPunct="0">
         <a:spcBef>
           <a:spcPct val="0"/>
         </a:spcBef>
@@ -3634,7 +3706,7 @@
           <a:latin typeface="Calibri" pitchFamily="34" charset="0"/>
         </a:defRPr>
       </a:lvl3pPr>
-      <a:lvl4pPr algn="ctr" defTabSz="457200" rtl="0" fontAlgn="base">
+      <a:lvl4pPr algn="ctr" defTabSz="457200" rtl="0" eaLnBrk="0" fontAlgn="base" hangingPunct="0">
         <a:spcBef>
           <a:spcPct val="0"/>
         </a:spcBef>
@@ -3648,7 +3720,7 @@
           <a:latin typeface="Calibri" pitchFamily="34" charset="0"/>
         </a:defRPr>
       </a:lvl4pPr>
-      <a:lvl5pPr algn="ctr" defTabSz="457200" rtl="0" fontAlgn="base">
+      <a:lvl5pPr algn="ctr" defTabSz="457200" rtl="0" eaLnBrk="0" fontAlgn="base" hangingPunct="0">
         <a:spcBef>
           <a:spcPct val="0"/>
         </a:spcBef>
@@ -3720,7 +3792,7 @@
       </a:lvl9pPr>
     </p:titleStyle>
     <p:bodyStyle>
-      <a:lvl1pPr marL="342900" indent="-342900" algn="l" defTabSz="457200" rtl="0" fontAlgn="base">
+      <a:lvl1pPr marL="342900" indent="-342900" algn="l" defTabSz="457200" rtl="0" eaLnBrk="0" fontAlgn="base" hangingPunct="0">
         <a:spcBef>
           <a:spcPct val="20000"/>
         </a:spcBef>
@@ -3738,7 +3810,7 @@
           <a:cs typeface="+mn-cs"/>
         </a:defRPr>
       </a:lvl1pPr>
-      <a:lvl2pPr marL="742950" indent="-285750" algn="l" defTabSz="457200" rtl="0" fontAlgn="base">
+      <a:lvl2pPr marL="742950" indent="-285750" algn="l" defTabSz="457200" rtl="0" eaLnBrk="0" fontAlgn="base" hangingPunct="0">
         <a:spcBef>
           <a:spcPct val="20000"/>
         </a:spcBef>
@@ -3756,7 +3828,7 @@
           <a:cs typeface="+mn-cs"/>
         </a:defRPr>
       </a:lvl2pPr>
-      <a:lvl3pPr marL="1143000" indent="-228600" algn="l" defTabSz="457200" rtl="0" fontAlgn="base">
+      <a:lvl3pPr marL="1143000" indent="-228600" algn="l" defTabSz="457200" rtl="0" eaLnBrk="0" fontAlgn="base" hangingPunct="0">
         <a:spcBef>
           <a:spcPct val="20000"/>
         </a:spcBef>
@@ -3774,7 +3846,7 @@
           <a:cs typeface="+mn-cs"/>
         </a:defRPr>
       </a:lvl3pPr>
-      <a:lvl4pPr marL="1600200" indent="-228600" algn="l" defTabSz="457200" rtl="0" fontAlgn="base">
+      <a:lvl4pPr marL="1600200" indent="-228600" algn="l" defTabSz="457200" rtl="0" eaLnBrk="0" fontAlgn="base" hangingPunct="0">
         <a:spcBef>
           <a:spcPct val="20000"/>
         </a:spcBef>
@@ -3792,7 +3864,7 @@
           <a:cs typeface="+mn-cs"/>
         </a:defRPr>
       </a:lvl4pPr>
-      <a:lvl5pPr marL="2057400" indent="-228600" algn="l" defTabSz="457200" rtl="0" fontAlgn="base">
+      <a:lvl5pPr marL="2057400" indent="-228600" algn="l" defTabSz="457200" rtl="0" eaLnBrk="0" fontAlgn="base" hangingPunct="0">
         <a:spcBef>
           <a:spcPct val="20000"/>
         </a:spcBef>
@@ -3995,7 +4067,7 @@
         </p:nvSpPr>
         <p:spPr>
           <a:xfrm>
-            <a:off x="838200" y="1816101"/>
+            <a:off x="838200" y="1816100"/>
             <a:ext cx="2133600" cy="609600"/>
           </a:xfrm>
           <a:prstGeom prst="rect">
@@ -4051,8 +4123,8 @@
         </p:nvSpPr>
         <p:spPr>
           <a:xfrm>
-            <a:off x="152400" y="764659"/>
-            <a:ext cx="2133600" cy="612648"/>
+            <a:off x="152400" y="765175"/>
+            <a:ext cx="2133600" cy="612775"/>
           </a:xfrm>
           <a:prstGeom prst="rect">
             <a:avLst/>
@@ -4111,8 +4183,8 @@
         </p:nvCxnSpPr>
         <p:spPr>
           <a:xfrm rot="16200000" flipH="1">
-            <a:off x="348480" y="1631180"/>
-            <a:ext cx="751371" cy="228069"/>
+            <a:off x="348456" y="1631157"/>
+            <a:ext cx="750887" cy="228600"/>
           </a:xfrm>
           <a:prstGeom prst="bentConnector2">
             <a:avLst/>
@@ -4151,8 +4223,8 @@
         </p:nvCxnSpPr>
         <p:spPr bwMode="auto">
           <a:xfrm>
-            <a:off x="2133600" y="4035329"/>
-            <a:ext cx="457200" cy="15"/>
+            <a:off x="2133600" y="4035425"/>
+            <a:ext cx="457200" cy="0"/>
           </a:xfrm>
           <a:prstGeom prst="bentConnector3">
             <a:avLst>
@@ -4229,7 +4301,7 @@
       </p:sp>
       <p:sp>
         <p:nvSpPr>
-          <p:cNvPr id="13322" name="TextBox 29"/>
+          <p:cNvPr id="14343" name="TextBox 30"/>
           <p:cNvSpPr txBox="1">
             <a:spLocks noChangeArrowheads="1"/>
           </p:cNvSpPr>
@@ -4237,8 +4309,8 @@
         </p:nvSpPr>
         <p:spPr bwMode="auto">
           <a:xfrm>
-            <a:off x="7936744" y="3806825"/>
-            <a:ext cx="563563" cy="457200"/>
+            <a:off x="58738" y="400050"/>
+            <a:ext cx="941387" cy="366713"/>
           </a:xfrm>
           <a:prstGeom prst="rect">
             <a:avLst/>
@@ -4258,46 +4330,7 @@
           <a:lstStyle/>
           <a:p>
             <a:r>
-              <a:rPr lang="en-US" sz="2400" b="1" dirty="0">
-                <a:latin typeface="Calibri" pitchFamily="34" charset="0"/>
-              </a:rPr>
-              <a:t>…..</a:t>
-            </a:r>
-          </a:p>
-        </p:txBody>
-      </p:sp>
-      <p:sp>
-        <p:nvSpPr>
-          <p:cNvPr id="13323" name="TextBox 30"/>
-          <p:cNvSpPr txBox="1">
-            <a:spLocks noChangeArrowheads="1"/>
-          </p:cNvSpPr>
-          <p:nvPr/>
-        </p:nvSpPr>
-        <p:spPr bwMode="auto">
-          <a:xfrm>
-            <a:off x="58330" y="400243"/>
-            <a:ext cx="941388" cy="366712"/>
-          </a:xfrm>
-          <a:prstGeom prst="rect">
-            <a:avLst/>
-          </a:prstGeom>
-          <a:noFill/>
-          <a:ln w="9525">
-            <a:noFill/>
-            <a:miter lim="800000"/>
-            <a:headEnd/>
-            <a:tailEnd/>
-          </a:ln>
-        </p:spPr>
-        <p:txBody>
-          <a:bodyPr wrap="none">
-            <a:spAutoFit/>
-          </a:bodyPr>
-          <a:lstStyle/>
-          <a:p>
-            <a:r>
-              <a:rPr lang="en-US" dirty="0">
+              <a:rPr lang="en-US">
                 <a:latin typeface="Calibri" pitchFamily="34" charset="0"/>
               </a:rPr>
               <a:t>HashSet</a:t>
@@ -4307,7 +4340,7 @@
       </p:sp>
       <p:sp>
         <p:nvSpPr>
-          <p:cNvPr id="13324" name="TextBox 31"/>
+          <p:cNvPr id="14344" name="TextBox 31"/>
           <p:cNvSpPr txBox="1">
             <a:spLocks noChangeArrowheads="1"/>
           </p:cNvSpPr>
@@ -4315,7 +4348,7 @@
         </p:nvSpPr>
         <p:spPr bwMode="auto">
           <a:xfrm>
-            <a:off x="741256" y="1447800"/>
+            <a:off x="741363" y="1447800"/>
             <a:ext cx="1071562" cy="366713"/>
           </a:xfrm>
           <a:prstGeom prst="rect">
@@ -4336,7 +4369,7 @@
           <a:lstStyle/>
           <a:p>
             <a:r>
-              <a:rPr lang="en-US" dirty="0">
+              <a:rPr lang="en-US">
                 <a:latin typeface="Calibri" pitchFamily="34" charset="0"/>
               </a:rPr>
               <a:t>HashMap</a:t>
@@ -4346,7 +4379,7 @@
       </p:sp>
       <p:sp>
         <p:nvSpPr>
-          <p:cNvPr id="13325" name="TextBox 32"/>
+          <p:cNvPr id="14345" name="TextBox 32"/>
           <p:cNvSpPr txBox="1">
             <a:spLocks noChangeArrowheads="1"/>
           </p:cNvSpPr>
@@ -4354,8 +4387,8 @@
         </p:nvSpPr>
         <p:spPr bwMode="auto">
           <a:xfrm>
-            <a:off x="1431754" y="2590976"/>
-            <a:ext cx="945353" cy="369332"/>
+            <a:off x="1431925" y="2590800"/>
+            <a:ext cx="944563" cy="369888"/>
           </a:xfrm>
           <a:prstGeom prst="rect">
             <a:avLst/>
@@ -4375,20 +4408,17 @@
           <a:lstStyle/>
           <a:p>
             <a:r>
-              <a:rPr lang="en-US" dirty="0" smtClean="0">
+              <a:rPr lang="en-US">
                 <a:latin typeface="Calibri" pitchFamily="34" charset="0"/>
               </a:rPr>
               <a:t>Object[]</a:t>
             </a:r>
-            <a:endParaRPr lang="en-US" dirty="0">
-              <a:latin typeface="Calibri" pitchFamily="34" charset="0"/>
-            </a:endParaRPr>
-          </a:p>
-        </p:txBody>
-      </p:sp>
-      <p:sp>
-        <p:nvSpPr>
-          <p:cNvPr id="13327" name="Rectangle 34"/>
+          </a:p>
+        </p:txBody>
+      </p:sp>
+      <p:sp>
+        <p:nvSpPr>
+          <p:cNvPr id="14346" name="Rectangle 34"/>
           <p:cNvSpPr>
             <a:spLocks noChangeArrowheads="1"/>
           </p:cNvSpPr>
@@ -4396,8 +4426,8 @@
         </p:nvSpPr>
         <p:spPr bwMode="auto">
           <a:xfrm>
-            <a:off x="2295408" y="577785"/>
-            <a:ext cx="2590799" cy="369332"/>
+            <a:off x="2295525" y="577850"/>
+            <a:ext cx="2590800" cy="369888"/>
           </a:xfrm>
           <a:prstGeom prst="rect">
             <a:avLst/>
@@ -4411,41 +4441,21 @@
           </a:ln>
         </p:spPr>
         <p:txBody>
-          <a:bodyPr wrap="square">
-            <a:noAutofit/>
-          </a:bodyPr>
+          <a:bodyPr/>
           <a:lstStyle/>
           <a:p>
             <a:r>
-              <a:rPr lang="en-US" i="1" dirty="0">
+              <a:rPr lang="en-US" i="1">
                 <a:latin typeface="Calibri" pitchFamily="34" charset="0"/>
               </a:rPr>
-              <a:t> </a:t>
-            </a:r>
-            <a:r>
-              <a:rPr lang="en-US" i="1" dirty="0">
-                <a:latin typeface="Calibri" pitchFamily="34" charset="0"/>
-              </a:rPr>
-              <a:t>W</a:t>
-            </a:r>
-            <a:r>
-              <a:rPr lang="en-US" i="1" dirty="0" smtClean="0">
-                <a:latin typeface="Calibri" pitchFamily="34" charset="0"/>
-              </a:rPr>
-              <a:t>rapper: </a:t>
-            </a:r>
-            <a:r>
-              <a:rPr lang="en-US" i="1" dirty="0">
-                <a:latin typeface="Calibri" pitchFamily="34" charset="0"/>
-              </a:rPr>
-              <a:t>16 bytes</a:t>
-            </a:r>
-          </a:p>
-        </p:txBody>
-      </p:sp>
-      <p:sp>
-        <p:nvSpPr>
-          <p:cNvPr id="13328" name="Rectangle 35"/>
+              <a:t> Wrapper: 16 bytes</a:t>
+            </a:r>
+          </a:p>
+        </p:txBody>
+      </p:sp>
+      <p:sp>
+        <p:nvSpPr>
+          <p:cNvPr id="14347" name="Rectangle 35"/>
           <p:cNvSpPr>
             <a:spLocks noChangeArrowheads="1"/>
           </p:cNvSpPr>
@@ -4453,7 +4463,7 @@
         </p:nvSpPr>
         <p:spPr bwMode="auto">
           <a:xfrm>
-            <a:off x="2971800" y="1626509"/>
+            <a:off x="2971800" y="1627188"/>
             <a:ext cx="2608263" cy="368300"/>
           </a:xfrm>
           <a:prstGeom prst="rect">
@@ -4468,35 +4478,21 @@
           </a:ln>
         </p:spPr>
         <p:txBody>
-          <a:bodyPr wrap="square">
-            <a:noAutofit/>
-          </a:bodyPr>
+          <a:bodyPr/>
           <a:lstStyle/>
           <a:p>
             <a:r>
-              <a:rPr lang="en-US" i="1" dirty="0" smtClean="0">
+              <a:rPr lang="en-US" i="1">
                 <a:latin typeface="Calibri" pitchFamily="34" charset="0"/>
               </a:rPr>
-              <a:t>W</a:t>
-            </a:r>
-            <a:r>
-              <a:rPr lang="en-US" i="1" dirty="0" smtClean="0">
-                <a:latin typeface="Calibri" pitchFamily="34" charset="0"/>
-              </a:rPr>
-              <a:t>rapper: </a:t>
-            </a:r>
-            <a:r>
-              <a:rPr lang="en-US" i="1" dirty="0">
-                <a:latin typeface="Calibri" pitchFamily="34" charset="0"/>
-              </a:rPr>
-              <a:t>40 bytes</a:t>
-            </a:r>
-          </a:p>
-        </p:txBody>
-      </p:sp>
-      <p:sp>
-        <p:nvSpPr>
-          <p:cNvPr id="13329" name="Rectangle 37"/>
+              <a:t>Wrapper: 40 bytes</a:t>
+            </a:r>
+          </a:p>
+        </p:txBody>
+      </p:sp>
+      <p:sp>
+        <p:nvSpPr>
+          <p:cNvPr id="14348" name="Rectangle 37"/>
           <p:cNvSpPr>
             <a:spLocks noChangeArrowheads="1"/>
           </p:cNvSpPr>
@@ -4504,8 +4500,8 @@
         </p:nvSpPr>
         <p:spPr bwMode="auto">
           <a:xfrm>
-            <a:off x="2151724" y="2837206"/>
-            <a:ext cx="2916187" cy="369332"/>
+            <a:off x="2151063" y="2836863"/>
+            <a:ext cx="2916237" cy="369887"/>
           </a:xfrm>
           <a:prstGeom prst="rect">
             <a:avLst/>
@@ -4519,41 +4515,23 @@
           </a:ln>
         </p:spPr>
         <p:txBody>
-          <a:bodyPr wrap="square">
+          <a:bodyPr>
             <a:spAutoFit/>
           </a:bodyPr>
           <a:lstStyle/>
           <a:p>
             <a:r>
-              <a:rPr lang="en-US" i="1" dirty="0">
+              <a:rPr lang="en-US" i="1">
                 <a:latin typeface="Calibri" pitchFamily="34" charset="0"/>
               </a:rPr>
-              <a:t>D</a:t>
-            </a:r>
-            <a:r>
-              <a:rPr lang="en-US" i="1" dirty="0" smtClean="0">
-                <a:latin typeface="Calibri" pitchFamily="34" charset="0"/>
-              </a:rPr>
-              <a:t>efault </a:t>
-            </a:r>
-            <a:r>
-              <a:rPr lang="en-US" i="1" dirty="0" smtClean="0">
-                <a:latin typeface="Calibri" pitchFamily="34" charset="0"/>
-              </a:rPr>
-              <a:t>capacity 16: </a:t>
-            </a:r>
-            <a:r>
-              <a:rPr lang="en-US" i="1" dirty="0">
-                <a:latin typeface="Calibri" pitchFamily="34" charset="0"/>
-              </a:rPr>
-              <a:t>80 bytes</a:t>
-            </a:r>
-          </a:p>
-        </p:txBody>
-      </p:sp>
-      <p:sp>
-        <p:nvSpPr>
-          <p:cNvPr id="13330" name="Rectangle 19"/>
+              <a:t>Default capacity 16: 80 bytes</a:t>
+            </a:r>
+          </a:p>
+        </p:txBody>
+      </p:sp>
+      <p:sp>
+        <p:nvSpPr>
+          <p:cNvPr id="14349" name="Rectangle 19"/>
           <p:cNvSpPr>
             <a:spLocks noChangeArrowheads="1"/>
           </p:cNvSpPr>
@@ -4561,8 +4539,8 @@
         </p:nvSpPr>
         <p:spPr bwMode="auto">
           <a:xfrm>
-            <a:off x="7326071" y="3549218"/>
-            <a:ext cx="1883774" cy="369332"/>
+            <a:off x="4808538" y="5003800"/>
+            <a:ext cx="1882775" cy="368300"/>
           </a:xfrm>
           <a:prstGeom prst="rect">
             <a:avLst/>
@@ -4576,13 +4554,13 @@
           </a:ln>
         </p:spPr>
         <p:txBody>
-          <a:bodyPr wrap="square">
+          <a:bodyPr>
             <a:spAutoFit/>
           </a:bodyPr>
           <a:lstStyle/>
           <a:p>
             <a:r>
-              <a:rPr lang="en-US" i="1" dirty="0">
+              <a:rPr lang="en-US" i="1">
                 <a:latin typeface="Calibri" pitchFamily="34" charset="0"/>
               </a:rPr>
               <a:t>24 bytes per entry</a:t>
@@ -4599,7 +4577,7 @@
         <p:spPr>
           <a:xfrm>
             <a:off x="1524000" y="2955925"/>
-            <a:ext cx="612775" cy="708218"/>
+            <a:ext cx="612775" cy="708025"/>
           </a:xfrm>
           <a:prstGeom prst="rect">
             <a:avLst/>
@@ -4654,8 +4632,8 @@
         </p:nvSpPr>
         <p:spPr>
           <a:xfrm>
-            <a:off x="1524001" y="3664143"/>
-            <a:ext cx="612775" cy="145857"/>
+            <a:off x="1524000" y="3663950"/>
+            <a:ext cx="612775" cy="146050"/>
           </a:xfrm>
           <a:prstGeom prst="rect">
             <a:avLst/>
@@ -4704,14 +4682,16 @@
       </p:sp>
       <p:grpSp>
         <p:nvGrpSpPr>
-          <p:cNvPr id="13399" name="Group 13398"/>
-          <p:cNvGrpSpPr/>
+          <p:cNvPr id="14352" name="Group 13398"/>
+          <p:cNvGrpSpPr>
+            <a:grpSpLocks/>
+          </p:cNvGrpSpPr>
           <p:nvPr/>
         </p:nvGrpSpPr>
-        <p:grpSpPr>
+        <p:grpSpPr bwMode="auto">
           <a:xfrm>
-            <a:off x="2487323" y="3349544"/>
-            <a:ext cx="2237077" cy="1580366"/>
+            <a:off x="2487613" y="3349625"/>
+            <a:ext cx="2236787" cy="1579563"/>
             <a:chOff x="2487323" y="3349544"/>
             <a:chExt cx="2237077" cy="1580366"/>
           </a:xfrm>
@@ -4724,8 +4704,8 @@
           </p:nvSpPr>
           <p:spPr>
             <a:xfrm>
-              <a:off x="2590800" y="3730544"/>
-              <a:ext cx="2133600" cy="609600"/>
+              <a:off x="2590523" y="3730738"/>
+              <a:ext cx="2133877" cy="609910"/>
             </a:xfrm>
             <a:prstGeom prst="rect">
               <a:avLst/>
@@ -4774,7 +4754,7 @@
         </p:sp>
         <p:sp>
           <p:nvSpPr>
-            <p:cNvPr id="13326" name="TextBox 33"/>
+            <p:cNvPr id="14383" name="TextBox 33"/>
             <p:cNvSpPr txBox="1">
               <a:spLocks noChangeArrowheads="1"/>
             </p:cNvSpPr>
@@ -4803,14 +4783,11 @@
             <a:lstStyle/>
             <a:p>
               <a:r>
-                <a:rPr lang="en-US" noProof="1" smtClean="0">
+                <a:rPr lang="en-US" noProof="1">
                   <a:latin typeface="Calibri" pitchFamily="34" charset="0"/>
                 </a:rPr>
                 <a:t>HashMap$Entry</a:t>
               </a:r>
-              <a:endParaRPr lang="en-US" noProof="1">
-                <a:latin typeface="Calibri" pitchFamily="34" charset="0"/>
-              </a:endParaRPr>
             </a:p>
           </p:txBody>
         </p:sp>
@@ -4820,14 +4797,14 @@
             <p:cNvCxnSpPr>
               <a:cxnSpLocks noChangeShapeType="1"/>
               <a:stCxn id="7" idx="2"/>
-              <a:endCxn id="13396" idx="0"/>
+              <a:endCxn id="14385" idx="0"/>
             </p:cNvCxnSpPr>
             <p:nvPr/>
           </p:nvCxnSpPr>
           <p:spPr bwMode="auto">
             <a:xfrm rot="5400000">
-              <a:off x="3546068" y="4451666"/>
-              <a:ext cx="223054" cy="10"/>
+              <a:off x="3546280" y="4451829"/>
+              <a:ext cx="222363" cy="0"/>
             </a:xfrm>
             <a:prstGeom prst="bentConnector3">
               <a:avLst>
@@ -4854,7 +4831,7 @@
         </p:cxnSp>
         <p:sp>
           <p:nvSpPr>
-            <p:cNvPr id="13396" name="TextBox 32"/>
+            <p:cNvPr id="14385" name="TextBox 32"/>
             <p:cNvSpPr txBox="1">
               <a:spLocks noChangeArrowheads="1"/>
             </p:cNvSpPr>
@@ -4883,7 +4860,7 @@
             <a:lstStyle/>
             <a:p>
               <a:r>
-                <a:rPr lang="en-US" dirty="0">
+                <a:rPr lang="en-US">
                   <a:latin typeface="Calibri" pitchFamily="34" charset="0"/>
                 </a:rPr>
                 <a:t>user data</a:t>
@@ -4902,8 +4879,8 @@
         </p:nvCxnSpPr>
         <p:spPr>
           <a:xfrm rot="16200000" flipH="1">
-            <a:off x="974148" y="2760182"/>
-            <a:ext cx="871634" cy="228069"/>
+            <a:off x="973931" y="2759869"/>
+            <a:ext cx="871538" cy="228600"/>
           </a:xfrm>
           <a:prstGeom prst="bentConnector2">
             <a:avLst/>
@@ -4938,8 +4915,8 @@
         </p:nvSpPr>
         <p:spPr>
           <a:xfrm>
-            <a:off x="1520825" y="3816543"/>
-            <a:ext cx="612775" cy="145857"/>
+            <a:off x="1520825" y="3816350"/>
+            <a:ext cx="612775" cy="146050"/>
           </a:xfrm>
           <a:prstGeom prst="rect">
             <a:avLst/>
@@ -4995,7 +4972,7 @@
         <p:spPr>
           <a:xfrm>
             <a:off x="1520825" y="3962400"/>
-            <a:ext cx="612775" cy="145857"/>
+            <a:ext cx="612775" cy="146050"/>
           </a:xfrm>
           <a:prstGeom prst="rect">
             <a:avLst/>
@@ -5050,8 +5027,8 @@
         </p:nvSpPr>
         <p:spPr>
           <a:xfrm>
-            <a:off x="1524000" y="4116543"/>
-            <a:ext cx="612775" cy="145857"/>
+            <a:off x="1524000" y="4116388"/>
+            <a:ext cx="612775" cy="146050"/>
           </a:xfrm>
           <a:prstGeom prst="rect">
             <a:avLst/>
@@ -5106,8 +5083,8 @@
         </p:nvSpPr>
         <p:spPr>
           <a:xfrm>
-            <a:off x="1524001" y="4267200"/>
-            <a:ext cx="612775" cy="145857"/>
+            <a:off x="1524000" y="4267200"/>
+            <a:ext cx="612775" cy="146050"/>
           </a:xfrm>
           <a:prstGeom prst="rect">
             <a:avLst/>
@@ -5162,8 +5139,8 @@
         </p:nvSpPr>
         <p:spPr>
           <a:xfrm>
-            <a:off x="1524000" y="4413057"/>
-            <a:ext cx="612775" cy="145857"/>
+            <a:off x="1524000" y="4413250"/>
+            <a:ext cx="612775" cy="146050"/>
           </a:xfrm>
           <a:prstGeom prst="rect">
             <a:avLst/>
@@ -5218,8 +5195,8 @@
         </p:nvSpPr>
         <p:spPr>
           <a:xfrm>
-            <a:off x="1524000" y="4558914"/>
-            <a:ext cx="612775" cy="145857"/>
+            <a:off x="1524000" y="4559300"/>
+            <a:ext cx="612775" cy="146050"/>
           </a:xfrm>
           <a:prstGeom prst="rect">
             <a:avLst/>
@@ -5274,8 +5251,8 @@
         </p:nvSpPr>
         <p:spPr>
           <a:xfrm>
-            <a:off x="1520825" y="4704771"/>
-            <a:ext cx="612775" cy="145857"/>
+            <a:off x="1520825" y="4705350"/>
+            <a:ext cx="612775" cy="146050"/>
           </a:xfrm>
           <a:prstGeom prst="rect">
             <a:avLst/>
@@ -5330,8 +5307,8 @@
         </p:nvSpPr>
         <p:spPr>
           <a:xfrm>
-            <a:off x="1520825" y="4850628"/>
-            <a:ext cx="612775" cy="145857"/>
+            <a:off x="1520825" y="4851400"/>
+            <a:ext cx="612775" cy="144463"/>
           </a:xfrm>
           <a:prstGeom prst="rect">
             <a:avLst/>
@@ -5386,8 +5363,8 @@
         </p:nvSpPr>
         <p:spPr>
           <a:xfrm>
-            <a:off x="1520825" y="4996485"/>
-            <a:ext cx="612775" cy="145857"/>
+            <a:off x="1520825" y="4995863"/>
+            <a:ext cx="612775" cy="146050"/>
           </a:xfrm>
           <a:prstGeom prst="rect">
             <a:avLst/>
@@ -5442,8 +5419,8 @@
         </p:nvSpPr>
         <p:spPr>
           <a:xfrm>
-            <a:off x="1520825" y="5151307"/>
-            <a:ext cx="612775" cy="145857"/>
+            <a:off x="1520825" y="5151438"/>
+            <a:ext cx="612775" cy="146050"/>
           </a:xfrm>
           <a:prstGeom prst="rect">
             <a:avLst/>
@@ -5498,8 +5475,8 @@
         </p:nvSpPr>
         <p:spPr>
           <a:xfrm>
-            <a:off x="1520825" y="5297164"/>
-            <a:ext cx="612775" cy="145857"/>
+            <a:off x="1520825" y="5297488"/>
+            <a:ext cx="612775" cy="146050"/>
           </a:xfrm>
           <a:prstGeom prst="rect">
             <a:avLst/>
@@ -5554,8 +5531,8 @@
         </p:nvSpPr>
         <p:spPr>
           <a:xfrm>
-            <a:off x="1520825" y="5443021"/>
-            <a:ext cx="612775" cy="145857"/>
+            <a:off x="1520825" y="5443538"/>
+            <a:ext cx="612775" cy="146050"/>
           </a:xfrm>
           <a:prstGeom prst="rect">
             <a:avLst/>
@@ -5610,8 +5587,8 @@
         </p:nvSpPr>
         <p:spPr>
           <a:xfrm>
-            <a:off x="1520825" y="5588878"/>
-            <a:ext cx="612775" cy="145857"/>
+            <a:off x="1520825" y="5589588"/>
+            <a:ext cx="612775" cy="144462"/>
           </a:xfrm>
           <a:prstGeom prst="rect">
             <a:avLst/>
@@ -5666,8 +5643,8 @@
         </p:nvSpPr>
         <p:spPr>
           <a:xfrm>
-            <a:off x="1520825" y="5734735"/>
-            <a:ext cx="612775" cy="145857"/>
+            <a:off x="1520825" y="5734050"/>
+            <a:ext cx="612775" cy="146050"/>
           </a:xfrm>
           <a:prstGeom prst="rect">
             <a:avLst/>
@@ -5722,8 +5699,8 @@
         </p:nvSpPr>
         <p:spPr>
           <a:xfrm>
-            <a:off x="1520825" y="5880592"/>
-            <a:ext cx="612775" cy="145857"/>
+            <a:off x="1520825" y="5880100"/>
+            <a:ext cx="612775" cy="146050"/>
           </a:xfrm>
           <a:prstGeom prst="rect">
             <a:avLst/>
@@ -5772,14 +5749,16 @@
       </p:sp>
       <p:grpSp>
         <p:nvGrpSpPr>
-          <p:cNvPr id="13397" name="Group 13396"/>
-          <p:cNvGrpSpPr/>
+          <p:cNvPr id="14369" name="Group 13396"/>
+          <p:cNvGrpSpPr>
+            <a:grpSpLocks/>
+          </p:cNvGrpSpPr>
           <p:nvPr/>
         </p:nvGrpSpPr>
-        <p:grpSpPr>
+        <p:grpSpPr bwMode="auto">
           <a:xfrm>
-            <a:off x="5078639" y="3351258"/>
-            <a:ext cx="2246484" cy="1580366"/>
+            <a:off x="5078413" y="3351213"/>
+            <a:ext cx="2246312" cy="1581150"/>
             <a:chOff x="5114924" y="4197908"/>
             <a:chExt cx="2246484" cy="1580366"/>
           </a:xfrm>
@@ -5792,8 +5771,8 @@
           </p:nvSpPr>
           <p:spPr>
             <a:xfrm>
-              <a:off x="5227808" y="4578908"/>
-              <a:ext cx="2133600" cy="609600"/>
+              <a:off x="5227645" y="4578719"/>
+              <a:ext cx="2133763" cy="609298"/>
             </a:xfrm>
             <a:prstGeom prst="rect">
               <a:avLst/>
@@ -5842,7 +5821,7 @@
         </p:sp>
         <p:sp>
           <p:nvSpPr>
-            <p:cNvPr id="105" name="TextBox 33"/>
+            <p:cNvPr id="14379" name="TextBox 33"/>
             <p:cNvSpPr txBox="1">
               <a:spLocks noChangeArrowheads="1"/>
             </p:cNvSpPr>
@@ -5871,14 +5850,11 @@
             <a:lstStyle/>
             <a:p>
               <a:r>
-                <a:rPr lang="en-US" noProof="1" smtClean="0">
+                <a:rPr lang="en-US" noProof="1">
                   <a:latin typeface="Calibri" pitchFamily="34" charset="0"/>
                 </a:rPr>
                 <a:t>HashMap$Entry</a:t>
               </a:r>
-              <a:endParaRPr lang="en-US" noProof="1">
-                <a:latin typeface="Calibri" pitchFamily="34" charset="0"/>
-              </a:endParaRPr>
             </a:p>
           </p:txBody>
         </p:sp>
@@ -5888,14 +5864,14 @@
             <p:cNvCxnSpPr>
               <a:cxnSpLocks noChangeShapeType="1"/>
               <a:stCxn id="104" idx="2"/>
-              <a:endCxn id="107" idx="0"/>
+              <a:endCxn id="14381" idx="0"/>
             </p:cNvCxnSpPr>
             <p:nvPr/>
           </p:nvCxnSpPr>
           <p:spPr bwMode="auto">
             <a:xfrm rot="5400000">
-              <a:off x="6183076" y="5300030"/>
-              <a:ext cx="223054" cy="10"/>
+              <a:off x="6182663" y="5299880"/>
+              <a:ext cx="223726" cy="0"/>
             </a:xfrm>
             <a:prstGeom prst="bentConnector3">
               <a:avLst>
@@ -5922,7 +5898,7 @@
         </p:cxnSp>
         <p:sp>
           <p:nvSpPr>
-            <p:cNvPr id="107" name="TextBox 32"/>
+            <p:cNvPr id="14381" name="TextBox 32"/>
             <p:cNvSpPr txBox="1">
               <a:spLocks noChangeArrowheads="1"/>
             </p:cNvSpPr>
@@ -5951,7 +5927,7 @@
             <a:lstStyle/>
             <a:p>
               <a:r>
-                <a:rPr lang="en-US" dirty="0">
+                <a:rPr lang="en-US">
                   <a:latin typeface="Calibri" pitchFamily="34" charset="0"/>
                 </a:rPr>
                 <a:t>user data</a:t>
@@ -5972,46 +5948,8 @@
         </p:nvCxnSpPr>
         <p:spPr bwMode="auto">
           <a:xfrm>
-            <a:off x="4724400" y="4035344"/>
-            <a:ext cx="467123" cy="1714"/>
-          </a:xfrm>
-          <a:prstGeom prst="bentConnector3">
-            <a:avLst>
-              <a:gd name="adj1" fmla="val 50000"/>
-            </a:avLst>
-          </a:prstGeom>
-          <a:noFill/>
-          <a:ln w="25400" algn="ctr">
-            <a:solidFill>
-              <a:schemeClr val="tx1"/>
-            </a:solidFill>
-            <a:miter lim="800000"/>
-            <a:headEnd/>
-            <a:tailEnd type="arrow" w="med" len="med"/>
-          </a:ln>
-          <a:effectLst>
-            <a:outerShdw dist="20000" dir="5400000" rotWithShape="0">
-              <a:srgbClr val="000000">
-                <a:alpha val="37999"/>
-              </a:srgbClr>
-            </a:outerShdw>
-          </a:effectLst>
-        </p:spPr>
-      </p:cxnSp>
-      <p:cxnSp>
-        <p:nvCxnSpPr>
-          <p:cNvPr id="114" name="Shape 21"/>
-          <p:cNvCxnSpPr>
-            <a:cxnSpLocks noChangeShapeType="1"/>
-            <a:stCxn id="104" idx="3"/>
-            <a:endCxn id="13322" idx="1"/>
-          </p:cNvCxnSpPr>
-          <p:nvPr/>
-        </p:nvCxnSpPr>
-        <p:spPr bwMode="auto">
-          <a:xfrm flipV="1">
-            <a:off x="7325123" y="4035425"/>
-            <a:ext cx="611621" cy="1633"/>
+            <a:off x="4724400" y="4035425"/>
+            <a:ext cx="466725" cy="1588"/>
           </a:xfrm>
           <a:prstGeom prst="bentConnector3">
             <a:avLst>
@@ -6038,14 +5976,16 @@
       </p:cxnSp>
       <p:grpSp>
         <p:nvGrpSpPr>
-          <p:cNvPr id="118" name="Group 117"/>
-          <p:cNvGrpSpPr/>
+          <p:cNvPr id="14372" name="Group 117"/>
+          <p:cNvGrpSpPr>
+            <a:grpSpLocks/>
+          </p:cNvGrpSpPr>
           <p:nvPr/>
         </p:nvGrpSpPr>
-        <p:grpSpPr>
+        <p:grpSpPr bwMode="auto">
           <a:xfrm>
-            <a:off x="2487322" y="5119749"/>
-            <a:ext cx="2237077" cy="1580366"/>
+            <a:off x="2487613" y="5119688"/>
+            <a:ext cx="2236787" cy="1581150"/>
             <a:chOff x="2487323" y="3349544"/>
             <a:chExt cx="2237077" cy="1580366"/>
           </a:xfrm>
@@ -6058,8 +5998,8 @@
           </p:nvSpPr>
           <p:spPr>
             <a:xfrm>
-              <a:off x="2590800" y="3730544"/>
-              <a:ext cx="2133600" cy="609600"/>
+              <a:off x="2590523" y="3730355"/>
+              <a:ext cx="2133877" cy="609298"/>
             </a:xfrm>
             <a:prstGeom prst="rect">
               <a:avLst/>
@@ -6108,7 +6048,7 @@
         </p:sp>
         <p:sp>
           <p:nvSpPr>
-            <p:cNvPr id="120" name="TextBox 33"/>
+            <p:cNvPr id="14375" name="TextBox 33"/>
             <p:cNvSpPr txBox="1">
               <a:spLocks noChangeArrowheads="1"/>
             </p:cNvSpPr>
@@ -6137,14 +6077,11 @@
             <a:lstStyle/>
             <a:p>
               <a:r>
-                <a:rPr lang="en-US" noProof="1" smtClean="0">
+                <a:rPr lang="en-US" noProof="1">
                   <a:latin typeface="Calibri" pitchFamily="34" charset="0"/>
                 </a:rPr>
                 <a:t>HashMap$Entry</a:t>
               </a:r>
-              <a:endParaRPr lang="en-US" noProof="1">
-                <a:latin typeface="Calibri" pitchFamily="34" charset="0"/>
-              </a:endParaRPr>
             </a:p>
           </p:txBody>
         </p:sp>
@@ -6154,14 +6091,14 @@
             <p:cNvCxnSpPr>
               <a:cxnSpLocks noChangeShapeType="1"/>
               <a:stCxn id="119" idx="2"/>
-              <a:endCxn id="122" idx="0"/>
+              <a:endCxn id="14377" idx="0"/>
             </p:cNvCxnSpPr>
             <p:nvPr/>
           </p:nvCxnSpPr>
           <p:spPr bwMode="auto">
             <a:xfrm rot="5400000">
-              <a:off x="3546068" y="4451666"/>
-              <a:ext cx="223054" cy="10"/>
+              <a:off x="3545598" y="4451516"/>
+              <a:ext cx="223726" cy="0"/>
             </a:xfrm>
             <a:prstGeom prst="bentConnector3">
               <a:avLst>
@@ -6188,7 +6125,7 @@
         </p:cxnSp>
         <p:sp>
           <p:nvSpPr>
-            <p:cNvPr id="122" name="TextBox 32"/>
+            <p:cNvPr id="14377" name="TextBox 32"/>
             <p:cNvSpPr txBox="1">
               <a:spLocks noChangeArrowheads="1"/>
             </p:cNvSpPr>
@@ -6217,7 +6154,7 @@
             <a:lstStyle/>
             <a:p>
               <a:r>
-                <a:rPr lang="en-US" dirty="0">
+                <a:rPr lang="en-US">
                   <a:latin typeface="Calibri" pitchFamily="34" charset="0"/>
                 </a:rPr>
                 <a:t>user data</a:t>
@@ -6238,8 +6175,8 @@
         </p:nvCxnSpPr>
         <p:spPr bwMode="auto">
           <a:xfrm flipV="1">
-            <a:off x="2133600" y="5805549"/>
-            <a:ext cx="457199" cy="2115"/>
+            <a:off x="2133600" y="5805488"/>
+            <a:ext cx="457200" cy="1587"/>
           </a:xfrm>
           <a:prstGeom prst="bentConnector3">
             <a:avLst>

</xml_diff>